<commit_message>
create XmlWishTransactionStorage interface for storing wish transactions
</commit_message>
<xml_diff>
--- a/docs/diagrams/ModelComponentClassDiagram.pptx
+++ b/docs/diagrams/ModelComponentClassDiagram.pptx
@@ -126,6 +126,539 @@
 </p:presentation>
 </file>
 
+<file path=ppt/changesInfos/changesInfo1.xml><?xml version="1.0" encoding="utf-8"?>
+<pc:chgInfo xmlns:a="http://schemas.openxmlformats.org/drawingml/2006/main" xmlns:r="http://schemas.openxmlformats.org/officeDocument/2006/relationships" xmlns:ac="http://schemas.microsoft.com/office/drawing/2013/main/command" xmlns:pc="http://schemas.microsoft.com/office/powerpoint/2013/main/command">
+  <pc:docChgLst>
+    <pc:chgData name="Shengmin Leong" userId="075411cc4697ef0d" providerId="LiveId" clId="{CC3032D4-0828-4756-9212-7143605D2EB9}"/>
+    <pc:docChg chg="undo redo custSel modSld">
+      <pc:chgData name="Shengmin Leong" userId="075411cc4697ef0d" providerId="LiveId" clId="{CC3032D4-0828-4756-9212-7143605D2EB9}" dt="2018-10-01T05:07:59.488" v="1129" actId="478"/>
+      <pc:docMkLst>
+        <pc:docMk/>
+      </pc:docMkLst>
+      <pc:sldChg chg="addSp delSp modSp">
+        <pc:chgData name="Shengmin Leong" userId="075411cc4697ef0d" providerId="LiveId" clId="{CC3032D4-0828-4756-9212-7143605D2EB9}" dt="2018-10-01T05:07:59.488" v="1129" actId="478"/>
+        <pc:sldMkLst>
+          <pc:docMk/>
+          <pc:sldMk cId="2396968029" sldId="263"/>
+        </pc:sldMkLst>
+        <pc:spChg chg="mod">
+          <ac:chgData name="Shengmin Leong" userId="075411cc4697ef0d" providerId="LiveId" clId="{CC3032D4-0828-4756-9212-7143605D2EB9}" dt="2018-10-01T04:50:05.834" v="814" actId="1076"/>
+          <ac:spMkLst>
+            <pc:docMk/>
+            <pc:sldMk cId="2396968029" sldId="263"/>
+            <ac:spMk id="2" creationId="{00000000-0000-0000-0000-000000000000}"/>
+          </ac:spMkLst>
+        </pc:spChg>
+        <pc:spChg chg="mod">
+          <ac:chgData name="Shengmin Leong" userId="075411cc4697ef0d" providerId="LiveId" clId="{CC3032D4-0828-4756-9212-7143605D2EB9}" dt="2018-10-01T03:20:36.515" v="18" actId="1076"/>
+          <ac:spMkLst>
+            <pc:docMk/>
+            <pc:sldMk cId="2396968029" sldId="263"/>
+            <ac:spMk id="42" creationId="{00000000-0000-0000-0000-000000000000}"/>
+          </ac:spMkLst>
+        </pc:spChg>
+        <pc:spChg chg="mod ord">
+          <ac:chgData name="Shengmin Leong" userId="075411cc4697ef0d" providerId="LiveId" clId="{CC3032D4-0828-4756-9212-7143605D2EB9}" dt="2018-10-01T04:40:20.987" v="575" actId="166"/>
+          <ac:spMkLst>
+            <pc:docMk/>
+            <pc:sldMk cId="2396968029" sldId="263"/>
+            <ac:spMk id="46" creationId="{00000000-0000-0000-0000-000000000000}"/>
+          </ac:spMkLst>
+        </pc:spChg>
+        <pc:spChg chg="mod">
+          <ac:chgData name="Shengmin Leong" userId="075411cc4697ef0d" providerId="LiveId" clId="{CC3032D4-0828-4756-9212-7143605D2EB9}" dt="2018-10-01T03:19:58.184" v="1" actId="1076"/>
+          <ac:spMkLst>
+            <pc:docMk/>
+            <pc:sldMk cId="2396968029" sldId="263"/>
+            <ac:spMk id="48" creationId="{00000000-0000-0000-0000-000000000000}"/>
+          </ac:spMkLst>
+        </pc:spChg>
+        <pc:spChg chg="mod">
+          <ac:chgData name="Shengmin Leong" userId="075411cc4697ef0d" providerId="LiveId" clId="{CC3032D4-0828-4756-9212-7143605D2EB9}" dt="2018-10-01T03:25:36.179" v="72" actId="1076"/>
+          <ac:spMkLst>
+            <pc:docMk/>
+            <pc:sldMk cId="2396968029" sldId="263"/>
+            <ac:spMk id="49" creationId="{00000000-0000-0000-0000-000000000000}"/>
+          </ac:spMkLst>
+        </pc:spChg>
+        <pc:spChg chg="mod">
+          <ac:chgData name="Shengmin Leong" userId="075411cc4697ef0d" providerId="LiveId" clId="{CC3032D4-0828-4756-9212-7143605D2EB9}" dt="2018-10-01T03:25:39.355" v="73" actId="1076"/>
+          <ac:spMkLst>
+            <pc:docMk/>
+            <pc:sldMk cId="2396968029" sldId="263"/>
+            <ac:spMk id="51" creationId="{00000000-0000-0000-0000-000000000000}"/>
+          </ac:spMkLst>
+        </pc:spChg>
+        <pc:spChg chg="mod ord">
+          <ac:chgData name="Shengmin Leong" userId="075411cc4697ef0d" providerId="LiveId" clId="{CC3032D4-0828-4756-9212-7143605D2EB9}" dt="2018-10-01T04:39:22.927" v="568" actId="166"/>
+          <ac:spMkLst>
+            <pc:docMk/>
+            <pc:sldMk cId="2396968029" sldId="263"/>
+            <ac:spMk id="55" creationId="{00000000-0000-0000-0000-000000000000}"/>
+          </ac:spMkLst>
+        </pc:spChg>
+        <pc:spChg chg="add mod">
+          <ac:chgData name="Shengmin Leong" userId="075411cc4697ef0d" providerId="LiveId" clId="{CC3032D4-0828-4756-9212-7143605D2EB9}" dt="2018-10-01T03:21:58.360" v="38" actId="1076"/>
+          <ac:spMkLst>
+            <pc:docMk/>
+            <pc:sldMk cId="2396968029" sldId="263"/>
+            <ac:spMk id="56" creationId="{249D00E4-5904-42A5-820F-DAA30DF03A0F}"/>
+          </ac:spMkLst>
+        </pc:spChg>
+        <pc:spChg chg="add mod">
+          <ac:chgData name="Shengmin Leong" userId="075411cc4697ef0d" providerId="LiveId" clId="{CC3032D4-0828-4756-9212-7143605D2EB9}" dt="2018-10-01T03:24:21.773" v="55" actId="1076"/>
+          <ac:spMkLst>
+            <pc:docMk/>
+            <pc:sldMk cId="2396968029" sldId="263"/>
+            <ac:spMk id="57" creationId="{6DB0FF8F-D1E6-4C03-9A19-F389789BC40B}"/>
+          </ac:spMkLst>
+        </pc:spChg>
+        <pc:spChg chg="mod">
+          <ac:chgData name="Shengmin Leong" userId="075411cc4697ef0d" providerId="LiveId" clId="{CC3032D4-0828-4756-9212-7143605D2EB9}" dt="2018-10-01T04:46:57.114" v="769" actId="1035"/>
+          <ac:spMkLst>
+            <pc:docMk/>
+            <pc:sldMk cId="2396968029" sldId="263"/>
+            <ac:spMk id="61" creationId="{00000000-0000-0000-0000-000000000000}"/>
+          </ac:spMkLst>
+        </pc:spChg>
+        <pc:spChg chg="mod">
+          <ac:chgData name="Shengmin Leong" userId="075411cc4697ef0d" providerId="LiveId" clId="{CC3032D4-0828-4756-9212-7143605D2EB9}" dt="2018-10-01T04:46:03.066" v="758" actId="1076"/>
+          <ac:spMkLst>
+            <pc:docMk/>
+            <pc:sldMk cId="2396968029" sldId="263"/>
+            <ac:spMk id="62" creationId="{00000000-0000-0000-0000-000000000000}"/>
+          </ac:spMkLst>
+        </pc:spChg>
+        <pc:spChg chg="mod">
+          <ac:chgData name="Shengmin Leong" userId="075411cc4697ef0d" providerId="LiveId" clId="{CC3032D4-0828-4756-9212-7143605D2EB9}" dt="2018-10-01T03:26:33.497" v="92" actId="1035"/>
+          <ac:spMkLst>
+            <pc:docMk/>
+            <pc:sldMk cId="2396968029" sldId="263"/>
+            <ac:spMk id="63" creationId="{00000000-0000-0000-0000-000000000000}"/>
+          </ac:spMkLst>
+        </pc:spChg>
+        <pc:spChg chg="mod">
+          <ac:chgData name="Shengmin Leong" userId="075411cc4697ef0d" providerId="LiveId" clId="{CC3032D4-0828-4756-9212-7143605D2EB9}" dt="2018-10-01T03:25:01.346" v="66" actId="1035"/>
+          <ac:spMkLst>
+            <pc:docMk/>
+            <pc:sldMk cId="2396968029" sldId="263"/>
+            <ac:spMk id="65" creationId="{00000000-0000-0000-0000-000000000000}"/>
+          </ac:spMkLst>
+        </pc:spChg>
+        <pc:spChg chg="mod">
+          <ac:chgData name="Shengmin Leong" userId="075411cc4697ef0d" providerId="LiveId" clId="{CC3032D4-0828-4756-9212-7143605D2EB9}" dt="2018-10-01T04:51:39.868" v="826" actId="1076"/>
+          <ac:spMkLst>
+            <pc:docMk/>
+            <pc:sldMk cId="2396968029" sldId="263"/>
+            <ac:spMk id="66" creationId="{00000000-0000-0000-0000-000000000000}"/>
+          </ac:spMkLst>
+        </pc:spChg>
+        <pc:spChg chg="mod">
+          <ac:chgData name="Shengmin Leong" userId="075411cc4697ef0d" providerId="LiveId" clId="{CC3032D4-0828-4756-9212-7143605D2EB9}" dt="2018-10-01T04:29:15.290" v="283" actId="1076"/>
+          <ac:spMkLst>
+            <pc:docMk/>
+            <pc:sldMk cId="2396968029" sldId="263"/>
+            <ac:spMk id="68" creationId="{00000000-0000-0000-0000-000000000000}"/>
+          </ac:spMkLst>
+        </pc:spChg>
+        <pc:spChg chg="mod">
+          <ac:chgData name="Shengmin Leong" userId="075411cc4697ef0d" providerId="LiveId" clId="{CC3032D4-0828-4756-9212-7143605D2EB9}" dt="2018-10-01T05:03:12.764" v="1045" actId="1076"/>
+          <ac:spMkLst>
+            <pc:docMk/>
+            <pc:sldMk cId="2396968029" sldId="263"/>
+            <ac:spMk id="70" creationId="{00000000-0000-0000-0000-000000000000}"/>
+          </ac:spMkLst>
+        </pc:spChg>
+        <pc:spChg chg="mod">
+          <ac:chgData name="Shengmin Leong" userId="075411cc4697ef0d" providerId="LiveId" clId="{CC3032D4-0828-4756-9212-7143605D2EB9}" dt="2018-10-01T03:26:42.249" v="98" actId="1038"/>
+          <ac:spMkLst>
+            <pc:docMk/>
+            <pc:sldMk cId="2396968029" sldId="263"/>
+            <ac:spMk id="78" creationId="{00000000-0000-0000-0000-000000000000}"/>
+          </ac:spMkLst>
+        </pc:spChg>
+        <pc:spChg chg="mod">
+          <ac:chgData name="Shengmin Leong" userId="075411cc4697ef0d" providerId="LiveId" clId="{CC3032D4-0828-4756-9212-7143605D2EB9}" dt="2018-10-01T05:03:41.130" v="1047" actId="14100"/>
+          <ac:spMkLst>
+            <pc:docMk/>
+            <pc:sldMk cId="2396968029" sldId="263"/>
+            <ac:spMk id="80" creationId="{00000000-0000-0000-0000-000000000000}"/>
+          </ac:spMkLst>
+        </pc:spChg>
+        <pc:spChg chg="mod">
+          <ac:chgData name="Shengmin Leong" userId="075411cc4697ef0d" providerId="LiveId" clId="{CC3032D4-0828-4756-9212-7143605D2EB9}" dt="2018-10-01T03:25:46.846" v="84" actId="20577"/>
+          <ac:spMkLst>
+            <pc:docMk/>
+            <pc:sldMk cId="2396968029" sldId="263"/>
+            <ac:spMk id="83" creationId="{00000000-0000-0000-0000-000000000000}"/>
+          </ac:spMkLst>
+        </pc:spChg>
+        <pc:spChg chg="add del mod">
+          <ac:chgData name="Shengmin Leong" userId="075411cc4697ef0d" providerId="LiveId" clId="{CC3032D4-0828-4756-9212-7143605D2EB9}" dt="2018-10-01T04:28:59.472" v="244" actId="478"/>
+          <ac:spMkLst>
+            <pc:docMk/>
+            <pc:sldMk cId="2396968029" sldId="263"/>
+            <ac:spMk id="87" creationId="{797DB465-9617-4324-B257-F5419F478A06}"/>
+          </ac:spMkLst>
+        </pc:spChg>
+        <pc:spChg chg="mod">
+          <ac:chgData name="Shengmin Leong" userId="075411cc4697ef0d" providerId="LiveId" clId="{CC3032D4-0828-4756-9212-7143605D2EB9}" dt="2018-10-01T03:29:30.954" v="125" actId="1076"/>
+          <ac:spMkLst>
+            <pc:docMk/>
+            <pc:sldMk cId="2396968029" sldId="263"/>
+            <ac:spMk id="99" creationId="{00000000-0000-0000-0000-000000000000}"/>
+          </ac:spMkLst>
+        </pc:spChg>
+        <pc:spChg chg="mod">
+          <ac:chgData name="Shengmin Leong" userId="075411cc4697ef0d" providerId="LiveId" clId="{CC3032D4-0828-4756-9212-7143605D2EB9}" dt="2018-10-01T05:02:27.598" v="1036" actId="1037"/>
+          <ac:spMkLst>
+            <pc:docMk/>
+            <pc:sldMk cId="2396968029" sldId="263"/>
+            <ac:spMk id="114" creationId="{00000000-0000-0000-0000-000000000000}"/>
+          </ac:spMkLst>
+        </pc:spChg>
+        <pc:spChg chg="add mod">
+          <ac:chgData name="Shengmin Leong" userId="075411cc4697ef0d" providerId="LiveId" clId="{CC3032D4-0828-4756-9212-7143605D2EB9}" dt="2018-10-01T04:45:08.592" v="754" actId="1076"/>
+          <ac:spMkLst>
+            <pc:docMk/>
+            <pc:sldMk cId="2396968029" sldId="263"/>
+            <ac:spMk id="115" creationId="{94659E10-A783-46D3-A463-E36EE140CF45}"/>
+          </ac:spMkLst>
+        </pc:spChg>
+        <pc:spChg chg="add mod">
+          <ac:chgData name="Shengmin Leong" userId="075411cc4697ef0d" providerId="LiveId" clId="{CC3032D4-0828-4756-9212-7143605D2EB9}" dt="2018-10-01T04:45:02.288" v="753" actId="1076"/>
+          <ac:spMkLst>
+            <pc:docMk/>
+            <pc:sldMk cId="2396968029" sldId="263"/>
+            <ac:spMk id="116" creationId="{29AD12B8-209F-47FE-B0CD-DCCFA345E5D2}"/>
+          </ac:spMkLst>
+        </pc:spChg>
+        <pc:spChg chg="add del mod">
+          <ac:chgData name="Shengmin Leong" userId="075411cc4697ef0d" providerId="LiveId" clId="{CC3032D4-0828-4756-9212-7143605D2EB9}" dt="2018-10-01T05:07:51.900" v="1126" actId="478"/>
+          <ac:spMkLst>
+            <pc:docMk/>
+            <pc:sldMk cId="2396968029" sldId="263"/>
+            <ac:spMk id="118" creationId="{00000000-0000-0000-0000-000000000000}"/>
+          </ac:spMkLst>
+        </pc:spChg>
+        <pc:spChg chg="add mod">
+          <ac:chgData name="Shengmin Leong" userId="075411cc4697ef0d" providerId="LiveId" clId="{CC3032D4-0828-4756-9212-7143605D2EB9}" dt="2018-10-01T04:30:06.516" v="333" actId="1076"/>
+          <ac:spMkLst>
+            <pc:docMk/>
+            <pc:sldMk cId="2396968029" sldId="263"/>
+            <ac:spMk id="123" creationId="{4A3B3FDB-CB1B-4CD6-8885-0DA7CE1D3816}"/>
+          </ac:spMkLst>
+        </pc:spChg>
+        <pc:spChg chg="add mod">
+          <ac:chgData name="Shengmin Leong" userId="075411cc4697ef0d" providerId="LiveId" clId="{CC3032D4-0828-4756-9212-7143605D2EB9}" dt="2018-10-01T04:46:09.303" v="759" actId="14100"/>
+          <ac:spMkLst>
+            <pc:docMk/>
+            <pc:sldMk cId="2396968029" sldId="263"/>
+            <ac:spMk id="125" creationId="{69DA47F3-AE27-45E8-A5EC-22B609C9702A}"/>
+          </ac:spMkLst>
+        </pc:spChg>
+        <pc:spChg chg="add mod">
+          <ac:chgData name="Shengmin Leong" userId="075411cc4697ef0d" providerId="LiveId" clId="{CC3032D4-0828-4756-9212-7143605D2EB9}" dt="2018-10-01T04:32:31.533" v="519" actId="1037"/>
+          <ac:spMkLst>
+            <pc:docMk/>
+            <pc:sldMk cId="2396968029" sldId="263"/>
+            <ac:spMk id="129" creationId="{2B9F9408-7B4D-4B99-8EA6-98DC7E99F514}"/>
+          </ac:spMkLst>
+        </pc:spChg>
+        <pc:spChg chg="add mod">
+          <ac:chgData name="Shengmin Leong" userId="075411cc4697ef0d" providerId="LiveId" clId="{CC3032D4-0828-4756-9212-7143605D2EB9}" dt="2018-10-01T04:32:22.507" v="513" actId="1076"/>
+          <ac:spMkLst>
+            <pc:docMk/>
+            <pc:sldMk cId="2396968029" sldId="263"/>
+            <ac:spMk id="130" creationId="{04A2AE4D-CF61-40C2-8824-CB599E0A01D6}"/>
+          </ac:spMkLst>
+        </pc:spChg>
+        <pc:spChg chg="add del">
+          <ac:chgData name="Shengmin Leong" userId="075411cc4697ef0d" providerId="LiveId" clId="{CC3032D4-0828-4756-9212-7143605D2EB9}" dt="2018-10-01T04:33:11.238" v="523"/>
+          <ac:spMkLst>
+            <pc:docMk/>
+            <pc:sldMk cId="2396968029" sldId="263"/>
+            <ac:spMk id="132" creationId="{27D3C707-1451-48A0-812B-158B1992D4E7}"/>
+          </ac:spMkLst>
+        </pc:spChg>
+        <pc:spChg chg="add mod">
+          <ac:chgData name="Shengmin Leong" userId="075411cc4697ef0d" providerId="LiveId" clId="{CC3032D4-0828-4756-9212-7143605D2EB9}" dt="2018-10-01T04:33:21.322" v="537" actId="1037"/>
+          <ac:spMkLst>
+            <pc:docMk/>
+            <pc:sldMk cId="2396968029" sldId="263"/>
+            <ac:spMk id="133" creationId="{39F1FCCD-6F25-4012-87DE-CB61D0C63909}"/>
+          </ac:spMkLst>
+        </pc:spChg>
+        <pc:spChg chg="add mod">
+          <ac:chgData name="Shengmin Leong" userId="075411cc4697ef0d" providerId="LiveId" clId="{CC3032D4-0828-4756-9212-7143605D2EB9}" dt="2018-10-01T04:41:34.380" v="682" actId="1076"/>
+          <ac:spMkLst>
+            <pc:docMk/>
+            <pc:sldMk cId="2396968029" sldId="263"/>
+            <ac:spMk id="150" creationId="{37CB3289-B6F0-4BCC-A79D-2787CC6F5FC7}"/>
+          </ac:spMkLst>
+        </pc:spChg>
+        <pc:spChg chg="add mod">
+          <ac:chgData name="Shengmin Leong" userId="075411cc4697ef0d" providerId="LiveId" clId="{CC3032D4-0828-4756-9212-7143605D2EB9}" dt="2018-10-01T04:42:29.714" v="723" actId="14100"/>
+          <ac:spMkLst>
+            <pc:docMk/>
+            <pc:sldMk cId="2396968029" sldId="263"/>
+            <ac:spMk id="151" creationId="{4BB8CCFF-A934-4801-A564-4C0CE890AAEA}"/>
+          </ac:spMkLst>
+        </pc:spChg>
+        <pc:spChg chg="add mod">
+          <ac:chgData name="Shengmin Leong" userId="075411cc4697ef0d" providerId="LiveId" clId="{CC3032D4-0828-4756-9212-7143605D2EB9}" dt="2018-10-01T04:56:11.104" v="854" actId="207"/>
+          <ac:spMkLst>
+            <pc:docMk/>
+            <pc:sldMk cId="2396968029" sldId="263"/>
+            <ac:spMk id="155" creationId="{F1259AC5-BAD4-48FC-8E26-E04E075B7D59}"/>
+          </ac:spMkLst>
+        </pc:spChg>
+        <pc:spChg chg="add del mod">
+          <ac:chgData name="Shengmin Leong" userId="075411cc4697ef0d" providerId="LiveId" clId="{CC3032D4-0828-4756-9212-7143605D2EB9}" dt="2018-10-01T05:07:59.488" v="1129" actId="478"/>
+          <ac:spMkLst>
+            <pc:docMk/>
+            <pc:sldMk cId="2396968029" sldId="263"/>
+            <ac:spMk id="182" creationId="{9C258726-294C-4D2D-856F-53C2C2AC5C15}"/>
+          </ac:spMkLst>
+        </pc:spChg>
+        <pc:spChg chg="add mod">
+          <ac:chgData name="Shengmin Leong" userId="075411cc4697ef0d" providerId="LiveId" clId="{CC3032D4-0828-4756-9212-7143605D2EB9}" dt="2018-10-01T05:04:23.091" v="1063" actId="1076"/>
+          <ac:spMkLst>
+            <pc:docMk/>
+            <pc:sldMk cId="2396968029" sldId="263"/>
+            <ac:spMk id="185" creationId="{B02ACAFF-C41D-44DC-B8A8-9FC647DEA733}"/>
+          </ac:spMkLst>
+        </pc:spChg>
+        <pc:spChg chg="add mod">
+          <ac:chgData name="Shengmin Leong" userId="075411cc4697ef0d" providerId="LiveId" clId="{CC3032D4-0828-4756-9212-7143605D2EB9}" dt="2018-10-01T05:04:17.578" v="1062" actId="1038"/>
+          <ac:spMkLst>
+            <pc:docMk/>
+            <pc:sldMk cId="2396968029" sldId="263"/>
+            <ac:spMk id="188" creationId="{33156D98-CE4D-4CE3-8FA9-594C95B327B0}"/>
+          </ac:spMkLst>
+        </pc:spChg>
+        <pc:spChg chg="add mod">
+          <ac:chgData name="Shengmin Leong" userId="075411cc4697ef0d" providerId="LiveId" clId="{CC3032D4-0828-4756-9212-7143605D2EB9}" dt="2018-10-01T04:58:46.952" v="947" actId="1076"/>
+          <ac:spMkLst>
+            <pc:docMk/>
+            <pc:sldMk cId="2396968029" sldId="263"/>
+            <ac:spMk id="189" creationId="{B52DF044-2580-4806-B84E-5EB53CC7FDF6}"/>
+          </ac:spMkLst>
+        </pc:spChg>
+        <pc:spChg chg="add mod">
+          <ac:chgData name="Shengmin Leong" userId="075411cc4697ef0d" providerId="LiveId" clId="{CC3032D4-0828-4756-9212-7143605D2EB9}" dt="2018-10-01T05:03:18.807" v="1046" actId="1076"/>
+          <ac:spMkLst>
+            <pc:docMk/>
+            <pc:sldMk cId="2396968029" sldId="263"/>
+            <ac:spMk id="206" creationId="{8404FA0A-01D0-4363-BB9D-C4A7524856CE}"/>
+          </ac:spMkLst>
+        </pc:spChg>
+        <pc:spChg chg="add mod">
+          <ac:chgData name="Shengmin Leong" userId="075411cc4697ef0d" providerId="LiveId" clId="{CC3032D4-0828-4756-9212-7143605D2EB9}" dt="2018-10-01T05:04:56.135" v="1123" actId="20577"/>
+          <ac:spMkLst>
+            <pc:docMk/>
+            <pc:sldMk cId="2396968029" sldId="263"/>
+            <ac:spMk id="210" creationId="{F25BEFE1-10D3-4A97-95F1-5D49922D8BD6}"/>
+          </ac:spMkLst>
+        </pc:spChg>
+        <pc:cxnChg chg="add del mod">
+          <ac:chgData name="Shengmin Leong" userId="075411cc4697ef0d" providerId="LiveId" clId="{CC3032D4-0828-4756-9212-7143605D2EB9}" dt="2018-10-01T03:22:46.924" v="46" actId="11529"/>
+          <ac:cxnSpMkLst>
+            <pc:docMk/>
+            <pc:sldMk cId="2396968029" sldId="263"/>
+            <ac:cxnSpMk id="14" creationId="{F276A6E5-4F58-4FA0-8E63-A69AB7B5364F}"/>
+          </ac:cxnSpMkLst>
+        </pc:cxnChg>
+        <pc:cxnChg chg="mod">
+          <ac:chgData name="Shengmin Leong" userId="075411cc4697ef0d" providerId="LiveId" clId="{CC3032D4-0828-4756-9212-7143605D2EB9}" dt="2018-10-01T03:19:58.184" v="1" actId="1076"/>
+          <ac:cxnSpMkLst>
+            <pc:docMk/>
+            <pc:sldMk cId="2396968029" sldId="263"/>
+            <ac:cxnSpMk id="47" creationId="{00000000-0000-0000-0000-000000000000}"/>
+          </ac:cxnSpMkLst>
+        </pc:cxnChg>
+        <pc:cxnChg chg="mod">
+          <ac:chgData name="Shengmin Leong" userId="075411cc4697ef0d" providerId="LiveId" clId="{CC3032D4-0828-4756-9212-7143605D2EB9}" dt="2018-10-01T03:26:42.249" v="98" actId="1038"/>
+          <ac:cxnSpMkLst>
+            <pc:docMk/>
+            <pc:sldMk cId="2396968029" sldId="263"/>
+            <ac:cxnSpMk id="53" creationId="{B97967F8-618A-448B-81FD-CDFD4AF0EC64}"/>
+          </ac:cxnSpMkLst>
+        </pc:cxnChg>
+        <pc:cxnChg chg="del mod">
+          <ac:chgData name="Shengmin Leong" userId="075411cc4697ef0d" providerId="LiveId" clId="{CC3032D4-0828-4756-9212-7143605D2EB9}" dt="2018-10-01T04:50:41.177" v="819" actId="478"/>
+          <ac:cxnSpMkLst>
+            <pc:docMk/>
+            <pc:sldMk cId="2396968029" sldId="263"/>
+            <ac:cxnSpMk id="58" creationId="{00000000-0000-0000-0000-000000000000}"/>
+          </ac:cxnSpMkLst>
+        </pc:cxnChg>
+        <pc:cxnChg chg="mod">
+          <ac:chgData name="Shengmin Leong" userId="075411cc4697ef0d" providerId="LiveId" clId="{CC3032D4-0828-4756-9212-7143605D2EB9}" dt="2018-10-01T03:25:36.179" v="72" actId="1076"/>
+          <ac:cxnSpMkLst>
+            <pc:docMk/>
+            <pc:sldMk cId="2396968029" sldId="263"/>
+            <ac:cxnSpMk id="60" creationId="{00000000-0000-0000-0000-000000000000}"/>
+          </ac:cxnSpMkLst>
+        </pc:cxnChg>
+        <pc:cxnChg chg="mod">
+          <ac:chgData name="Shengmin Leong" userId="075411cc4697ef0d" providerId="LiveId" clId="{CC3032D4-0828-4756-9212-7143605D2EB9}" dt="2018-10-01T04:46:03.066" v="758" actId="1076"/>
+          <ac:cxnSpMkLst>
+            <pc:docMk/>
+            <pc:sldMk cId="2396968029" sldId="263"/>
+            <ac:cxnSpMk id="64" creationId="{00000000-0000-0000-0000-000000000000}"/>
+          </ac:cxnSpMkLst>
+        </pc:cxnChg>
+        <pc:cxnChg chg="add mod">
+          <ac:chgData name="Shengmin Leong" userId="075411cc4697ef0d" providerId="LiveId" clId="{CC3032D4-0828-4756-9212-7143605D2EB9}" dt="2018-10-01T03:24:21.773" v="55" actId="1076"/>
+          <ac:cxnSpMkLst>
+            <pc:docMk/>
+            <pc:sldMk cId="2396968029" sldId="263"/>
+            <ac:cxnSpMk id="67" creationId="{A36B6FA4-B0C5-457E-A5AA-242DB847DB70}"/>
+          </ac:cxnSpMkLst>
+        </pc:cxnChg>
+        <pc:cxnChg chg="mod">
+          <ac:chgData name="Shengmin Leong" userId="075411cc4697ef0d" providerId="LiveId" clId="{CC3032D4-0828-4756-9212-7143605D2EB9}" dt="2018-10-01T04:29:15.290" v="283" actId="1076"/>
+          <ac:cxnSpMkLst>
+            <pc:docMk/>
+            <pc:sldMk cId="2396968029" sldId="263"/>
+            <ac:cxnSpMk id="69" creationId="{00000000-0000-0000-0000-000000000000}"/>
+          </ac:cxnSpMkLst>
+        </pc:cxnChg>
+        <pc:cxnChg chg="mod">
+          <ac:chgData name="Shengmin Leong" userId="075411cc4697ef0d" providerId="LiveId" clId="{CC3032D4-0828-4756-9212-7143605D2EB9}" dt="2018-10-01T03:26:53.236" v="99" actId="14100"/>
+          <ac:cxnSpMkLst>
+            <pc:docMk/>
+            <pc:sldMk cId="2396968029" sldId="263"/>
+            <ac:cxnSpMk id="79" creationId="{00000000-0000-0000-0000-000000000000}"/>
+          </ac:cxnSpMkLst>
+        </pc:cxnChg>
+        <pc:cxnChg chg="mod">
+          <ac:chgData name="Shengmin Leong" userId="075411cc4697ef0d" providerId="LiveId" clId="{CC3032D4-0828-4756-9212-7143605D2EB9}" dt="2018-10-01T05:03:41.130" v="1047" actId="14100"/>
+          <ac:cxnSpMkLst>
+            <pc:docMk/>
+            <pc:sldMk cId="2396968029" sldId="263"/>
+            <ac:cxnSpMk id="81" creationId="{00000000-0000-0000-0000-000000000000}"/>
+          </ac:cxnSpMkLst>
+        </pc:cxnChg>
+        <pc:cxnChg chg="mod">
+          <ac:chgData name="Shengmin Leong" userId="075411cc4697ef0d" providerId="LiveId" clId="{CC3032D4-0828-4756-9212-7143605D2EB9}" dt="2018-10-01T03:26:42.249" v="98" actId="1038"/>
+          <ac:cxnSpMkLst>
+            <pc:docMk/>
+            <pc:sldMk cId="2396968029" sldId="263"/>
+            <ac:cxnSpMk id="84" creationId="{00000000-0000-0000-0000-000000000000}"/>
+          </ac:cxnSpMkLst>
+        </pc:cxnChg>
+        <pc:cxnChg chg="mod">
+          <ac:chgData name="Shengmin Leong" userId="075411cc4697ef0d" providerId="LiveId" clId="{CC3032D4-0828-4756-9212-7143605D2EB9}" dt="2018-10-01T03:26:42.249" v="98" actId="1038"/>
+          <ac:cxnSpMkLst>
+            <pc:docMk/>
+            <pc:sldMk cId="2396968029" sldId="263"/>
+            <ac:cxnSpMk id="86" creationId="{00000000-0000-0000-0000-000000000000}"/>
+          </ac:cxnSpMkLst>
+        </pc:cxnChg>
+        <pc:cxnChg chg="add del mod">
+          <ac:chgData name="Shengmin Leong" userId="075411cc4697ef0d" providerId="LiveId" clId="{CC3032D4-0828-4756-9212-7143605D2EB9}" dt="2018-10-01T04:29:01.514" v="245" actId="478"/>
+          <ac:cxnSpMkLst>
+            <pc:docMk/>
+            <pc:sldMk cId="2396968029" sldId="263"/>
+            <ac:cxnSpMk id="88" creationId="{B139AC2E-4D75-4594-B30C-D03BD83CAD5C}"/>
+          </ac:cxnSpMkLst>
+        </pc:cxnChg>
+        <pc:cxnChg chg="mod">
+          <ac:chgData name="Shengmin Leong" userId="075411cc4697ef0d" providerId="LiveId" clId="{CC3032D4-0828-4756-9212-7143605D2EB9}" dt="2018-10-01T03:29:36.382" v="127" actId="14100"/>
+          <ac:cxnSpMkLst>
+            <pc:docMk/>
+            <pc:sldMk cId="2396968029" sldId="263"/>
+            <ac:cxnSpMk id="97" creationId="{00000000-0000-0000-0000-000000000000}"/>
+          </ac:cxnSpMkLst>
+        </pc:cxnChg>
+        <pc:cxnChg chg="mod">
+          <ac:chgData name="Shengmin Leong" userId="075411cc4697ef0d" providerId="LiveId" clId="{CC3032D4-0828-4756-9212-7143605D2EB9}" dt="2018-10-01T04:57:27.246" v="913" actId="1076"/>
+          <ac:cxnSpMkLst>
+            <pc:docMk/>
+            <pc:sldMk cId="2396968029" sldId="263"/>
+            <ac:cxnSpMk id="107" creationId="{00000000-0000-0000-0000-000000000000}"/>
+          </ac:cxnSpMkLst>
+        </pc:cxnChg>
+        <pc:cxnChg chg="add del mod">
+          <ac:chgData name="Shengmin Leong" userId="075411cc4697ef0d" providerId="LiveId" clId="{CC3032D4-0828-4756-9212-7143605D2EB9}" dt="2018-10-01T03:31:04.090" v="137"/>
+          <ac:cxnSpMkLst>
+            <pc:docMk/>
+            <pc:sldMk cId="2396968029" sldId="263"/>
+            <ac:cxnSpMk id="110" creationId="{272D07CD-F73E-4202-8ED6-ABE8D927F4F7}"/>
+          </ac:cxnSpMkLst>
+        </pc:cxnChg>
+        <pc:cxnChg chg="add mod ord">
+          <ac:chgData name="Shengmin Leong" userId="075411cc4697ef0d" providerId="LiveId" clId="{CC3032D4-0828-4756-9212-7143605D2EB9}" dt="2018-10-01T04:45:08.592" v="754" actId="1076"/>
+          <ac:cxnSpMkLst>
+            <pc:docMk/>
+            <pc:sldMk cId="2396968029" sldId="263"/>
+            <ac:cxnSpMk id="113" creationId="{83BB9E20-B28A-4410-8557-5E2EAB264CD1}"/>
+          </ac:cxnSpMkLst>
+        </pc:cxnChg>
+        <pc:cxnChg chg="add mod">
+          <ac:chgData name="Shengmin Leong" userId="075411cc4697ef0d" providerId="LiveId" clId="{CC3032D4-0828-4756-9212-7143605D2EB9}" dt="2018-10-01T04:33:30.653" v="538" actId="14100"/>
+          <ac:cxnSpMkLst>
+            <pc:docMk/>
+            <pc:sldMk cId="2396968029" sldId="263"/>
+            <ac:cxnSpMk id="121" creationId="{6FB528F8-969B-4B8F-8A8E-941418D6DAE7}"/>
+          </ac:cxnSpMkLst>
+        </pc:cxnChg>
+        <pc:cxnChg chg="add mod">
+          <ac:chgData name="Shengmin Leong" userId="075411cc4697ef0d" providerId="LiveId" clId="{CC3032D4-0828-4756-9212-7143605D2EB9}" dt="2018-10-01T04:47:05.517" v="770" actId="14100"/>
+          <ac:cxnSpMkLst>
+            <pc:docMk/>
+            <pc:sldMk cId="2396968029" sldId="263"/>
+            <ac:cxnSpMk id="126" creationId="{0605F226-205E-4044-818A-EE7BC6E35A20}"/>
+          </ac:cxnSpMkLst>
+        </pc:cxnChg>
+        <pc:cxnChg chg="add mod">
+          <ac:chgData name="Shengmin Leong" userId="075411cc4697ef0d" providerId="LiveId" clId="{CC3032D4-0828-4756-9212-7143605D2EB9}" dt="2018-10-01T04:45:02.288" v="753" actId="1076"/>
+          <ac:cxnSpMkLst>
+            <pc:docMk/>
+            <pc:sldMk cId="2396968029" sldId="263"/>
+            <ac:cxnSpMk id="147" creationId="{3972BE1B-2F47-4F76-8A91-7AFF1410B553}"/>
+          </ac:cxnSpMkLst>
+        </pc:cxnChg>
+        <pc:cxnChg chg="add mod">
+          <ac:chgData name="Shengmin Leong" userId="075411cc4697ef0d" providerId="LiveId" clId="{CC3032D4-0828-4756-9212-7143605D2EB9}" dt="2018-10-01T05:04:23.091" v="1063" actId="1076"/>
+          <ac:cxnSpMkLst>
+            <pc:docMk/>
+            <pc:sldMk cId="2396968029" sldId="263"/>
+            <ac:cxnSpMk id="156" creationId="{0C0C2313-9732-430D-90E5-2CABB627099D}"/>
+          </ac:cxnSpMkLst>
+        </pc:cxnChg>
+        <pc:cxnChg chg="add mod">
+          <ac:chgData name="Shengmin Leong" userId="075411cc4697ef0d" providerId="LiveId" clId="{CC3032D4-0828-4756-9212-7143605D2EB9}" dt="2018-10-01T04:51:29.564" v="825" actId="1582"/>
+          <ac:cxnSpMkLst>
+            <pc:docMk/>
+            <pc:sldMk cId="2396968029" sldId="263"/>
+            <ac:cxnSpMk id="176" creationId="{E41A1B6F-26D0-484A-950A-09FDC007C73B}"/>
+          </ac:cxnSpMkLst>
+        </pc:cxnChg>
+        <pc:cxnChg chg="add del mod">
+          <ac:chgData name="Shengmin Leong" userId="075411cc4697ef0d" providerId="LiveId" clId="{CC3032D4-0828-4756-9212-7143605D2EB9}" dt="2018-10-01T05:07:54.971" v="1128" actId="478"/>
+          <ac:cxnSpMkLst>
+            <pc:docMk/>
+            <pc:sldMk cId="2396968029" sldId="263"/>
+            <ac:cxnSpMk id="180" creationId="{43631884-7983-4B5C-BA16-F10A4CF159D8}"/>
+          </ac:cxnSpMkLst>
+        </pc:cxnChg>
+        <pc:cxnChg chg="add mod">
+          <ac:chgData name="Shengmin Leong" userId="075411cc4697ef0d" providerId="LiveId" clId="{CC3032D4-0828-4756-9212-7143605D2EB9}" dt="2018-10-01T05:04:17.578" v="1062" actId="1038"/>
+          <ac:cxnSpMkLst>
+            <pc:docMk/>
+            <pc:sldMk cId="2396968029" sldId="263"/>
+            <ac:cxnSpMk id="190" creationId="{83CFC997-08BA-4C57-A0A0-D8F253BB2C54}"/>
+          </ac:cxnSpMkLst>
+        </pc:cxnChg>
+      </pc:sldChg>
+    </pc:docChg>
+  </pc:docChgLst>
+</pc:chgInfo>
+</file>
+
 <file path=ppt/notesMasters/notesMaster1.xml><?xml version="1.0" encoding="utf-8"?>
 <p:notesMaster xmlns:a="http://schemas.openxmlformats.org/drawingml/2006/main" xmlns:r="http://schemas.openxmlformats.org/officeDocument/2006/relationships" xmlns:p="http://schemas.openxmlformats.org/presentationml/2006/main">
   <p:cSld>
@@ -208,7 +741,7 @@
           <a:p>
             <a:fld id="{F5CC4B3F-88C1-4FFA-B1B6-F41C21DC6924}" type="datetimeFigureOut">
               <a:rPr lang="en-US" smtClean="0"/>
-              <a:t>25-Sep-18</a:t>
+              <a:t>10/1/2018</a:t>
             </a:fld>
             <a:endParaRPr lang="en-US"/>
           </a:p>
@@ -654,7 +1187,7 @@
           <a:p>
             <a:fld id="{78C97017-6FC3-485B-9764-EAC9E56C1D49}" type="datetimeFigureOut">
               <a:rPr lang="en-US" smtClean="0"/>
-              <a:t>25-Sep-18</a:t>
+              <a:t>10/1/2018</a:t>
             </a:fld>
             <a:endParaRPr lang="en-US"/>
           </a:p>
@@ -822,7 +1355,7 @@
           <a:p>
             <a:fld id="{78C97017-6FC3-485B-9764-EAC9E56C1D49}" type="datetimeFigureOut">
               <a:rPr lang="en-US" smtClean="0"/>
-              <a:t>25-Sep-18</a:t>
+              <a:t>10/1/2018</a:t>
             </a:fld>
             <a:endParaRPr lang="en-US"/>
           </a:p>
@@ -1000,7 +1533,7 @@
           <a:p>
             <a:fld id="{78C97017-6FC3-485B-9764-EAC9E56C1D49}" type="datetimeFigureOut">
               <a:rPr lang="en-US" smtClean="0"/>
-              <a:t>25-Sep-18</a:t>
+              <a:t>10/1/2018</a:t>
             </a:fld>
             <a:endParaRPr lang="en-US"/>
           </a:p>
@@ -1168,7 +1701,7 @@
           <a:p>
             <a:fld id="{78C97017-6FC3-485B-9764-EAC9E56C1D49}" type="datetimeFigureOut">
               <a:rPr lang="en-US" smtClean="0"/>
-              <a:t>25-Sep-18</a:t>
+              <a:t>10/1/2018</a:t>
             </a:fld>
             <a:endParaRPr lang="en-US"/>
           </a:p>
@@ -1413,7 +1946,7 @@
           <a:p>
             <a:fld id="{78C97017-6FC3-485B-9764-EAC9E56C1D49}" type="datetimeFigureOut">
               <a:rPr lang="en-US" smtClean="0"/>
-              <a:t>25-Sep-18</a:t>
+              <a:t>10/1/2018</a:t>
             </a:fld>
             <a:endParaRPr lang="en-US"/>
           </a:p>
@@ -1698,7 +2231,7 @@
           <a:p>
             <a:fld id="{78C97017-6FC3-485B-9764-EAC9E56C1D49}" type="datetimeFigureOut">
               <a:rPr lang="en-US" smtClean="0"/>
-              <a:t>25-Sep-18</a:t>
+              <a:t>10/1/2018</a:t>
             </a:fld>
             <a:endParaRPr lang="en-US"/>
           </a:p>
@@ -2117,7 +2650,7 @@
           <a:p>
             <a:fld id="{78C97017-6FC3-485B-9764-EAC9E56C1D49}" type="datetimeFigureOut">
               <a:rPr lang="en-US" smtClean="0"/>
-              <a:t>25-Sep-18</a:t>
+              <a:t>10/1/2018</a:t>
             </a:fld>
             <a:endParaRPr lang="en-US"/>
           </a:p>
@@ -2234,7 +2767,7 @@
           <a:p>
             <a:fld id="{78C97017-6FC3-485B-9764-EAC9E56C1D49}" type="datetimeFigureOut">
               <a:rPr lang="en-US" smtClean="0"/>
-              <a:t>25-Sep-18</a:t>
+              <a:t>10/1/2018</a:t>
             </a:fld>
             <a:endParaRPr lang="en-US"/>
           </a:p>
@@ -2329,7 +2862,7 @@
           <a:p>
             <a:fld id="{78C97017-6FC3-485B-9764-EAC9E56C1D49}" type="datetimeFigureOut">
               <a:rPr lang="en-US" smtClean="0"/>
-              <a:t>25-Sep-18</a:t>
+              <a:t>10/1/2018</a:t>
             </a:fld>
             <a:endParaRPr lang="en-US"/>
           </a:p>
@@ -2604,7 +3137,7 @@
           <a:p>
             <a:fld id="{78C97017-6FC3-485B-9764-EAC9E56C1D49}" type="datetimeFigureOut">
               <a:rPr lang="en-US" smtClean="0"/>
-              <a:t>25-Sep-18</a:t>
+              <a:t>10/1/2018</a:t>
             </a:fld>
             <a:endParaRPr lang="en-US"/>
           </a:p>
@@ -2856,7 +3389,7 @@
           <a:p>
             <a:fld id="{78C97017-6FC3-485B-9764-EAC9E56C1D49}" type="datetimeFigureOut">
               <a:rPr lang="en-US" smtClean="0"/>
-              <a:t>25-Sep-18</a:t>
+              <a:t>10/1/2018</a:t>
             </a:fld>
             <a:endParaRPr lang="en-US"/>
           </a:p>
@@ -3067,7 +3600,7 @@
           <a:p>
             <a:fld id="{78C97017-6FC3-485B-9764-EAC9E56C1D49}" type="datetimeFigureOut">
               <a:rPr lang="en-US" smtClean="0"/>
-              <a:t>25-Sep-18</a:t>
+              <a:t>10/1/2018</a:t>
             </a:fld>
             <a:endParaRPr lang="en-US"/>
           </a:p>
@@ -3450,8 +3983,8 @@
         </p:nvSpPr>
         <p:spPr>
           <a:xfrm>
-            <a:off x="1119865" y="1600200"/>
-            <a:ext cx="7490735" cy="3124200"/>
+            <a:off x="1080770" y="1203694"/>
+            <a:ext cx="7758430" cy="3506496"/>
           </a:xfrm>
           <a:prstGeom prst="roundRect">
             <a:avLst>
@@ -3511,7 +4044,7 @@
         </p:nvSpPr>
         <p:spPr>
           <a:xfrm>
-            <a:off x="2877180" y="3463240"/>
+            <a:off x="3416472" y="4248629"/>
             <a:ext cx="1093635" cy="346760"/>
           </a:xfrm>
           <a:prstGeom prst="rect">
@@ -3626,19 +4159,17 @@
           <p:cNvPr id="107" name="Elbow Connector 106"/>
           <p:cNvCxnSpPr>
             <a:cxnSpLocks/>
-            <a:stCxn id="9" idx="1"/>
-            <a:endCxn id="62" idx="2"/>
           </p:cNvCxnSpPr>
           <p:nvPr/>
         </p:nvCxnSpPr>
         <p:spPr>
           <a:xfrm rot="5400000" flipH="1" flipV="1">
-            <a:off x="4131507" y="1281685"/>
-            <a:ext cx="613122" cy="4459404"/>
+            <a:off x="4014225" y="1193013"/>
+            <a:ext cx="819082" cy="4430787"/>
           </a:xfrm>
           <a:prstGeom prst="bentConnector3">
             <a:avLst>
-              <a:gd name="adj1" fmla="val -26668"/>
+              <a:gd name="adj1" fmla="val 17683"/>
             </a:avLst>
           </a:prstGeom>
           <a:ln w="19050">
@@ -3783,47 +4314,6 @@
           </a:p>
         </p:txBody>
       </p:sp>
-      <p:cxnSp>
-        <p:nvCxnSpPr>
-          <p:cNvPr id="58" name="Straight Arrow Connector 57"/>
-          <p:cNvCxnSpPr>
-            <a:stCxn id="42" idx="3"/>
-            <a:endCxn id="2" idx="1"/>
-          </p:cNvCxnSpPr>
-          <p:nvPr/>
-        </p:nvCxnSpPr>
-        <p:spPr>
-          <a:xfrm>
-            <a:off x="2609828" y="3636620"/>
-            <a:ext cx="267352" cy="0"/>
-          </a:xfrm>
-          <a:prstGeom prst="straightConnector1">
-            <a:avLst/>
-          </a:prstGeom>
-          <a:ln w="19050">
-            <a:solidFill>
-              <a:srgbClr val="7030A0"/>
-            </a:solidFill>
-            <a:headEnd type="none" w="med" len="med"/>
-            <a:tailEnd type="arrow" w="med" len="med"/>
-          </a:ln>
-          <a:effectLst/>
-        </p:spPr>
-        <p:style>
-          <a:lnRef idx="1">
-            <a:schemeClr val="accent2"/>
-          </a:lnRef>
-          <a:fillRef idx="2">
-            <a:schemeClr val="accent2"/>
-          </a:fillRef>
-          <a:effectRef idx="1">
-            <a:schemeClr val="accent2"/>
-          </a:effectRef>
-          <a:fontRef idx="minor">
-            <a:schemeClr val="dk1"/>
-          </a:fontRef>
-        </p:style>
-      </p:cxnSp>
       <p:cxnSp>
         <p:nvCxnSpPr>
           <p:cNvPr id="75" name="Elbow Connector 122"/>
@@ -3916,7 +4406,7 @@
         </p:nvSpPr>
         <p:spPr>
           <a:xfrm>
-            <a:off x="2373780" y="3549930"/>
+            <a:off x="2366135" y="3629020"/>
             <a:ext cx="236048" cy="173380"/>
           </a:xfrm>
           <a:prstGeom prst="flowChartDecision">
@@ -3953,62 +4443,6 @@
           </a:p>
         </p:txBody>
       </p:sp>
-      <p:sp>
-        <p:nvSpPr>
-          <p:cNvPr id="46" name="Rectangle 8"/>
-          <p:cNvSpPr/>
-          <p:nvPr/>
-        </p:nvSpPr>
-        <p:spPr>
-          <a:xfrm>
-            <a:off x="2825280" y="2846162"/>
-            <a:ext cx="1490560" cy="334856"/>
-          </a:xfrm>
-          <a:prstGeom prst="rect">
-            <a:avLst/>
-          </a:prstGeom>
-          <a:ln w="19050">
-            <a:solidFill>
-              <a:srgbClr val="7030A0"/>
-            </a:solidFill>
-          </a:ln>
-          <a:effectLst/>
-        </p:spPr>
-        <p:style>
-          <a:lnRef idx="1">
-            <a:schemeClr val="accent4"/>
-          </a:lnRef>
-          <a:fillRef idx="2">
-            <a:schemeClr val="accent4"/>
-          </a:fillRef>
-          <a:effectRef idx="1">
-            <a:schemeClr val="accent4"/>
-          </a:effectRef>
-          <a:fontRef idx="minor">
-            <a:schemeClr val="dk1"/>
-          </a:fontRef>
-        </p:style>
-        <p:txBody>
-          <a:bodyPr rtlCol="0" anchor="ctr"/>
-          <a:lstStyle/>
-          <a:p>
-            <a:pPr algn="ctr"/>
-            <a:r>
-              <a:rPr lang="en-US" sz="1050" dirty="0" err="1">
-                <a:solidFill>
-                  <a:srgbClr val="7030A0"/>
-                </a:solidFill>
-              </a:rPr>
-              <a:t>VersionedWishBook</a:t>
-            </a:r>
-            <a:endParaRPr lang="en-SG" sz="1050" dirty="0">
-              <a:solidFill>
-                <a:srgbClr val="7030A0"/>
-              </a:solidFill>
-            </a:endParaRPr>
-          </a:p>
-        </p:txBody>
-      </p:sp>
       <p:cxnSp>
         <p:nvCxnSpPr>
           <p:cNvPr id="47" name="Straight Arrow Connector 46"/>
@@ -4020,8 +4454,8 @@
         </p:nvCxnSpPr>
         <p:spPr>
           <a:xfrm>
-            <a:off x="2624360" y="3003033"/>
-            <a:ext cx="200920" cy="10557"/>
+            <a:off x="2642588" y="2825486"/>
+            <a:ext cx="237678" cy="2119"/>
           </a:xfrm>
           <a:prstGeom prst="straightConnector1">
             <a:avLst/>
@@ -4058,7 +4492,7 @@
         </p:nvSpPr>
         <p:spPr>
           <a:xfrm>
-            <a:off x="2388312" y="2916343"/>
+            <a:off x="2406540" y="2738796"/>
             <a:ext cx="236048" cy="173380"/>
           </a:xfrm>
           <a:prstGeom prst="flowChartDecision">
@@ -4103,7 +4537,7 @@
         </p:nvSpPr>
         <p:spPr>
           <a:xfrm>
-            <a:off x="4692650" y="2846162"/>
+            <a:off x="4733355" y="2644354"/>
             <a:ext cx="1156969" cy="346760"/>
           </a:xfrm>
           <a:prstGeom prst="rect">
@@ -4159,7 +4593,7 @@
         </p:nvSpPr>
         <p:spPr>
           <a:xfrm>
-            <a:off x="4324972" y="2920532"/>
+            <a:off x="4332828" y="2731044"/>
             <a:ext cx="236048" cy="173380"/>
           </a:xfrm>
           <a:prstGeom prst="flowChartDecision">
@@ -4206,7 +4640,7 @@
         </p:nvSpPr>
         <p:spPr>
           <a:xfrm>
-            <a:off x="6313677" y="2858066"/>
+            <a:off x="6299271" y="2652105"/>
             <a:ext cx="708186" cy="346760"/>
           </a:xfrm>
           <a:prstGeom prst="rect">
@@ -4262,7 +4696,7 @@
         </p:nvSpPr>
         <p:spPr>
           <a:xfrm>
-            <a:off x="5858751" y="2941676"/>
+            <a:off x="5858751" y="2743200"/>
             <a:ext cx="236048" cy="173380"/>
           </a:xfrm>
           <a:prstGeom prst="flowChartDecision">
@@ -4309,9 +4743,9 @@
           <p:nvPr/>
         </p:nvCxnSpPr>
         <p:spPr>
-          <a:xfrm>
-            <a:off x="6094799" y="3028366"/>
-            <a:ext cx="218878" cy="3080"/>
+          <a:xfrm flipV="1">
+            <a:off x="6094799" y="2825485"/>
+            <a:ext cx="204472" cy="4405"/>
           </a:xfrm>
           <a:prstGeom prst="bentConnector3">
             <a:avLst/>
@@ -4404,7 +4838,7 @@
         </p:nvSpPr>
         <p:spPr>
           <a:xfrm>
-            <a:off x="7041947" y="2948201"/>
+            <a:off x="7002952" y="2743200"/>
             <a:ext cx="236048" cy="173380"/>
           </a:xfrm>
           <a:prstGeom prst="flowChartDecision">
@@ -4452,9 +4886,9 @@
           <p:nvPr/>
         </p:nvCxnSpPr>
         <p:spPr>
-          <a:xfrm flipV="1">
-            <a:off x="7277995" y="2706821"/>
-            <a:ext cx="434402" cy="327761"/>
+          <a:xfrm>
+            <a:off x="7466243" y="2704738"/>
+            <a:ext cx="246154" cy="2084"/>
           </a:xfrm>
           <a:prstGeom prst="bentConnector3">
             <a:avLst/>
@@ -4492,7 +4926,7 @@
         <p:spPr>
           <a:xfrm>
             <a:off x="7712397" y="2887216"/>
-            <a:ext cx="708186" cy="285783"/>
+            <a:ext cx="974490" cy="285783"/>
           </a:xfrm>
           <a:prstGeom prst="rect">
             <a:avLst/>
@@ -4543,15 +4977,16 @@
         <p:nvCxnSpPr>
           <p:cNvPr id="81" name="Elbow Connector 80"/>
           <p:cNvCxnSpPr>
+            <a:cxnSpLocks/>
             <a:stCxn id="78" idx="3"/>
             <a:endCxn id="80" idx="1"/>
           </p:cNvCxnSpPr>
           <p:nvPr/>
         </p:nvCxnSpPr>
         <p:spPr>
-          <a:xfrm flipV="1">
-            <a:off x="7277995" y="3030108"/>
-            <a:ext cx="434402" cy="4783"/>
+          <a:xfrm>
+            <a:off x="7239000" y="2829890"/>
+            <a:ext cx="473397" cy="200218"/>
           </a:xfrm>
           <a:prstGeom prst="bentConnector3">
             <a:avLst/>
@@ -4621,18 +5056,13 @@
           <a:p>
             <a:pPr algn="ctr"/>
             <a:r>
-              <a:rPr lang="en-US" sz="1050" dirty="0">
+              <a:rPr lang="en-SG" sz="1050" dirty="0">
                 <a:solidFill>
                   <a:srgbClr val="7030A0"/>
                 </a:solidFill>
               </a:rPr>
-              <a:t>Cost</a:t>
-            </a:r>
-            <a:endParaRPr lang="en-SG" sz="1050" dirty="0">
-              <a:solidFill>
-                <a:srgbClr val="7030A0"/>
-              </a:solidFill>
-            </a:endParaRPr>
+              <a:t>Price</a:t>
+            </a:r>
           </a:p>
         </p:txBody>
       </p:sp>
@@ -4647,8 +5077,8 @@
         </p:nvCxnSpPr>
         <p:spPr>
           <a:xfrm>
-            <a:off x="7277995" y="3034891"/>
-            <a:ext cx="434402" cy="318195"/>
+            <a:off x="7239000" y="2829890"/>
+            <a:ext cx="473397" cy="523196"/>
           </a:xfrm>
           <a:prstGeom prst="bentConnector3">
             <a:avLst/>
@@ -4744,8 +5174,8 @@
         </p:nvCxnSpPr>
         <p:spPr>
           <a:xfrm>
-            <a:off x="7277995" y="3034891"/>
-            <a:ext cx="434402" cy="641172"/>
+            <a:off x="7239000" y="2829890"/>
+            <a:ext cx="473397" cy="846173"/>
           </a:xfrm>
           <a:prstGeom prst="bentConnector3">
             <a:avLst/>
@@ -4778,14 +5208,15 @@
         <p:nvCxnSpPr>
           <p:cNvPr id="97" name="Elbow Connector 63"/>
           <p:cNvCxnSpPr>
+            <a:cxnSpLocks/>
             <a:stCxn id="99" idx="3"/>
           </p:cNvCxnSpPr>
           <p:nvPr/>
         </p:nvCxnSpPr>
         <p:spPr>
-          <a:xfrm rot="5400000">
-            <a:off x="3553611" y="2687559"/>
-            <a:ext cx="293825" cy="5938"/>
+          <a:xfrm rot="16200000" flipH="1">
+            <a:off x="3558296" y="2592927"/>
+            <a:ext cx="134498" cy="2"/>
           </a:xfrm>
           <a:prstGeom prst="bentConnector3">
             <a:avLst>
@@ -4825,7 +5256,7 @@
         </p:nvSpPr>
         <p:spPr>
           <a:xfrm rot="10800000" flipV="1">
-            <a:off x="3562299" y="2386554"/>
+            <a:off x="3484351" y="2368617"/>
             <a:ext cx="282387" cy="157062"/>
           </a:xfrm>
           <a:prstGeom prst="triangle">
@@ -4943,8 +5374,8 @@
           <p:nvPr/>
         </p:nvSpPr>
         <p:spPr>
-          <a:xfrm rot="16200000">
-            <a:off x="6362886" y="3586305"/>
+          <a:xfrm>
+            <a:off x="5638800" y="3472190"/>
             <a:ext cx="881018" cy="261610"/>
           </a:xfrm>
           <a:prstGeom prst="rect">
@@ -5135,7 +5566,7 @@
         </p:nvSpPr>
         <p:spPr>
           <a:xfrm>
-            <a:off x="6135256" y="3097917"/>
+            <a:off x="6160278" y="2667000"/>
             <a:ext cx="189257" cy="178683"/>
           </a:xfrm>
           <a:prstGeom prst="rect">
@@ -5174,7 +5605,7 @@
         </p:nvSpPr>
         <p:spPr>
           <a:xfrm>
-            <a:off x="2573394" y="2756715"/>
+            <a:off x="2573090" y="2819400"/>
             <a:ext cx="170110" cy="137542"/>
           </a:xfrm>
           <a:prstGeom prst="rect">
@@ -5213,7 +5644,7 @@
         </p:nvSpPr>
         <p:spPr>
           <a:xfrm>
-            <a:off x="2707070" y="3667737"/>
+            <a:off x="2566807" y="3705838"/>
             <a:ext cx="189257" cy="178683"/>
           </a:xfrm>
           <a:prstGeom prst="rect">
@@ -5252,7 +5683,7 @@
         </p:nvSpPr>
         <p:spPr>
           <a:xfrm>
-            <a:off x="6449896" y="3204826"/>
+            <a:off x="6437349" y="3032678"/>
             <a:ext cx="189257" cy="178683"/>
           </a:xfrm>
           <a:prstGeom prst="rect">
@@ -5363,8 +5794,8 @@
         </p:nvCxnSpPr>
         <p:spPr>
           <a:xfrm flipV="1">
-            <a:off x="7277995" y="2371709"/>
-            <a:ext cx="434402" cy="663182"/>
+            <a:off x="7239000" y="2371709"/>
+            <a:ext cx="473397" cy="458181"/>
           </a:xfrm>
           <a:prstGeom prst="bentConnector3">
             <a:avLst>
@@ -5440,75 +5871,20 @@
           </a:p>
         </p:txBody>
       </p:sp>
-      <p:sp>
-        <p:nvSpPr>
-          <p:cNvPr id="55" name="Rectangle 8"/>
-          <p:cNvSpPr/>
-          <p:nvPr/>
-        </p:nvSpPr>
-        <p:spPr>
-          <a:xfrm>
-            <a:off x="3170181" y="1998350"/>
-            <a:ext cx="1060683" cy="364396"/>
-          </a:xfrm>
-          <a:prstGeom prst="rect">
-            <a:avLst/>
-          </a:prstGeom>
-          <a:ln w="19050">
-            <a:solidFill>
-              <a:srgbClr val="7030A0"/>
-            </a:solidFill>
-          </a:ln>
-          <a:effectLst/>
-        </p:spPr>
-        <p:style>
-          <a:lnRef idx="1">
-            <a:schemeClr val="accent4"/>
-          </a:lnRef>
-          <a:fillRef idx="2">
-            <a:schemeClr val="accent4"/>
-          </a:fillRef>
-          <a:effectRef idx="1">
-            <a:schemeClr val="accent4"/>
-          </a:effectRef>
-          <a:fontRef idx="minor">
-            <a:schemeClr val="dk1"/>
-          </a:fontRef>
-        </p:style>
-        <p:txBody>
-          <a:bodyPr rtlCol="0" anchor="ctr"/>
-          <a:lstStyle/>
-          <a:p>
-            <a:pPr algn="ctr"/>
-            <a:r>
-              <a:rPr lang="en-SG" sz="1050" dirty="0" err="1">
-                <a:solidFill>
-                  <a:srgbClr val="7030A0"/>
-                </a:solidFill>
-              </a:rPr>
-              <a:t>WishBook</a:t>
-            </a:r>
-            <a:endParaRPr lang="en-SG" sz="1050" dirty="0">
-              <a:solidFill>
-                <a:srgbClr val="7030A0"/>
-              </a:solidFill>
-            </a:endParaRPr>
-          </a:p>
-        </p:txBody>
-      </p:sp>
       <p:cxnSp>
         <p:nvCxnSpPr>
           <p:cNvPr id="60" name="Straight Arrow Connector 59"/>
           <p:cNvCxnSpPr>
-            <a:stCxn id="51" idx="1"/>
+            <a:cxnSpLocks/>
+            <a:stCxn id="46" idx="3"/>
             <a:endCxn id="49" idx="1"/>
           </p:cNvCxnSpPr>
           <p:nvPr/>
         </p:nvCxnSpPr>
         <p:spPr>
-          <a:xfrm>
-            <a:off x="4324972" y="3007222"/>
-            <a:ext cx="367678" cy="12320"/>
+          <a:xfrm flipV="1">
+            <a:off x="4370826" y="2817734"/>
+            <a:ext cx="362529" cy="9871"/>
           </a:xfrm>
           <a:prstGeom prst="straightConnector1">
             <a:avLst/>
@@ -5545,7 +5921,7 @@
         </p:nvSpPr>
         <p:spPr>
           <a:xfrm rot="16200000">
-            <a:off x="2669073" y="2069158"/>
+            <a:off x="2669074" y="2069158"/>
             <a:ext cx="271014" cy="187417"/>
           </a:xfrm>
           <a:prstGeom prst="triangle">
@@ -5591,17 +5967,24 @@
       </p:sp>
       <p:cxnSp>
         <p:nvCxnSpPr>
-          <p:cNvPr id="69" name="Elbow Connector 63"/>
+          <p:cNvPr id="113" name="Elbow Connector 63">
+            <a:extLst>
+              <a:ext uri="{FF2B5EF4-FFF2-40B4-BE49-F238E27FC236}">
+                <a16:creationId xmlns:a16="http://schemas.microsoft.com/office/drawing/2014/main" id="{83BB9E20-B28A-4410-8557-5E2EAB264CD1}"/>
+              </a:ext>
+            </a:extLst>
+          </p:cNvPr>
           <p:cNvCxnSpPr>
-            <a:stCxn id="68" idx="3"/>
-            <a:endCxn id="55" idx="1"/>
+            <a:cxnSpLocks/>
+            <a:stCxn id="56" idx="0"/>
+            <a:endCxn id="115" idx="3"/>
           </p:cNvCxnSpPr>
           <p:nvPr/>
         </p:nvCxnSpPr>
         <p:spPr>
-          <a:xfrm>
-            <a:off x="2898289" y="2177727"/>
-            <a:ext cx="271892" cy="2821"/>
+          <a:xfrm rot="16200000" flipV="1">
+            <a:off x="3088710" y="2457895"/>
+            <a:ext cx="1246900" cy="731"/>
           </a:xfrm>
           <a:prstGeom prst="bentConnector3">
             <a:avLst>
@@ -5633,6 +6016,1482 @@
           </a:fontRef>
         </p:style>
       </p:cxnSp>
+      <p:cxnSp>
+        <p:nvCxnSpPr>
+          <p:cNvPr id="69" name="Elbow Connector 63"/>
+          <p:cNvCxnSpPr>
+            <a:stCxn id="68" idx="3"/>
+            <a:endCxn id="55" idx="1"/>
+          </p:cNvCxnSpPr>
+          <p:nvPr/>
+        </p:nvCxnSpPr>
+        <p:spPr>
+          <a:xfrm flipV="1">
+            <a:off x="2898290" y="2175346"/>
+            <a:ext cx="196914" cy="2381"/>
+          </a:xfrm>
+          <a:prstGeom prst="bentConnector3">
+            <a:avLst>
+              <a:gd name="adj1" fmla="val 50000"/>
+            </a:avLst>
+          </a:prstGeom>
+          <a:ln w="19050">
+            <a:solidFill>
+              <a:srgbClr val="7030A0"/>
+            </a:solidFill>
+            <a:prstDash val="sysDot"/>
+            <a:headEnd type="none" w="med" len="med"/>
+            <a:tailEnd type="none" w="med" len="med"/>
+          </a:ln>
+          <a:effectLst/>
+        </p:spPr>
+        <p:style>
+          <a:lnRef idx="1">
+            <a:schemeClr val="accent2"/>
+          </a:lnRef>
+          <a:fillRef idx="2">
+            <a:schemeClr val="accent2"/>
+          </a:fillRef>
+          <a:effectRef idx="1">
+            <a:schemeClr val="accent2"/>
+          </a:effectRef>
+          <a:fontRef idx="minor">
+            <a:schemeClr val="dk1"/>
+          </a:fontRef>
+        </p:style>
+      </p:cxnSp>
+      <p:sp>
+        <p:nvSpPr>
+          <p:cNvPr id="56" name="Rectangle 8">
+            <a:extLst>
+              <a:ext uri="{FF2B5EF4-FFF2-40B4-BE49-F238E27FC236}">
+                <a16:creationId xmlns:a16="http://schemas.microsoft.com/office/drawing/2014/main" id="{249D00E4-5904-42A5-820F-DAA30DF03A0F}"/>
+              </a:ext>
+            </a:extLst>
+          </p:cNvPr>
+          <p:cNvSpPr/>
+          <p:nvPr/>
+        </p:nvSpPr>
+        <p:spPr>
+          <a:xfrm>
+            <a:off x="2873351" y="3081711"/>
+            <a:ext cx="1678348" cy="310450"/>
+          </a:xfrm>
+          <a:prstGeom prst="rect">
+            <a:avLst/>
+          </a:prstGeom>
+          <a:ln w="19050">
+            <a:solidFill>
+              <a:srgbClr val="7030A0"/>
+            </a:solidFill>
+          </a:ln>
+          <a:effectLst/>
+        </p:spPr>
+        <p:style>
+          <a:lnRef idx="1">
+            <a:schemeClr val="accent4"/>
+          </a:lnRef>
+          <a:fillRef idx="2">
+            <a:schemeClr val="accent4"/>
+          </a:fillRef>
+          <a:effectRef idx="1">
+            <a:schemeClr val="accent4"/>
+          </a:effectRef>
+          <a:fontRef idx="minor">
+            <a:schemeClr val="dk1"/>
+          </a:fontRef>
+        </p:style>
+        <p:txBody>
+          <a:bodyPr rtlCol="0" anchor="ctr"/>
+          <a:lstStyle/>
+          <a:p>
+            <a:pPr algn="ctr"/>
+            <a:r>
+              <a:rPr lang="en-US" sz="1050" dirty="0" err="1">
+                <a:solidFill>
+                  <a:srgbClr val="7030A0"/>
+                </a:solidFill>
+              </a:rPr>
+              <a:t>VersionedWishTransaction</a:t>
+            </a:r>
+            <a:endParaRPr lang="en-SG" sz="1050" dirty="0">
+              <a:solidFill>
+                <a:srgbClr val="7030A0"/>
+              </a:solidFill>
+            </a:endParaRPr>
+          </a:p>
+        </p:txBody>
+      </p:sp>
+      <p:sp>
+        <p:nvSpPr>
+          <p:cNvPr id="57" name="Flowchart: Decision 96">
+            <a:extLst>
+              <a:ext uri="{FF2B5EF4-FFF2-40B4-BE49-F238E27FC236}">
+                <a16:creationId xmlns:a16="http://schemas.microsoft.com/office/drawing/2014/main" id="{6DB0FF8F-D1E6-4C03-9A19-F389789BC40B}"/>
+              </a:ext>
+            </a:extLst>
+          </p:cNvPr>
+          <p:cNvSpPr/>
+          <p:nvPr/>
+        </p:nvSpPr>
+        <p:spPr>
+          <a:xfrm>
+            <a:off x="2401255" y="3159947"/>
+            <a:ext cx="236048" cy="173380"/>
+          </a:xfrm>
+          <a:prstGeom prst="flowChartDecision">
+            <a:avLst/>
+          </a:prstGeom>
+          <a:noFill/>
+          <a:ln w="19050">
+            <a:solidFill>
+              <a:srgbClr val="7030A0"/>
+            </a:solidFill>
+          </a:ln>
+          <a:effectLst/>
+        </p:spPr>
+        <p:style>
+          <a:lnRef idx="1">
+            <a:schemeClr val="accent6"/>
+          </a:lnRef>
+          <a:fillRef idx="2">
+            <a:schemeClr val="accent6"/>
+          </a:fillRef>
+          <a:effectRef idx="1">
+            <a:schemeClr val="accent6"/>
+          </a:effectRef>
+          <a:fontRef idx="minor">
+            <a:schemeClr val="dk1"/>
+          </a:fontRef>
+        </p:style>
+        <p:txBody>
+          <a:bodyPr rtlCol="0" anchor="ctr"/>
+          <a:lstStyle/>
+          <a:p>
+            <a:pPr algn="ctr"/>
+            <a:endParaRPr lang="en-US" sz="1050"/>
+          </a:p>
+        </p:txBody>
+      </p:sp>
+      <p:cxnSp>
+        <p:nvCxnSpPr>
+          <p:cNvPr id="67" name="Straight Arrow Connector 66">
+            <a:extLst>
+              <a:ext uri="{FF2B5EF4-FFF2-40B4-BE49-F238E27FC236}">
+                <a16:creationId xmlns:a16="http://schemas.microsoft.com/office/drawing/2014/main" id="{A36B6FA4-B0C5-457E-A5AA-242DB847DB70}"/>
+              </a:ext>
+            </a:extLst>
+          </p:cNvPr>
+          <p:cNvCxnSpPr>
+            <a:cxnSpLocks/>
+            <a:stCxn id="57" idx="3"/>
+            <a:endCxn id="56" idx="1"/>
+          </p:cNvCxnSpPr>
+          <p:nvPr/>
+        </p:nvCxnSpPr>
+        <p:spPr>
+          <a:xfrm flipV="1">
+            <a:off x="2637303" y="3236936"/>
+            <a:ext cx="236048" cy="9701"/>
+          </a:xfrm>
+          <a:prstGeom prst="straightConnector1">
+            <a:avLst/>
+          </a:prstGeom>
+          <a:ln w="19050">
+            <a:solidFill>
+              <a:srgbClr val="7030A0"/>
+            </a:solidFill>
+            <a:headEnd type="none" w="med" len="med"/>
+            <a:tailEnd type="arrow" w="med" len="med"/>
+          </a:ln>
+          <a:effectLst/>
+        </p:spPr>
+        <p:style>
+          <a:lnRef idx="1">
+            <a:schemeClr val="accent2"/>
+          </a:lnRef>
+          <a:fillRef idx="2">
+            <a:schemeClr val="accent2"/>
+          </a:fillRef>
+          <a:effectRef idx="1">
+            <a:schemeClr val="accent2"/>
+          </a:effectRef>
+          <a:fontRef idx="minor">
+            <a:schemeClr val="dk1"/>
+          </a:fontRef>
+        </p:style>
+      </p:cxnSp>
+      <p:sp>
+        <p:nvSpPr>
+          <p:cNvPr id="115" name="Isosceles Triangle 102">
+            <a:extLst>
+              <a:ext uri="{FF2B5EF4-FFF2-40B4-BE49-F238E27FC236}">
+                <a16:creationId xmlns:a16="http://schemas.microsoft.com/office/drawing/2014/main" id="{94659E10-A783-46D3-A463-E36EE140CF45}"/>
+              </a:ext>
+            </a:extLst>
+          </p:cNvPr>
+          <p:cNvSpPr/>
+          <p:nvPr/>
+        </p:nvSpPr>
+        <p:spPr>
+          <a:xfrm rot="10835961" flipV="1">
+            <a:off x="3571331" y="1695302"/>
+            <a:ext cx="282387" cy="139513"/>
+          </a:xfrm>
+          <a:prstGeom prst="triangle">
+            <a:avLst/>
+          </a:prstGeom>
+          <a:ln w="19050">
+            <a:solidFill>
+              <a:srgbClr val="7030A0"/>
+            </a:solidFill>
+          </a:ln>
+          <a:effectLst/>
+        </p:spPr>
+        <p:style>
+          <a:lnRef idx="1">
+            <a:schemeClr val="accent4"/>
+          </a:lnRef>
+          <a:fillRef idx="2">
+            <a:schemeClr val="accent4"/>
+          </a:fillRef>
+          <a:effectRef idx="1">
+            <a:schemeClr val="accent4"/>
+          </a:effectRef>
+          <a:fontRef idx="minor">
+            <a:schemeClr val="dk1"/>
+          </a:fontRef>
+        </p:style>
+        <p:txBody>
+          <a:bodyPr rtlCol="0" anchor="ctr"/>
+          <a:lstStyle/>
+          <a:p>
+            <a:pPr algn="ctr"/>
+            <a:endParaRPr lang="en-SG" sz="1050" b="1">
+              <a:solidFill>
+                <a:srgbClr val="92D050"/>
+              </a:solidFill>
+            </a:endParaRPr>
+          </a:p>
+        </p:txBody>
+      </p:sp>
+      <p:sp>
+        <p:nvSpPr>
+          <p:cNvPr id="116" name="Rectangle 8">
+            <a:extLst>
+              <a:ext uri="{FF2B5EF4-FFF2-40B4-BE49-F238E27FC236}">
+                <a16:creationId xmlns:a16="http://schemas.microsoft.com/office/drawing/2014/main" id="{29AD12B8-209F-47FE-B0CD-DCCFA345E5D2}"/>
+              </a:ext>
+            </a:extLst>
+          </p:cNvPr>
+          <p:cNvSpPr/>
+          <p:nvPr/>
+        </p:nvSpPr>
+        <p:spPr>
+          <a:xfrm>
+            <a:off x="3207829" y="1303613"/>
+            <a:ext cx="1113813" cy="364396"/>
+          </a:xfrm>
+          <a:prstGeom prst="rect">
+            <a:avLst/>
+          </a:prstGeom>
+          <a:ln w="19050">
+            <a:solidFill>
+              <a:srgbClr val="7030A0"/>
+            </a:solidFill>
+          </a:ln>
+          <a:effectLst/>
+        </p:spPr>
+        <p:style>
+          <a:lnRef idx="1">
+            <a:schemeClr val="accent4"/>
+          </a:lnRef>
+          <a:fillRef idx="2">
+            <a:schemeClr val="accent4"/>
+          </a:fillRef>
+          <a:effectRef idx="1">
+            <a:schemeClr val="accent4"/>
+          </a:effectRef>
+          <a:fontRef idx="minor">
+            <a:schemeClr val="dk1"/>
+          </a:fontRef>
+        </p:style>
+        <p:txBody>
+          <a:bodyPr rtlCol="0" anchor="ctr"/>
+          <a:lstStyle/>
+          <a:p>
+            <a:pPr algn="ctr"/>
+            <a:r>
+              <a:rPr lang="en-SG" sz="1050" dirty="0" err="1">
+                <a:solidFill>
+                  <a:srgbClr val="7030A0"/>
+                </a:solidFill>
+              </a:rPr>
+              <a:t>WishTransaction</a:t>
+            </a:r>
+            <a:endParaRPr lang="en-SG" sz="1050" dirty="0">
+              <a:solidFill>
+                <a:srgbClr val="7030A0"/>
+              </a:solidFill>
+            </a:endParaRPr>
+          </a:p>
+        </p:txBody>
+      </p:sp>
+      <p:cxnSp>
+        <p:nvCxnSpPr>
+          <p:cNvPr id="121" name="Elbow Connector 63">
+            <a:extLst>
+              <a:ext uri="{FF2B5EF4-FFF2-40B4-BE49-F238E27FC236}">
+                <a16:creationId xmlns:a16="http://schemas.microsoft.com/office/drawing/2014/main" id="{6FB528F8-969B-4B8F-8A8E-941418D6DAE7}"/>
+              </a:ext>
+            </a:extLst>
+          </p:cNvPr>
+          <p:cNvCxnSpPr>
+            <a:cxnSpLocks/>
+            <a:stCxn id="56" idx="3"/>
+            <a:endCxn id="123" idx="3"/>
+          </p:cNvCxnSpPr>
+          <p:nvPr/>
+        </p:nvCxnSpPr>
+        <p:spPr>
+          <a:xfrm>
+            <a:off x="4551699" y="3236936"/>
+            <a:ext cx="195064" cy="1180"/>
+          </a:xfrm>
+          <a:prstGeom prst="bentConnector3">
+            <a:avLst>
+              <a:gd name="adj1" fmla="val 50000"/>
+            </a:avLst>
+          </a:prstGeom>
+          <a:ln w="19050">
+            <a:solidFill>
+              <a:srgbClr val="7030A0"/>
+            </a:solidFill>
+            <a:prstDash val="sysDot"/>
+            <a:headEnd type="none" w="med" len="med"/>
+            <a:tailEnd type="none" w="med" len="med"/>
+          </a:ln>
+          <a:effectLst/>
+        </p:spPr>
+        <p:style>
+          <a:lnRef idx="1">
+            <a:schemeClr val="accent2"/>
+          </a:lnRef>
+          <a:fillRef idx="2">
+            <a:schemeClr val="accent2"/>
+          </a:fillRef>
+          <a:effectRef idx="1">
+            <a:schemeClr val="accent2"/>
+          </a:effectRef>
+          <a:fontRef idx="minor">
+            <a:schemeClr val="dk1"/>
+          </a:fontRef>
+        </p:style>
+      </p:cxnSp>
+      <p:sp>
+        <p:nvSpPr>
+          <p:cNvPr id="123" name="Isosceles Triangle 102">
+            <a:extLst>
+              <a:ext uri="{FF2B5EF4-FFF2-40B4-BE49-F238E27FC236}">
+                <a16:creationId xmlns:a16="http://schemas.microsoft.com/office/drawing/2014/main" id="{4A3B3FDB-CB1B-4CD6-8885-0DA7CE1D3816}"/>
+              </a:ext>
+            </a:extLst>
+          </p:cNvPr>
+          <p:cNvSpPr/>
+          <p:nvPr/>
+        </p:nvSpPr>
+        <p:spPr>
+          <a:xfrm rot="5400000">
+            <a:off x="4690631" y="3173601"/>
+            <a:ext cx="271014" cy="158750"/>
+          </a:xfrm>
+          <a:prstGeom prst="triangle">
+            <a:avLst>
+              <a:gd name="adj" fmla="val 44517"/>
+            </a:avLst>
+          </a:prstGeom>
+          <a:solidFill>
+            <a:schemeClr val="accent4">
+              <a:lumMod val="20000"/>
+              <a:lumOff val="80000"/>
+            </a:schemeClr>
+          </a:solidFill>
+          <a:ln w="19050">
+            <a:solidFill>
+              <a:srgbClr val="7030A0"/>
+            </a:solidFill>
+          </a:ln>
+          <a:effectLst/>
+        </p:spPr>
+        <p:style>
+          <a:lnRef idx="1">
+            <a:schemeClr val="accent6"/>
+          </a:lnRef>
+          <a:fillRef idx="2">
+            <a:schemeClr val="accent6"/>
+          </a:fillRef>
+          <a:effectRef idx="1">
+            <a:schemeClr val="accent6"/>
+          </a:effectRef>
+          <a:fontRef idx="minor">
+            <a:schemeClr val="dk1"/>
+          </a:fontRef>
+        </p:style>
+        <p:txBody>
+          <a:bodyPr rtlCol="0" anchor="ctr"/>
+          <a:lstStyle/>
+          <a:p>
+            <a:pPr algn="ctr"/>
+            <a:endParaRPr lang="en-SG" sz="1050"/>
+          </a:p>
+        </p:txBody>
+      </p:sp>
+      <p:sp>
+        <p:nvSpPr>
+          <p:cNvPr id="125" name="Rectangle 8">
+            <a:extLst>
+              <a:ext uri="{FF2B5EF4-FFF2-40B4-BE49-F238E27FC236}">
+                <a16:creationId xmlns:a16="http://schemas.microsoft.com/office/drawing/2014/main" id="{69DA47F3-AE27-45E8-A5EC-22B609C9702A}"/>
+              </a:ext>
+            </a:extLst>
+          </p:cNvPr>
+          <p:cNvSpPr/>
+          <p:nvPr/>
+        </p:nvSpPr>
+        <p:spPr>
+          <a:xfrm>
+            <a:off x="4915982" y="3047688"/>
+            <a:ext cx="1240563" cy="364396"/>
+          </a:xfrm>
+          <a:prstGeom prst="rect">
+            <a:avLst/>
+          </a:prstGeom>
+          <a:ln w="19050">
+            <a:solidFill>
+              <a:srgbClr val="7030A0"/>
+            </a:solidFill>
+          </a:ln>
+          <a:effectLst/>
+        </p:spPr>
+        <p:style>
+          <a:lnRef idx="1">
+            <a:schemeClr val="accent4"/>
+          </a:lnRef>
+          <a:fillRef idx="2">
+            <a:schemeClr val="accent4"/>
+          </a:fillRef>
+          <a:effectRef idx="1">
+            <a:schemeClr val="accent4"/>
+          </a:effectRef>
+          <a:fontRef idx="minor">
+            <a:schemeClr val="dk1"/>
+          </a:fontRef>
+        </p:style>
+        <p:txBody>
+          <a:bodyPr rtlCol="0" anchor="ctr"/>
+          <a:lstStyle/>
+          <a:p>
+            <a:pPr algn="ctr"/>
+            <a:r>
+              <a:rPr lang="en-US" sz="1050" dirty="0">
+                <a:solidFill>
+                  <a:srgbClr val="7030A0"/>
+                </a:solidFill>
+              </a:rPr>
+              <a:t>&lt;&lt;interface&gt;&gt;</a:t>
+            </a:r>
+            <a:br>
+              <a:rPr lang="en-US" sz="1050" dirty="0">
+                <a:solidFill>
+                  <a:srgbClr val="7030A0"/>
+                </a:solidFill>
+              </a:rPr>
+            </a:br>
+            <a:r>
+              <a:rPr lang="en-US" sz="1050" dirty="0" err="1">
+                <a:solidFill>
+                  <a:srgbClr val="7030A0"/>
+                </a:solidFill>
+              </a:rPr>
+              <a:t>VersionedModel</a:t>
+            </a:r>
+            <a:endParaRPr lang="en-SG" sz="1050" dirty="0">
+              <a:solidFill>
+                <a:srgbClr val="7030A0"/>
+              </a:solidFill>
+            </a:endParaRPr>
+          </a:p>
+        </p:txBody>
+      </p:sp>
+      <p:cxnSp>
+        <p:nvCxnSpPr>
+          <p:cNvPr id="126" name="Elbow Connector 63">
+            <a:extLst>
+              <a:ext uri="{FF2B5EF4-FFF2-40B4-BE49-F238E27FC236}">
+                <a16:creationId xmlns:a16="http://schemas.microsoft.com/office/drawing/2014/main" id="{0605F226-205E-4044-818A-EE7BC6E35A20}"/>
+              </a:ext>
+            </a:extLst>
+          </p:cNvPr>
+          <p:cNvCxnSpPr>
+            <a:cxnSpLocks/>
+            <a:stCxn id="129" idx="3"/>
+            <a:endCxn id="46" idx="0"/>
+          </p:cNvCxnSpPr>
+          <p:nvPr/>
+        </p:nvCxnSpPr>
+        <p:spPr>
+          <a:xfrm rot="10800000" flipV="1">
+            <a:off x="3625546" y="2192139"/>
+            <a:ext cx="794054" cy="468037"/>
+          </a:xfrm>
+          <a:prstGeom prst="bentConnector2">
+            <a:avLst/>
+          </a:prstGeom>
+          <a:ln w="19050">
+            <a:solidFill>
+              <a:srgbClr val="7030A0"/>
+            </a:solidFill>
+            <a:prstDash val="sysDot"/>
+            <a:headEnd type="none" w="med" len="med"/>
+            <a:tailEnd type="none" w="med" len="med"/>
+          </a:ln>
+          <a:effectLst/>
+        </p:spPr>
+        <p:style>
+          <a:lnRef idx="1">
+            <a:schemeClr val="accent2"/>
+          </a:lnRef>
+          <a:fillRef idx="2">
+            <a:schemeClr val="accent2"/>
+          </a:fillRef>
+          <a:effectRef idx="1">
+            <a:schemeClr val="accent2"/>
+          </a:effectRef>
+          <a:fontRef idx="minor">
+            <a:schemeClr val="dk1"/>
+          </a:fontRef>
+        </p:style>
+      </p:cxnSp>
+      <p:sp>
+        <p:nvSpPr>
+          <p:cNvPr id="129" name="Isosceles Triangle 102">
+            <a:extLst>
+              <a:ext uri="{FF2B5EF4-FFF2-40B4-BE49-F238E27FC236}">
+                <a16:creationId xmlns:a16="http://schemas.microsoft.com/office/drawing/2014/main" id="{2B9F9408-7B4D-4B99-8EA6-98DC7E99F514}"/>
+              </a:ext>
+            </a:extLst>
+          </p:cNvPr>
+          <p:cNvSpPr/>
+          <p:nvPr/>
+        </p:nvSpPr>
+        <p:spPr>
+          <a:xfrm rot="5400000">
+            <a:off x="4363468" y="2127625"/>
+            <a:ext cx="271014" cy="158750"/>
+          </a:xfrm>
+          <a:prstGeom prst="triangle">
+            <a:avLst>
+              <a:gd name="adj" fmla="val 44517"/>
+            </a:avLst>
+          </a:prstGeom>
+          <a:solidFill>
+            <a:schemeClr val="accent4">
+              <a:lumMod val="20000"/>
+              <a:lumOff val="80000"/>
+            </a:schemeClr>
+          </a:solidFill>
+          <a:ln w="19050">
+            <a:solidFill>
+              <a:srgbClr val="7030A0"/>
+            </a:solidFill>
+          </a:ln>
+          <a:effectLst/>
+        </p:spPr>
+        <p:style>
+          <a:lnRef idx="1">
+            <a:schemeClr val="accent6"/>
+          </a:lnRef>
+          <a:fillRef idx="2">
+            <a:schemeClr val="accent6"/>
+          </a:fillRef>
+          <a:effectRef idx="1">
+            <a:schemeClr val="accent6"/>
+          </a:effectRef>
+          <a:fontRef idx="minor">
+            <a:schemeClr val="dk1"/>
+          </a:fontRef>
+        </p:style>
+        <p:txBody>
+          <a:bodyPr rtlCol="0" anchor="ctr"/>
+          <a:lstStyle/>
+          <a:p>
+            <a:pPr algn="ctr"/>
+            <a:endParaRPr lang="en-SG" sz="1050"/>
+          </a:p>
+        </p:txBody>
+      </p:sp>
+      <p:sp>
+        <p:nvSpPr>
+          <p:cNvPr id="130" name="Rectangle 8">
+            <a:extLst>
+              <a:ext uri="{FF2B5EF4-FFF2-40B4-BE49-F238E27FC236}">
+                <a16:creationId xmlns:a16="http://schemas.microsoft.com/office/drawing/2014/main" id="{04A2AE4D-CF61-40C2-8824-CB599E0A01D6}"/>
+              </a:ext>
+            </a:extLst>
+          </p:cNvPr>
+          <p:cNvSpPr/>
+          <p:nvPr/>
+        </p:nvSpPr>
+        <p:spPr>
+          <a:xfrm>
+            <a:off x="4568876" y="1993148"/>
+            <a:ext cx="1443661" cy="364396"/>
+          </a:xfrm>
+          <a:prstGeom prst="rect">
+            <a:avLst/>
+          </a:prstGeom>
+          <a:ln w="19050">
+            <a:solidFill>
+              <a:srgbClr val="7030A0"/>
+            </a:solidFill>
+          </a:ln>
+          <a:effectLst/>
+        </p:spPr>
+        <p:style>
+          <a:lnRef idx="1">
+            <a:schemeClr val="accent4"/>
+          </a:lnRef>
+          <a:fillRef idx="2">
+            <a:schemeClr val="accent4"/>
+          </a:fillRef>
+          <a:effectRef idx="1">
+            <a:schemeClr val="accent4"/>
+          </a:effectRef>
+          <a:fontRef idx="minor">
+            <a:schemeClr val="dk1"/>
+          </a:fontRef>
+        </p:style>
+        <p:txBody>
+          <a:bodyPr rtlCol="0" anchor="ctr"/>
+          <a:lstStyle/>
+          <a:p>
+            <a:pPr algn="ctr"/>
+            <a:r>
+              <a:rPr lang="en-US" sz="1050" dirty="0">
+                <a:solidFill>
+                  <a:srgbClr val="7030A0"/>
+                </a:solidFill>
+              </a:rPr>
+              <a:t>&lt;&lt;interface&gt;&gt;</a:t>
+            </a:r>
+            <a:br>
+              <a:rPr lang="en-US" sz="1050" dirty="0">
+                <a:solidFill>
+                  <a:srgbClr val="7030A0"/>
+                </a:solidFill>
+              </a:rPr>
+            </a:br>
+            <a:r>
+              <a:rPr lang="en-US" sz="1050" dirty="0" err="1">
+                <a:solidFill>
+                  <a:srgbClr val="7030A0"/>
+                </a:solidFill>
+              </a:rPr>
+              <a:t>VersionedModel</a:t>
+            </a:r>
+            <a:endParaRPr lang="en-SG" sz="1050" dirty="0">
+              <a:solidFill>
+                <a:srgbClr val="7030A0"/>
+              </a:solidFill>
+            </a:endParaRPr>
+          </a:p>
+        </p:txBody>
+      </p:sp>
+      <p:sp>
+        <p:nvSpPr>
+          <p:cNvPr id="133" name="TextBox 132">
+            <a:extLst>
+              <a:ext uri="{FF2B5EF4-FFF2-40B4-BE49-F238E27FC236}">
+                <a16:creationId xmlns:a16="http://schemas.microsoft.com/office/drawing/2014/main" id="{39F1FCCD-6F25-4012-87DE-CB61D0C63909}"/>
+              </a:ext>
+            </a:extLst>
+          </p:cNvPr>
+          <p:cNvSpPr txBox="1"/>
+          <p:nvPr/>
+        </p:nvSpPr>
+        <p:spPr>
+          <a:xfrm>
+            <a:off x="2514600" y="3276600"/>
+            <a:ext cx="170110" cy="137542"/>
+          </a:xfrm>
+          <a:prstGeom prst="rect">
+            <a:avLst/>
+          </a:prstGeom>
+          <a:noFill/>
+        </p:spPr>
+        <p:txBody>
+          <a:bodyPr wrap="square" lIns="0" tIns="0" rIns="0" bIns="0" rtlCol="0">
+            <a:noAutofit/>
+          </a:bodyPr>
+          <a:lstStyle/>
+          <a:p>
+            <a:pPr algn="ctr"/>
+            <a:r>
+              <a:rPr lang="en-US" sz="1100" dirty="0">
+                <a:solidFill>
+                  <a:srgbClr val="7030A0"/>
+                </a:solidFill>
+              </a:rPr>
+              <a:t>1</a:t>
+            </a:r>
+            <a:endParaRPr lang="en-SG" sz="1100" dirty="0">
+              <a:solidFill>
+                <a:srgbClr val="7030A0"/>
+              </a:solidFill>
+            </a:endParaRPr>
+          </a:p>
+        </p:txBody>
+      </p:sp>
+      <p:sp>
+        <p:nvSpPr>
+          <p:cNvPr id="55" name="Rectangle 8"/>
+          <p:cNvSpPr/>
+          <p:nvPr/>
+        </p:nvSpPr>
+        <p:spPr>
+          <a:xfrm>
+            <a:off x="3095204" y="1993148"/>
+            <a:ext cx="1060683" cy="364396"/>
+          </a:xfrm>
+          <a:prstGeom prst="rect">
+            <a:avLst/>
+          </a:prstGeom>
+          <a:ln w="19050">
+            <a:solidFill>
+              <a:srgbClr val="7030A0"/>
+            </a:solidFill>
+          </a:ln>
+          <a:effectLst/>
+        </p:spPr>
+        <p:style>
+          <a:lnRef idx="1">
+            <a:schemeClr val="accent4"/>
+          </a:lnRef>
+          <a:fillRef idx="2">
+            <a:schemeClr val="accent4"/>
+          </a:fillRef>
+          <a:effectRef idx="1">
+            <a:schemeClr val="accent4"/>
+          </a:effectRef>
+          <a:fontRef idx="minor">
+            <a:schemeClr val="dk1"/>
+          </a:fontRef>
+        </p:style>
+        <p:txBody>
+          <a:bodyPr rtlCol="0" anchor="ctr"/>
+          <a:lstStyle/>
+          <a:p>
+            <a:pPr algn="ctr"/>
+            <a:r>
+              <a:rPr lang="en-SG" sz="1050" dirty="0" err="1">
+                <a:solidFill>
+                  <a:srgbClr val="7030A0"/>
+                </a:solidFill>
+              </a:rPr>
+              <a:t>WishBook</a:t>
+            </a:r>
+            <a:endParaRPr lang="en-SG" sz="1050" dirty="0">
+              <a:solidFill>
+                <a:srgbClr val="7030A0"/>
+              </a:solidFill>
+            </a:endParaRPr>
+          </a:p>
+        </p:txBody>
+      </p:sp>
+      <p:sp>
+        <p:nvSpPr>
+          <p:cNvPr id="46" name="Rectangle 8"/>
+          <p:cNvSpPr/>
+          <p:nvPr/>
+        </p:nvSpPr>
+        <p:spPr>
+          <a:xfrm>
+            <a:off x="2880266" y="2660177"/>
+            <a:ext cx="1490560" cy="334856"/>
+          </a:xfrm>
+          <a:prstGeom prst="rect">
+            <a:avLst/>
+          </a:prstGeom>
+          <a:ln w="19050">
+            <a:solidFill>
+              <a:srgbClr val="7030A0"/>
+            </a:solidFill>
+          </a:ln>
+          <a:effectLst/>
+        </p:spPr>
+        <p:style>
+          <a:lnRef idx="1">
+            <a:schemeClr val="accent4"/>
+          </a:lnRef>
+          <a:fillRef idx="2">
+            <a:schemeClr val="accent4"/>
+          </a:fillRef>
+          <a:effectRef idx="1">
+            <a:schemeClr val="accent4"/>
+          </a:effectRef>
+          <a:fontRef idx="minor">
+            <a:schemeClr val="dk1"/>
+          </a:fontRef>
+        </p:style>
+        <p:txBody>
+          <a:bodyPr rtlCol="0" anchor="ctr"/>
+          <a:lstStyle/>
+          <a:p>
+            <a:pPr algn="ctr"/>
+            <a:r>
+              <a:rPr lang="en-US" sz="1050" dirty="0" err="1">
+                <a:solidFill>
+                  <a:srgbClr val="7030A0"/>
+                </a:solidFill>
+              </a:rPr>
+              <a:t>VersionedWishBook</a:t>
+            </a:r>
+            <a:endParaRPr lang="en-SG" sz="1050" dirty="0">
+              <a:solidFill>
+                <a:srgbClr val="7030A0"/>
+              </a:solidFill>
+            </a:endParaRPr>
+          </a:p>
+        </p:txBody>
+      </p:sp>
+      <p:cxnSp>
+        <p:nvCxnSpPr>
+          <p:cNvPr id="147" name="Elbow Connector 63">
+            <a:extLst>
+              <a:ext uri="{FF2B5EF4-FFF2-40B4-BE49-F238E27FC236}">
+                <a16:creationId xmlns:a16="http://schemas.microsoft.com/office/drawing/2014/main" id="{3972BE1B-2F47-4F76-8A91-7AFF1410B553}"/>
+              </a:ext>
+            </a:extLst>
+          </p:cNvPr>
+          <p:cNvCxnSpPr>
+            <a:cxnSpLocks/>
+            <a:stCxn id="116" idx="3"/>
+            <a:endCxn id="150" idx="3"/>
+          </p:cNvCxnSpPr>
+          <p:nvPr/>
+        </p:nvCxnSpPr>
+        <p:spPr>
+          <a:xfrm>
+            <a:off x="4321642" y="1485811"/>
+            <a:ext cx="177333" cy="12136"/>
+          </a:xfrm>
+          <a:prstGeom prst="bentConnector3">
+            <a:avLst>
+              <a:gd name="adj1" fmla="val 50000"/>
+            </a:avLst>
+          </a:prstGeom>
+          <a:ln w="19050">
+            <a:solidFill>
+              <a:srgbClr val="7030A0"/>
+            </a:solidFill>
+            <a:prstDash val="sysDot"/>
+            <a:headEnd type="none" w="med" len="med"/>
+            <a:tailEnd type="none" w="med" len="med"/>
+          </a:ln>
+          <a:effectLst/>
+        </p:spPr>
+        <p:style>
+          <a:lnRef idx="1">
+            <a:schemeClr val="accent2"/>
+          </a:lnRef>
+          <a:fillRef idx="2">
+            <a:schemeClr val="accent2"/>
+          </a:fillRef>
+          <a:effectRef idx="1">
+            <a:schemeClr val="accent2"/>
+          </a:effectRef>
+          <a:fontRef idx="minor">
+            <a:schemeClr val="dk1"/>
+          </a:fontRef>
+        </p:style>
+      </p:cxnSp>
+      <p:sp>
+        <p:nvSpPr>
+          <p:cNvPr id="150" name="Isosceles Triangle 102">
+            <a:extLst>
+              <a:ext uri="{FF2B5EF4-FFF2-40B4-BE49-F238E27FC236}">
+                <a16:creationId xmlns:a16="http://schemas.microsoft.com/office/drawing/2014/main" id="{37CB3289-B6F0-4BCC-A79D-2787CC6F5FC7}"/>
+              </a:ext>
+            </a:extLst>
+          </p:cNvPr>
+          <p:cNvSpPr/>
+          <p:nvPr/>
+        </p:nvSpPr>
+        <p:spPr>
+          <a:xfrm rot="5400000">
+            <a:off x="4442843" y="1433432"/>
+            <a:ext cx="271014" cy="158750"/>
+          </a:xfrm>
+          <a:prstGeom prst="triangle">
+            <a:avLst>
+              <a:gd name="adj" fmla="val 44517"/>
+            </a:avLst>
+          </a:prstGeom>
+          <a:solidFill>
+            <a:schemeClr val="accent4">
+              <a:lumMod val="20000"/>
+              <a:lumOff val="80000"/>
+            </a:schemeClr>
+          </a:solidFill>
+          <a:ln w="19050">
+            <a:solidFill>
+              <a:srgbClr val="7030A0"/>
+            </a:solidFill>
+          </a:ln>
+          <a:effectLst/>
+        </p:spPr>
+        <p:style>
+          <a:lnRef idx="1">
+            <a:schemeClr val="accent6"/>
+          </a:lnRef>
+          <a:fillRef idx="2">
+            <a:schemeClr val="accent6"/>
+          </a:fillRef>
+          <a:effectRef idx="1">
+            <a:schemeClr val="accent6"/>
+          </a:effectRef>
+          <a:fontRef idx="minor">
+            <a:schemeClr val="dk1"/>
+          </a:fontRef>
+        </p:style>
+        <p:txBody>
+          <a:bodyPr rtlCol="0" anchor="ctr"/>
+          <a:lstStyle/>
+          <a:p>
+            <a:pPr algn="ctr"/>
+            <a:endParaRPr lang="en-SG" sz="1050"/>
+          </a:p>
+        </p:txBody>
+      </p:sp>
+      <p:sp>
+        <p:nvSpPr>
+          <p:cNvPr id="151" name="Rectangle 8">
+            <a:extLst>
+              <a:ext uri="{FF2B5EF4-FFF2-40B4-BE49-F238E27FC236}">
+                <a16:creationId xmlns:a16="http://schemas.microsoft.com/office/drawing/2014/main" id="{4BB8CCFF-A934-4801-A564-4C0CE890AAEA}"/>
+              </a:ext>
+            </a:extLst>
+          </p:cNvPr>
+          <p:cNvSpPr/>
+          <p:nvPr/>
+        </p:nvSpPr>
+        <p:spPr>
+          <a:xfrm>
+            <a:off x="4680589" y="1312004"/>
+            <a:ext cx="1604471" cy="364396"/>
+          </a:xfrm>
+          <a:prstGeom prst="rect">
+            <a:avLst/>
+          </a:prstGeom>
+          <a:ln w="19050">
+            <a:solidFill>
+              <a:srgbClr val="7030A0"/>
+            </a:solidFill>
+          </a:ln>
+          <a:effectLst/>
+        </p:spPr>
+        <p:style>
+          <a:lnRef idx="1">
+            <a:schemeClr val="accent4"/>
+          </a:lnRef>
+          <a:fillRef idx="2">
+            <a:schemeClr val="accent4"/>
+          </a:fillRef>
+          <a:effectRef idx="1">
+            <a:schemeClr val="accent4"/>
+          </a:effectRef>
+          <a:fontRef idx="minor">
+            <a:schemeClr val="dk1"/>
+          </a:fontRef>
+        </p:style>
+        <p:txBody>
+          <a:bodyPr rtlCol="0" anchor="ctr"/>
+          <a:lstStyle/>
+          <a:p>
+            <a:pPr algn="ctr"/>
+            <a:r>
+              <a:rPr lang="en-US" sz="1050" dirty="0">
+                <a:solidFill>
+                  <a:srgbClr val="7030A0"/>
+                </a:solidFill>
+              </a:rPr>
+              <a:t>&lt;&lt;interface&gt;&gt;</a:t>
+            </a:r>
+            <a:br>
+              <a:rPr lang="en-US" sz="1050" dirty="0">
+                <a:solidFill>
+                  <a:srgbClr val="7030A0"/>
+                </a:solidFill>
+              </a:rPr>
+            </a:br>
+            <a:r>
+              <a:rPr lang="en-US" sz="1050" dirty="0" err="1">
+                <a:solidFill>
+                  <a:srgbClr val="7030A0"/>
+                </a:solidFill>
+              </a:rPr>
+              <a:t>ActionCommandListener</a:t>
+            </a:r>
+            <a:endParaRPr lang="en-SG" sz="1050" dirty="0">
+              <a:solidFill>
+                <a:srgbClr val="7030A0"/>
+              </a:solidFill>
+            </a:endParaRPr>
+          </a:p>
+        </p:txBody>
+      </p:sp>
+      <p:sp>
+        <p:nvSpPr>
+          <p:cNvPr id="155" name="Flowchart: Decision 96">
+            <a:extLst>
+              <a:ext uri="{FF2B5EF4-FFF2-40B4-BE49-F238E27FC236}">
+                <a16:creationId xmlns:a16="http://schemas.microsoft.com/office/drawing/2014/main" id="{F1259AC5-BAD4-48FC-8E26-E04E075B7D59}"/>
+              </a:ext>
+            </a:extLst>
+          </p:cNvPr>
+          <p:cNvSpPr/>
+          <p:nvPr/>
+        </p:nvSpPr>
+        <p:spPr>
+          <a:xfrm rot="5400000">
+            <a:off x="3562626" y="3446481"/>
+            <a:ext cx="236048" cy="173380"/>
+          </a:xfrm>
+          <a:prstGeom prst="flowChartDecision">
+            <a:avLst/>
+          </a:prstGeom>
+          <a:solidFill>
+            <a:srgbClr val="7030A0"/>
+          </a:solidFill>
+          <a:ln w="19050">
+            <a:solidFill>
+              <a:srgbClr val="7030A0"/>
+            </a:solidFill>
+          </a:ln>
+          <a:effectLst/>
+        </p:spPr>
+        <p:style>
+          <a:lnRef idx="1">
+            <a:schemeClr val="accent6"/>
+          </a:lnRef>
+          <a:fillRef idx="2">
+            <a:schemeClr val="accent6"/>
+          </a:fillRef>
+          <a:effectRef idx="1">
+            <a:schemeClr val="accent6"/>
+          </a:effectRef>
+          <a:fontRef idx="minor">
+            <a:schemeClr val="dk1"/>
+          </a:fontRef>
+        </p:style>
+        <p:txBody>
+          <a:bodyPr rtlCol="0" anchor="ctr"/>
+          <a:lstStyle/>
+          <a:p>
+            <a:pPr algn="ctr"/>
+            <a:endParaRPr lang="en-US" sz="1050">
+              <a:solidFill>
+                <a:srgbClr val="7030A0"/>
+              </a:solidFill>
+            </a:endParaRPr>
+          </a:p>
+        </p:txBody>
+      </p:sp>
+      <p:cxnSp>
+        <p:nvCxnSpPr>
+          <p:cNvPr id="156" name="Elbow Connector 63">
+            <a:extLst>
+              <a:ext uri="{FF2B5EF4-FFF2-40B4-BE49-F238E27FC236}">
+                <a16:creationId xmlns:a16="http://schemas.microsoft.com/office/drawing/2014/main" id="{0C0C2313-9732-430D-90E5-2CABB627099D}"/>
+              </a:ext>
+            </a:extLst>
+          </p:cNvPr>
+          <p:cNvCxnSpPr>
+            <a:cxnSpLocks/>
+            <a:stCxn id="155" idx="3"/>
+            <a:endCxn id="185" idx="1"/>
+          </p:cNvCxnSpPr>
+          <p:nvPr/>
+        </p:nvCxnSpPr>
+        <p:spPr>
+          <a:xfrm rot="16200000" flipH="1">
+            <a:off x="4204149" y="3127696"/>
+            <a:ext cx="249038" cy="1296036"/>
+          </a:xfrm>
+          <a:prstGeom prst="bentConnector2">
+            <a:avLst/>
+          </a:prstGeom>
+          <a:ln w="19050">
+            <a:solidFill>
+              <a:srgbClr val="7030A0"/>
+            </a:solidFill>
+            <a:headEnd type="none" w="med" len="med"/>
+            <a:tailEnd type="arrow" w="med" len="med"/>
+          </a:ln>
+          <a:effectLst/>
+        </p:spPr>
+        <p:style>
+          <a:lnRef idx="1">
+            <a:schemeClr val="accent2"/>
+          </a:lnRef>
+          <a:fillRef idx="2">
+            <a:schemeClr val="accent2"/>
+          </a:fillRef>
+          <a:effectRef idx="1">
+            <a:schemeClr val="accent2"/>
+          </a:effectRef>
+          <a:fontRef idx="minor">
+            <a:schemeClr val="dk1"/>
+          </a:fontRef>
+        </p:style>
+      </p:cxnSp>
+      <p:cxnSp>
+        <p:nvCxnSpPr>
+          <p:cNvPr id="176" name="Connector: Elbow 175">
+            <a:extLst>
+              <a:ext uri="{FF2B5EF4-FFF2-40B4-BE49-F238E27FC236}">
+                <a16:creationId xmlns:a16="http://schemas.microsoft.com/office/drawing/2014/main" id="{E41A1B6F-26D0-484A-950A-09FDC007C73B}"/>
+              </a:ext>
+            </a:extLst>
+          </p:cNvPr>
+          <p:cNvCxnSpPr>
+            <a:cxnSpLocks/>
+            <a:stCxn id="42" idx="3"/>
+            <a:endCxn id="2" idx="1"/>
+          </p:cNvCxnSpPr>
+          <p:nvPr/>
+        </p:nvCxnSpPr>
+        <p:spPr>
+          <a:xfrm>
+            <a:off x="2602183" y="3715710"/>
+            <a:ext cx="814289" cy="706299"/>
+          </a:xfrm>
+          <a:prstGeom prst="bentConnector3">
+            <a:avLst>
+              <a:gd name="adj1" fmla="val 78853"/>
+            </a:avLst>
+          </a:prstGeom>
+          <a:ln w="19050">
+            <a:headEnd type="none" w="med" len="med"/>
+            <a:tailEnd type="arrow" w="med" len="med"/>
+          </a:ln>
+        </p:spPr>
+        <p:style>
+          <a:lnRef idx="1">
+            <a:schemeClr val="accent4"/>
+          </a:lnRef>
+          <a:fillRef idx="0">
+            <a:schemeClr val="accent4"/>
+          </a:fillRef>
+          <a:effectRef idx="0">
+            <a:schemeClr val="accent4"/>
+          </a:effectRef>
+          <a:fontRef idx="minor">
+            <a:schemeClr val="tx1"/>
+          </a:fontRef>
+        </p:style>
+      </p:cxnSp>
+      <p:sp>
+        <p:nvSpPr>
+          <p:cNvPr id="185" name="Rectangle 8">
+            <a:extLst>
+              <a:ext uri="{FF2B5EF4-FFF2-40B4-BE49-F238E27FC236}">
+                <a16:creationId xmlns:a16="http://schemas.microsoft.com/office/drawing/2014/main" id="{B02ACAFF-C41D-44DC-B8A8-9FC647DEA733}"/>
+              </a:ext>
+            </a:extLst>
+          </p:cNvPr>
+          <p:cNvSpPr/>
+          <p:nvPr/>
+        </p:nvSpPr>
+        <p:spPr>
+          <a:xfrm>
+            <a:off x="4976686" y="3738012"/>
+            <a:ext cx="569995" cy="324441"/>
+          </a:xfrm>
+          <a:prstGeom prst="rect">
+            <a:avLst/>
+          </a:prstGeom>
+          <a:ln w="19050">
+            <a:solidFill>
+              <a:srgbClr val="7030A0"/>
+            </a:solidFill>
+          </a:ln>
+          <a:effectLst/>
+        </p:spPr>
+        <p:style>
+          <a:lnRef idx="1">
+            <a:schemeClr val="accent4"/>
+          </a:lnRef>
+          <a:fillRef idx="2">
+            <a:schemeClr val="accent4"/>
+          </a:fillRef>
+          <a:effectRef idx="1">
+            <a:schemeClr val="accent4"/>
+          </a:effectRef>
+          <a:fontRef idx="minor">
+            <a:schemeClr val="dk1"/>
+          </a:fontRef>
+        </p:style>
+        <p:txBody>
+          <a:bodyPr rtlCol="0" anchor="ctr"/>
+          <a:lstStyle/>
+          <a:p>
+            <a:pPr algn="ctr"/>
+            <a:r>
+              <a:rPr lang="en-US" sz="1050" dirty="0">
+                <a:solidFill>
+                  <a:srgbClr val="7030A0"/>
+                </a:solidFill>
+              </a:rPr>
+              <a:t>List</a:t>
+            </a:r>
+            <a:endParaRPr lang="en-SG" sz="1050" dirty="0">
+              <a:solidFill>
+                <a:srgbClr val="7030A0"/>
+              </a:solidFill>
+            </a:endParaRPr>
+          </a:p>
+        </p:txBody>
+      </p:sp>
+      <p:sp>
+        <p:nvSpPr>
+          <p:cNvPr id="188" name="Flowchart: Decision 96">
+            <a:extLst>
+              <a:ext uri="{FF2B5EF4-FFF2-40B4-BE49-F238E27FC236}">
+                <a16:creationId xmlns:a16="http://schemas.microsoft.com/office/drawing/2014/main" id="{33156D98-CE4D-4CE3-8FA9-594C95B327B0}"/>
+              </a:ext>
+            </a:extLst>
+          </p:cNvPr>
+          <p:cNvSpPr/>
+          <p:nvPr/>
+        </p:nvSpPr>
+        <p:spPr>
+          <a:xfrm>
+            <a:off x="5555152" y="3789020"/>
+            <a:ext cx="236048" cy="173380"/>
+          </a:xfrm>
+          <a:prstGeom prst="flowChartDecision">
+            <a:avLst/>
+          </a:prstGeom>
+          <a:noFill/>
+          <a:ln w="19050">
+            <a:solidFill>
+              <a:srgbClr val="7030A0"/>
+            </a:solidFill>
+          </a:ln>
+          <a:effectLst/>
+        </p:spPr>
+        <p:style>
+          <a:lnRef idx="1">
+            <a:schemeClr val="accent6"/>
+          </a:lnRef>
+          <a:fillRef idx="2">
+            <a:schemeClr val="accent6"/>
+          </a:fillRef>
+          <a:effectRef idx="1">
+            <a:schemeClr val="accent6"/>
+          </a:effectRef>
+          <a:fontRef idx="minor">
+            <a:schemeClr val="dk1"/>
+          </a:fontRef>
+        </p:style>
+        <p:txBody>
+          <a:bodyPr rtlCol="0" anchor="ctr"/>
+          <a:lstStyle/>
+          <a:p>
+            <a:pPr algn="ctr"/>
+            <a:endParaRPr lang="en-US" sz="1050"/>
+          </a:p>
+        </p:txBody>
+      </p:sp>
+      <p:sp>
+        <p:nvSpPr>
+          <p:cNvPr id="189" name="TextBox 188">
+            <a:extLst>
+              <a:ext uri="{FF2B5EF4-FFF2-40B4-BE49-F238E27FC236}">
+                <a16:creationId xmlns:a16="http://schemas.microsoft.com/office/drawing/2014/main" id="{B52DF044-2580-4806-B84E-5EB53CC7FDF6}"/>
+              </a:ext>
+            </a:extLst>
+          </p:cNvPr>
+          <p:cNvSpPr txBox="1"/>
+          <p:nvPr/>
+        </p:nvSpPr>
+        <p:spPr>
+          <a:xfrm>
+            <a:off x="6151583" y="2884187"/>
+            <a:ext cx="189257" cy="178683"/>
+          </a:xfrm>
+          <a:prstGeom prst="rect">
+            <a:avLst/>
+          </a:prstGeom>
+          <a:noFill/>
+        </p:spPr>
+        <p:txBody>
+          <a:bodyPr wrap="square" lIns="0" tIns="0" rIns="0" bIns="0" rtlCol="0">
+            <a:noAutofit/>
+          </a:bodyPr>
+          <a:lstStyle/>
+          <a:p>
+            <a:pPr algn="ctr"/>
+            <a:r>
+              <a:rPr lang="en-US" sz="1100" dirty="0">
+                <a:solidFill>
+                  <a:srgbClr val="7030A0"/>
+                </a:solidFill>
+              </a:rPr>
+              <a:t>*</a:t>
+            </a:r>
+            <a:endParaRPr lang="en-SG" sz="1100" dirty="0">
+              <a:solidFill>
+                <a:srgbClr val="7030A0"/>
+              </a:solidFill>
+            </a:endParaRPr>
+          </a:p>
+        </p:txBody>
+      </p:sp>
+      <p:cxnSp>
+        <p:nvCxnSpPr>
+          <p:cNvPr id="190" name="Elbow Connector 63">
+            <a:extLst>
+              <a:ext uri="{FF2B5EF4-FFF2-40B4-BE49-F238E27FC236}">
+                <a16:creationId xmlns:a16="http://schemas.microsoft.com/office/drawing/2014/main" id="{83CFC997-08BA-4C57-A0A0-D8F253BB2C54}"/>
+              </a:ext>
+            </a:extLst>
+          </p:cNvPr>
+          <p:cNvCxnSpPr>
+            <a:cxnSpLocks/>
+            <a:stCxn id="188" idx="3"/>
+            <a:endCxn id="62" idx="2"/>
+          </p:cNvCxnSpPr>
+          <p:nvPr/>
+        </p:nvCxnSpPr>
+        <p:spPr>
+          <a:xfrm flipV="1">
+            <a:off x="5791200" y="2998865"/>
+            <a:ext cx="862164" cy="876845"/>
+          </a:xfrm>
+          <a:prstGeom prst="bentConnector2">
+            <a:avLst/>
+          </a:prstGeom>
+          <a:ln w="19050">
+            <a:solidFill>
+              <a:srgbClr val="7030A0"/>
+            </a:solidFill>
+            <a:headEnd type="none" w="med" len="med"/>
+            <a:tailEnd type="arrow" w="med" len="med"/>
+          </a:ln>
+          <a:effectLst/>
+        </p:spPr>
+        <p:style>
+          <a:lnRef idx="1">
+            <a:schemeClr val="accent2"/>
+          </a:lnRef>
+          <a:fillRef idx="2">
+            <a:schemeClr val="accent2"/>
+          </a:fillRef>
+          <a:effectRef idx="1">
+            <a:schemeClr val="accent2"/>
+          </a:effectRef>
+          <a:fontRef idx="minor">
+            <a:schemeClr val="dk1"/>
+          </a:fontRef>
+        </p:style>
+      </p:cxnSp>
+      <p:sp>
+        <p:nvSpPr>
+          <p:cNvPr id="206" name="TextBox 205">
+            <a:extLst>
+              <a:ext uri="{FF2B5EF4-FFF2-40B4-BE49-F238E27FC236}">
+                <a16:creationId xmlns:a16="http://schemas.microsoft.com/office/drawing/2014/main" id="{8404FA0A-01D0-4363-BB9D-C4A7524856CE}"/>
+              </a:ext>
+            </a:extLst>
+          </p:cNvPr>
+          <p:cNvSpPr txBox="1"/>
+          <p:nvPr/>
+        </p:nvSpPr>
+        <p:spPr>
+          <a:xfrm>
+            <a:off x="6679273" y="3040052"/>
+            <a:ext cx="189257" cy="178683"/>
+          </a:xfrm>
+          <a:prstGeom prst="rect">
+            <a:avLst/>
+          </a:prstGeom>
+          <a:noFill/>
+        </p:spPr>
+        <p:txBody>
+          <a:bodyPr wrap="square" lIns="0" tIns="0" rIns="0" bIns="0" rtlCol="0">
+            <a:noAutofit/>
+          </a:bodyPr>
+          <a:lstStyle/>
+          <a:p>
+            <a:pPr algn="ctr"/>
+            <a:r>
+              <a:rPr lang="en-SG" sz="1100" dirty="0">
+                <a:solidFill>
+                  <a:srgbClr val="7030A0"/>
+                </a:solidFill>
+              </a:rPr>
+              <a:t>*</a:t>
+            </a:r>
+          </a:p>
+        </p:txBody>
+      </p:sp>
+      <p:sp>
+        <p:nvSpPr>
+          <p:cNvPr id="210" name="TextBox 209">
+            <a:extLst>
+              <a:ext uri="{FF2B5EF4-FFF2-40B4-BE49-F238E27FC236}">
+                <a16:creationId xmlns:a16="http://schemas.microsoft.com/office/drawing/2014/main" id="{F25BEFE1-10D3-4A97-95F1-5D49922D8BD6}"/>
+              </a:ext>
+            </a:extLst>
+          </p:cNvPr>
+          <p:cNvSpPr txBox="1"/>
+          <p:nvPr/>
+        </p:nvSpPr>
+        <p:spPr>
+          <a:xfrm>
+            <a:off x="3815097" y="3700790"/>
+            <a:ext cx="1028321" cy="261610"/>
+          </a:xfrm>
+          <a:prstGeom prst="rect">
+            <a:avLst/>
+          </a:prstGeom>
+          <a:noFill/>
+        </p:spPr>
+        <p:txBody>
+          <a:bodyPr wrap="square" rtlCol="0">
+            <a:spAutoFit/>
+          </a:bodyPr>
+          <a:lstStyle/>
+          <a:p>
+            <a:pPr algn="r"/>
+            <a:r>
+              <a:rPr lang="en-US" sz="1100" dirty="0">
+                <a:solidFill>
+                  <a:srgbClr val="7030A0"/>
+                </a:solidFill>
+              </a:rPr>
+              <a:t> wish state list</a:t>
+            </a:r>
+            <a:endParaRPr lang="en-SG" sz="1100" dirty="0">
+              <a:solidFill>
+                <a:srgbClr val="7030A0"/>
+              </a:solidFill>
+            </a:endParaRPr>
+          </a:p>
+        </p:txBody>
+      </p:sp>
     </p:spTree>
     <p:extLst>
       <p:ext uri="{BB962C8B-B14F-4D97-AF65-F5344CB8AC3E}">

</xml_diff>

<commit_message>
use UniquePersonList for voter lists in poll
</commit_message>
<xml_diff>
--- a/docs/diagrams/ModelComponentClassDiagram.pptx
+++ b/docs/diagrams/ModelComponentClassDiagram.pptx
@@ -208,7 +208,7 @@
           <a:p>
             <a:fld id="{F5CC4B3F-88C1-4FFA-B1B6-F41C21DC6924}" type="datetimeFigureOut">
               <a:rPr lang="en-US" smtClean="0"/>
-              <a:t>6/27/2018</a:t>
+              <a:t>10/14/2018</a:t>
             </a:fld>
             <a:endParaRPr lang="en-US"/>
           </a:p>
@@ -654,7 +654,7 @@
           <a:p>
             <a:fld id="{78C97017-6FC3-485B-9764-EAC9E56C1D49}" type="datetimeFigureOut">
               <a:rPr lang="en-US" smtClean="0"/>
-              <a:t>6/27/2018</a:t>
+              <a:t>10/14/2018</a:t>
             </a:fld>
             <a:endParaRPr lang="en-US"/>
           </a:p>
@@ -822,7 +822,7 @@
           <a:p>
             <a:fld id="{78C97017-6FC3-485B-9764-EAC9E56C1D49}" type="datetimeFigureOut">
               <a:rPr lang="en-US" smtClean="0"/>
-              <a:t>6/27/2018</a:t>
+              <a:t>10/14/2018</a:t>
             </a:fld>
             <a:endParaRPr lang="en-US"/>
           </a:p>
@@ -1000,7 +1000,7 @@
           <a:p>
             <a:fld id="{78C97017-6FC3-485B-9764-EAC9E56C1D49}" type="datetimeFigureOut">
               <a:rPr lang="en-US" smtClean="0"/>
-              <a:t>6/27/2018</a:t>
+              <a:t>10/14/2018</a:t>
             </a:fld>
             <a:endParaRPr lang="en-US"/>
           </a:p>
@@ -1168,7 +1168,7 @@
           <a:p>
             <a:fld id="{78C97017-6FC3-485B-9764-EAC9E56C1D49}" type="datetimeFigureOut">
               <a:rPr lang="en-US" smtClean="0"/>
-              <a:t>6/27/2018</a:t>
+              <a:t>10/14/2018</a:t>
             </a:fld>
             <a:endParaRPr lang="en-US"/>
           </a:p>
@@ -1413,7 +1413,7 @@
           <a:p>
             <a:fld id="{78C97017-6FC3-485B-9764-EAC9E56C1D49}" type="datetimeFigureOut">
               <a:rPr lang="en-US" smtClean="0"/>
-              <a:t>6/27/2018</a:t>
+              <a:t>10/14/2018</a:t>
             </a:fld>
             <a:endParaRPr lang="en-US"/>
           </a:p>
@@ -1698,7 +1698,7 @@
           <a:p>
             <a:fld id="{78C97017-6FC3-485B-9764-EAC9E56C1D49}" type="datetimeFigureOut">
               <a:rPr lang="en-US" smtClean="0"/>
-              <a:t>6/27/2018</a:t>
+              <a:t>10/14/2018</a:t>
             </a:fld>
             <a:endParaRPr lang="en-US"/>
           </a:p>
@@ -2117,7 +2117,7 @@
           <a:p>
             <a:fld id="{78C97017-6FC3-485B-9764-EAC9E56C1D49}" type="datetimeFigureOut">
               <a:rPr lang="en-US" smtClean="0"/>
-              <a:t>6/27/2018</a:t>
+              <a:t>10/14/2018</a:t>
             </a:fld>
             <a:endParaRPr lang="en-US"/>
           </a:p>
@@ -2234,7 +2234,7 @@
           <a:p>
             <a:fld id="{78C97017-6FC3-485B-9764-EAC9E56C1D49}" type="datetimeFigureOut">
               <a:rPr lang="en-US" smtClean="0"/>
-              <a:t>6/27/2018</a:t>
+              <a:t>10/14/2018</a:t>
             </a:fld>
             <a:endParaRPr lang="en-US"/>
           </a:p>
@@ -2329,7 +2329,7 @@
           <a:p>
             <a:fld id="{78C97017-6FC3-485B-9764-EAC9E56C1D49}" type="datetimeFigureOut">
               <a:rPr lang="en-US" smtClean="0"/>
-              <a:t>6/27/2018</a:t>
+              <a:t>10/14/2018</a:t>
             </a:fld>
             <a:endParaRPr lang="en-US"/>
           </a:p>
@@ -2604,7 +2604,7 @@
           <a:p>
             <a:fld id="{78C97017-6FC3-485B-9764-EAC9E56C1D49}" type="datetimeFigureOut">
               <a:rPr lang="en-US" smtClean="0"/>
-              <a:t>6/27/2018</a:t>
+              <a:t>10/14/2018</a:t>
             </a:fld>
             <a:endParaRPr lang="en-US"/>
           </a:p>
@@ -2856,7 +2856,7 @@
           <a:p>
             <a:fld id="{78C97017-6FC3-485B-9764-EAC9E56C1D49}" type="datetimeFigureOut">
               <a:rPr lang="en-US" smtClean="0"/>
-              <a:t>6/27/2018</a:t>
+              <a:t>10/14/2018</a:t>
             </a:fld>
             <a:endParaRPr lang="en-US"/>
           </a:p>
@@ -3067,7 +3067,7 @@
           <a:p>
             <a:fld id="{78C97017-6FC3-485B-9764-EAC9E56C1D49}" type="datetimeFigureOut">
               <a:rPr lang="en-US" smtClean="0"/>
-              <a:t>6/27/2018</a:t>
+              <a:t>10/14/2018</a:t>
             </a:fld>
             <a:endParaRPr lang="en-US"/>
           </a:p>
@@ -3450,8 +3450,8 @@
         </p:nvSpPr>
         <p:spPr>
           <a:xfrm>
-            <a:off x="1119865" y="1600200"/>
-            <a:ext cx="7490735" cy="3124200"/>
+            <a:off x="1124363" y="987463"/>
+            <a:ext cx="7719335" cy="3725497"/>
           </a:xfrm>
           <a:prstGeom prst="roundRect">
             <a:avLst>
@@ -3994,7 +3994,7 @@
           <a:p>
             <a:pPr algn="ctr"/>
             <a:r>
-              <a:rPr lang="en-US" sz="1050" dirty="0" err="1" smtClean="0">
+              <a:rPr lang="en-US" sz="1050" dirty="0" err="1">
                 <a:solidFill>
                   <a:srgbClr val="7030A0"/>
                 </a:solidFill>
@@ -4103,7 +4103,7 @@
         </p:nvSpPr>
         <p:spPr>
           <a:xfrm>
-            <a:off x="4692650" y="2846162"/>
+            <a:off x="4707612" y="2839259"/>
             <a:ext cx="1156969" cy="346760"/>
           </a:xfrm>
           <a:prstGeom prst="rect">
@@ -4778,14 +4778,16 @@
         <p:nvCxnSpPr>
           <p:cNvPr id="97" name="Elbow Connector 63"/>
           <p:cNvCxnSpPr>
+            <a:cxnSpLocks/>
             <a:stCxn id="99" idx="3"/>
+            <a:endCxn id="46" idx="0"/>
           </p:cNvCxnSpPr>
           <p:nvPr/>
         </p:nvCxnSpPr>
         <p:spPr>
           <a:xfrm rot="5400000">
-            <a:off x="3553611" y="2687559"/>
-            <a:ext cx="293825" cy="5938"/>
+            <a:off x="3485753" y="2628423"/>
+            <a:ext cx="302546" cy="132932"/>
           </a:xfrm>
           <a:prstGeom prst="bentConnector3">
             <a:avLst>
@@ -4873,7 +4875,7 @@
         </p:nvSpPr>
         <p:spPr>
           <a:xfrm>
-            <a:off x="1260922" y="1998350"/>
+            <a:off x="2402370" y="1427686"/>
             <a:ext cx="1443661" cy="364396"/>
           </a:xfrm>
           <a:prstGeom prst="rect">
@@ -5022,14 +5024,6 @@
                 </a:solidFill>
               </a:rPr>
               <a:t>&lt;&lt;interface&gt;&gt;</a:t>
-            </a:r>
-            <a:r>
-              <a:rPr lang="en-US" sz="1050">
-                <a:solidFill>
-                  <a:srgbClr val="7030A0"/>
-                </a:solidFill>
-              </a:rPr>
-              <a:t/>
             </a:r>
             <a:br>
               <a:rPr lang="en-US" sz="1050">
@@ -5457,7 +5451,7 @@
         <p:spPr>
           <a:xfrm>
             <a:off x="3170181" y="1998350"/>
-            <a:ext cx="1060683" cy="364396"/>
+            <a:ext cx="944619" cy="364396"/>
           </a:xfrm>
           <a:prstGeom prst="rect">
             <a:avLst/>
@@ -5516,7 +5510,7 @@
         <p:spPr>
           <a:xfrm>
             <a:off x="4324972" y="3007222"/>
-            <a:ext cx="367678" cy="12320"/>
+            <a:ext cx="382640" cy="5417"/>
           </a:xfrm>
           <a:prstGeom prst="straightConnector1">
             <a:avLst/>
@@ -5552,13 +5546,13 @@
           <p:nvPr/>
         </p:nvSpPr>
         <p:spPr>
-          <a:xfrm rot="16200000">
-            <a:off x="2669073" y="2069158"/>
+          <a:xfrm>
+            <a:off x="2699663" y="1815890"/>
             <a:ext cx="271014" cy="187417"/>
           </a:xfrm>
           <a:prstGeom prst="triangle">
             <a:avLst>
-              <a:gd name="adj" fmla="val 44517"/>
+              <a:gd name="adj" fmla="val 55764"/>
             </a:avLst>
           </a:prstGeom>
           <a:solidFill>
@@ -5601,20 +5595,19 @@
         <p:nvCxnSpPr>
           <p:cNvPr id="69" name="Elbow Connector 63"/>
           <p:cNvCxnSpPr>
+            <a:cxnSpLocks/>
             <a:stCxn id="68" idx="3"/>
             <a:endCxn id="55" idx="1"/>
           </p:cNvCxnSpPr>
           <p:nvPr/>
         </p:nvCxnSpPr>
         <p:spPr>
-          <a:xfrm>
-            <a:off x="2898289" y="2177727"/>
-            <a:ext cx="271892" cy="2821"/>
-          </a:xfrm>
-          <a:prstGeom prst="bentConnector3">
-            <a:avLst>
-              <a:gd name="adj1" fmla="val 50000"/>
-            </a:avLst>
+          <a:xfrm rot="16200000" flipH="1">
+            <a:off x="2921866" y="1932232"/>
+            <a:ext cx="177241" cy="319390"/>
+          </a:xfrm>
+          <a:prstGeom prst="bentConnector2">
+            <a:avLst/>
           </a:prstGeom>
           <a:ln w="19050">
             <a:solidFill>
@@ -5641,6 +5634,1299 @@
           </a:fontRef>
         </p:style>
       </p:cxnSp>
+      <p:sp>
+        <p:nvSpPr>
+          <p:cNvPr id="57" name="Flowchart: Decision 96">
+            <a:extLst>
+              <a:ext uri="{FF2B5EF4-FFF2-40B4-BE49-F238E27FC236}">
+                <a16:creationId xmlns:a16="http://schemas.microsoft.com/office/drawing/2014/main" id="{0BF267DC-9109-41CA-8983-385A7F41840F}"/>
+              </a:ext>
+            </a:extLst>
+          </p:cNvPr>
+          <p:cNvSpPr/>
+          <p:nvPr/>
+        </p:nvSpPr>
+        <p:spPr>
+          <a:xfrm rot="16200000">
+            <a:off x="4124771" y="2615511"/>
+            <a:ext cx="236048" cy="173380"/>
+          </a:xfrm>
+          <a:prstGeom prst="flowChartDecision">
+            <a:avLst/>
+          </a:prstGeom>
+          <a:solidFill>
+            <a:srgbClr val="7030A0"/>
+          </a:solidFill>
+          <a:ln w="19050">
+            <a:solidFill>
+              <a:srgbClr val="7030A0"/>
+            </a:solidFill>
+          </a:ln>
+          <a:effectLst/>
+        </p:spPr>
+        <p:style>
+          <a:lnRef idx="1">
+            <a:schemeClr val="accent6"/>
+          </a:lnRef>
+          <a:fillRef idx="2">
+            <a:schemeClr val="accent6"/>
+          </a:fillRef>
+          <a:effectRef idx="1">
+            <a:schemeClr val="accent6"/>
+          </a:effectRef>
+          <a:fontRef idx="minor">
+            <a:schemeClr val="dk1"/>
+          </a:fontRef>
+        </p:style>
+        <p:txBody>
+          <a:bodyPr rtlCol="0" anchor="ctr"/>
+          <a:lstStyle/>
+          <a:p>
+            <a:pPr algn="ctr"/>
+            <a:endParaRPr lang="en-US" sz="1050"/>
+          </a:p>
+        </p:txBody>
+      </p:sp>
+      <p:sp>
+        <p:nvSpPr>
+          <p:cNvPr id="59" name="Rectangle 8">
+            <a:extLst>
+              <a:ext uri="{FF2B5EF4-FFF2-40B4-BE49-F238E27FC236}">
+                <a16:creationId xmlns:a16="http://schemas.microsoft.com/office/drawing/2014/main" id="{C6DBC71E-68B3-45A7-BE58-61DD39BCCACF}"/>
+              </a:ext>
+            </a:extLst>
+          </p:cNvPr>
+          <p:cNvSpPr/>
+          <p:nvPr/>
+        </p:nvSpPr>
+        <p:spPr>
+          <a:xfrm>
+            <a:off x="4168378" y="1443519"/>
+            <a:ext cx="1156969" cy="346760"/>
+          </a:xfrm>
+          <a:prstGeom prst="rect">
+            <a:avLst/>
+          </a:prstGeom>
+          <a:ln w="19050">
+            <a:solidFill>
+              <a:srgbClr val="7030A0"/>
+            </a:solidFill>
+          </a:ln>
+          <a:effectLst/>
+        </p:spPr>
+        <p:style>
+          <a:lnRef idx="1">
+            <a:schemeClr val="accent4"/>
+          </a:lnRef>
+          <a:fillRef idx="2">
+            <a:schemeClr val="accent4"/>
+          </a:fillRef>
+          <a:effectRef idx="1">
+            <a:schemeClr val="accent4"/>
+          </a:effectRef>
+          <a:fontRef idx="minor">
+            <a:schemeClr val="dk1"/>
+          </a:fontRef>
+        </p:style>
+        <p:txBody>
+          <a:bodyPr rtlCol="0" anchor="ctr"/>
+          <a:lstStyle/>
+          <a:p>
+            <a:pPr algn="ctr"/>
+            <a:r>
+              <a:rPr lang="en-US" sz="1050" dirty="0" err="1">
+                <a:solidFill>
+                  <a:srgbClr val="7030A0"/>
+                </a:solidFill>
+              </a:rPr>
+              <a:t>UniqueEventList</a:t>
+            </a:r>
+            <a:endParaRPr lang="en-SG" sz="1050" dirty="0">
+              <a:solidFill>
+                <a:srgbClr val="7030A0"/>
+              </a:solidFill>
+            </a:endParaRPr>
+          </a:p>
+        </p:txBody>
+      </p:sp>
+      <p:sp>
+        <p:nvSpPr>
+          <p:cNvPr id="67" name="Flowchart: Decision 96">
+            <a:extLst>
+              <a:ext uri="{FF2B5EF4-FFF2-40B4-BE49-F238E27FC236}">
+                <a16:creationId xmlns:a16="http://schemas.microsoft.com/office/drawing/2014/main" id="{7EF7F42C-5AA1-4D64-833F-258EBD39E07B}"/>
+              </a:ext>
+            </a:extLst>
+          </p:cNvPr>
+          <p:cNvSpPr/>
+          <p:nvPr/>
+        </p:nvSpPr>
+        <p:spPr>
+          <a:xfrm>
+            <a:off x="5334000" y="1524000"/>
+            <a:ext cx="236048" cy="173380"/>
+          </a:xfrm>
+          <a:prstGeom prst="flowChartDecision">
+            <a:avLst/>
+          </a:prstGeom>
+          <a:noFill/>
+          <a:ln w="19050">
+            <a:solidFill>
+              <a:srgbClr val="7030A0"/>
+            </a:solidFill>
+          </a:ln>
+          <a:effectLst/>
+        </p:spPr>
+        <p:style>
+          <a:lnRef idx="1">
+            <a:schemeClr val="accent6"/>
+          </a:lnRef>
+          <a:fillRef idx="2">
+            <a:schemeClr val="accent6"/>
+          </a:fillRef>
+          <a:effectRef idx="1">
+            <a:schemeClr val="accent6"/>
+          </a:effectRef>
+          <a:fontRef idx="minor">
+            <a:schemeClr val="dk1"/>
+          </a:fontRef>
+        </p:style>
+        <p:txBody>
+          <a:bodyPr rtlCol="0" anchor="ctr"/>
+          <a:lstStyle/>
+          <a:p>
+            <a:pPr algn="ctr"/>
+            <a:endParaRPr lang="en-US" sz="1050"/>
+          </a:p>
+        </p:txBody>
+      </p:sp>
+      <p:sp>
+        <p:nvSpPr>
+          <p:cNvPr id="74" name="Rectangle 8">
+            <a:extLst>
+              <a:ext uri="{FF2B5EF4-FFF2-40B4-BE49-F238E27FC236}">
+                <a16:creationId xmlns:a16="http://schemas.microsoft.com/office/drawing/2014/main" id="{F30064A9-569F-4038-B8A0-3AABD5329043}"/>
+              </a:ext>
+            </a:extLst>
+          </p:cNvPr>
+          <p:cNvSpPr/>
+          <p:nvPr/>
+        </p:nvSpPr>
+        <p:spPr>
+          <a:xfrm>
+            <a:off x="5934452" y="1437430"/>
+            <a:ext cx="708186" cy="346760"/>
+          </a:xfrm>
+          <a:prstGeom prst="rect">
+            <a:avLst/>
+          </a:prstGeom>
+          <a:ln w="19050">
+            <a:solidFill>
+              <a:srgbClr val="7030A0"/>
+            </a:solidFill>
+          </a:ln>
+          <a:effectLst/>
+        </p:spPr>
+        <p:style>
+          <a:lnRef idx="1">
+            <a:schemeClr val="accent4"/>
+          </a:lnRef>
+          <a:fillRef idx="2">
+            <a:schemeClr val="accent4"/>
+          </a:fillRef>
+          <a:effectRef idx="1">
+            <a:schemeClr val="accent4"/>
+          </a:effectRef>
+          <a:fontRef idx="minor">
+            <a:schemeClr val="dk1"/>
+          </a:fontRef>
+        </p:style>
+        <p:txBody>
+          <a:bodyPr rtlCol="0" anchor="ctr"/>
+          <a:lstStyle/>
+          <a:p>
+            <a:pPr algn="ctr"/>
+            <a:r>
+              <a:rPr lang="en-US" sz="1050" dirty="0">
+                <a:solidFill>
+                  <a:srgbClr val="7030A0"/>
+                </a:solidFill>
+              </a:rPr>
+              <a:t>Event</a:t>
+            </a:r>
+            <a:endParaRPr lang="en-SG" sz="1050" dirty="0">
+              <a:solidFill>
+                <a:srgbClr val="7030A0"/>
+              </a:solidFill>
+            </a:endParaRPr>
+          </a:p>
+        </p:txBody>
+      </p:sp>
+      <p:sp>
+        <p:nvSpPr>
+          <p:cNvPr id="77" name="TextBox 76">
+            <a:extLst>
+              <a:ext uri="{FF2B5EF4-FFF2-40B4-BE49-F238E27FC236}">
+                <a16:creationId xmlns:a16="http://schemas.microsoft.com/office/drawing/2014/main" id="{92CDF464-5803-4DE8-948D-6B3CC58FB94F}"/>
+              </a:ext>
+            </a:extLst>
+          </p:cNvPr>
+          <p:cNvSpPr txBox="1"/>
+          <p:nvPr/>
+        </p:nvSpPr>
+        <p:spPr>
+          <a:xfrm>
+            <a:off x="4230343" y="2488317"/>
+            <a:ext cx="189257" cy="178683"/>
+          </a:xfrm>
+          <a:prstGeom prst="rect">
+            <a:avLst/>
+          </a:prstGeom>
+          <a:noFill/>
+        </p:spPr>
+        <p:txBody>
+          <a:bodyPr wrap="square" lIns="0" tIns="0" rIns="0" bIns="0" rtlCol="0">
+            <a:noAutofit/>
+          </a:bodyPr>
+          <a:lstStyle/>
+          <a:p>
+            <a:pPr algn="ctr"/>
+            <a:r>
+              <a:rPr lang="en-US" sz="1100" dirty="0">
+                <a:solidFill>
+                  <a:srgbClr val="7030A0"/>
+                </a:solidFill>
+              </a:rPr>
+              <a:t>1</a:t>
+            </a:r>
+            <a:endParaRPr lang="en-SG" sz="1100" dirty="0">
+              <a:solidFill>
+                <a:srgbClr val="7030A0"/>
+              </a:solidFill>
+            </a:endParaRPr>
+          </a:p>
+        </p:txBody>
+      </p:sp>
+      <p:sp>
+        <p:nvSpPr>
+          <p:cNvPr id="82" name="TextBox 81">
+            <a:extLst>
+              <a:ext uri="{FF2B5EF4-FFF2-40B4-BE49-F238E27FC236}">
+                <a16:creationId xmlns:a16="http://schemas.microsoft.com/office/drawing/2014/main" id="{23072898-D4E7-4D7D-B111-BBF253A4B918}"/>
+              </a:ext>
+            </a:extLst>
+          </p:cNvPr>
+          <p:cNvSpPr txBox="1"/>
+          <p:nvPr/>
+        </p:nvSpPr>
+        <p:spPr>
+          <a:xfrm>
+            <a:off x="6248400" y="2209800"/>
+            <a:ext cx="189257" cy="178683"/>
+          </a:xfrm>
+          <a:prstGeom prst="rect">
+            <a:avLst/>
+          </a:prstGeom>
+          <a:noFill/>
+        </p:spPr>
+        <p:txBody>
+          <a:bodyPr wrap="square" lIns="0" tIns="0" rIns="0" bIns="0" rtlCol="0">
+            <a:noAutofit/>
+          </a:bodyPr>
+          <a:lstStyle/>
+          <a:p>
+            <a:pPr algn="ctr"/>
+            <a:r>
+              <a:rPr lang="en-US" sz="1100" dirty="0">
+                <a:solidFill>
+                  <a:srgbClr val="7030A0"/>
+                </a:solidFill>
+              </a:rPr>
+              <a:t>*</a:t>
+            </a:r>
+            <a:endParaRPr lang="en-SG" sz="1100" dirty="0">
+              <a:solidFill>
+                <a:srgbClr val="7030A0"/>
+              </a:solidFill>
+            </a:endParaRPr>
+          </a:p>
+        </p:txBody>
+      </p:sp>
+      <p:sp>
+        <p:nvSpPr>
+          <p:cNvPr id="87" name="Flowchart: Decision 96">
+            <a:extLst>
+              <a:ext uri="{FF2B5EF4-FFF2-40B4-BE49-F238E27FC236}">
+                <a16:creationId xmlns:a16="http://schemas.microsoft.com/office/drawing/2014/main" id="{3FB91537-7120-4B28-9ECF-CCBD67B38AE5}"/>
+              </a:ext>
+            </a:extLst>
+          </p:cNvPr>
+          <p:cNvSpPr/>
+          <p:nvPr/>
+        </p:nvSpPr>
+        <p:spPr>
+          <a:xfrm>
+            <a:off x="6662191" y="1626650"/>
+            <a:ext cx="236048" cy="173380"/>
+          </a:xfrm>
+          <a:prstGeom prst="flowChartDecision">
+            <a:avLst/>
+          </a:prstGeom>
+          <a:solidFill>
+            <a:srgbClr val="7030A0"/>
+          </a:solidFill>
+          <a:ln w="19050">
+            <a:solidFill>
+              <a:srgbClr val="7030A0"/>
+            </a:solidFill>
+          </a:ln>
+          <a:effectLst/>
+        </p:spPr>
+        <p:style>
+          <a:lnRef idx="1">
+            <a:schemeClr val="accent6"/>
+          </a:lnRef>
+          <a:fillRef idx="2">
+            <a:schemeClr val="accent6"/>
+          </a:fillRef>
+          <a:effectRef idx="1">
+            <a:schemeClr val="accent6"/>
+          </a:effectRef>
+          <a:fontRef idx="minor">
+            <a:schemeClr val="dk1"/>
+          </a:fontRef>
+        </p:style>
+        <p:txBody>
+          <a:bodyPr rtlCol="0" anchor="ctr"/>
+          <a:lstStyle/>
+          <a:p>
+            <a:pPr algn="ctr"/>
+            <a:endParaRPr lang="en-US" sz="1050"/>
+          </a:p>
+        </p:txBody>
+      </p:sp>
+      <p:cxnSp>
+        <p:nvCxnSpPr>
+          <p:cNvPr id="88" name="Elbow Connector 78">
+            <a:extLst>
+              <a:ext uri="{FF2B5EF4-FFF2-40B4-BE49-F238E27FC236}">
+                <a16:creationId xmlns:a16="http://schemas.microsoft.com/office/drawing/2014/main" id="{01AEEF0B-5D20-4D47-BCF1-08EAE6BC5E80}"/>
+              </a:ext>
+            </a:extLst>
+          </p:cNvPr>
+          <p:cNvCxnSpPr>
+            <a:cxnSpLocks/>
+            <a:stCxn id="87" idx="3"/>
+            <a:endCxn id="52" idx="3"/>
+          </p:cNvCxnSpPr>
+          <p:nvPr/>
+        </p:nvCxnSpPr>
+        <p:spPr>
+          <a:xfrm>
+            <a:off x="6898239" y="1713340"/>
+            <a:ext cx="1522344" cy="658369"/>
+          </a:xfrm>
+          <a:prstGeom prst="bentConnector3">
+            <a:avLst>
+              <a:gd name="adj1" fmla="val 115016"/>
+            </a:avLst>
+          </a:prstGeom>
+          <a:ln w="19050">
+            <a:solidFill>
+              <a:srgbClr val="7030A0"/>
+            </a:solidFill>
+            <a:headEnd type="none" w="med" len="med"/>
+            <a:tailEnd type="arrow" w="med" len="med"/>
+          </a:ln>
+          <a:effectLst/>
+        </p:spPr>
+        <p:style>
+          <a:lnRef idx="1">
+            <a:schemeClr val="accent2"/>
+          </a:lnRef>
+          <a:fillRef idx="2">
+            <a:schemeClr val="accent2"/>
+          </a:fillRef>
+          <a:effectRef idx="1">
+            <a:schemeClr val="accent2"/>
+          </a:effectRef>
+          <a:fontRef idx="minor">
+            <a:schemeClr val="dk1"/>
+          </a:fontRef>
+        </p:style>
+      </p:cxnSp>
+      <p:cxnSp>
+        <p:nvCxnSpPr>
+          <p:cNvPr id="89" name="Elbow Connector 78">
+            <a:extLst>
+              <a:ext uri="{FF2B5EF4-FFF2-40B4-BE49-F238E27FC236}">
+                <a16:creationId xmlns:a16="http://schemas.microsoft.com/office/drawing/2014/main" id="{27464ABD-A090-4BED-8FF0-D390BBD08D53}"/>
+              </a:ext>
+            </a:extLst>
+          </p:cNvPr>
+          <p:cNvCxnSpPr>
+            <a:cxnSpLocks/>
+            <a:stCxn id="87" idx="3"/>
+            <a:endCxn id="85" idx="3"/>
+          </p:cNvCxnSpPr>
+          <p:nvPr/>
+        </p:nvCxnSpPr>
+        <p:spPr>
+          <a:xfrm>
+            <a:off x="6898239" y="1713340"/>
+            <a:ext cx="1522344" cy="1962723"/>
+          </a:xfrm>
+          <a:prstGeom prst="bentConnector3">
+            <a:avLst>
+              <a:gd name="adj1" fmla="val 115016"/>
+            </a:avLst>
+          </a:prstGeom>
+          <a:ln w="19050">
+            <a:solidFill>
+              <a:srgbClr val="7030A0"/>
+            </a:solidFill>
+            <a:headEnd type="none" w="med" len="med"/>
+            <a:tailEnd type="arrow" w="med" len="med"/>
+          </a:ln>
+          <a:effectLst/>
+        </p:spPr>
+        <p:style>
+          <a:lnRef idx="1">
+            <a:schemeClr val="accent2"/>
+          </a:lnRef>
+          <a:fillRef idx="2">
+            <a:schemeClr val="accent2"/>
+          </a:fillRef>
+          <a:effectRef idx="1">
+            <a:schemeClr val="accent2"/>
+          </a:effectRef>
+          <a:fontRef idx="minor">
+            <a:schemeClr val="dk1"/>
+          </a:fontRef>
+        </p:style>
+      </p:cxnSp>
+      <p:cxnSp>
+        <p:nvCxnSpPr>
+          <p:cNvPr id="90" name="Elbow Connector 78">
+            <a:extLst>
+              <a:ext uri="{FF2B5EF4-FFF2-40B4-BE49-F238E27FC236}">
+                <a16:creationId xmlns:a16="http://schemas.microsoft.com/office/drawing/2014/main" id="{B87C7BE0-A2AA-49B6-9AED-FDD12C526700}"/>
+              </a:ext>
+            </a:extLst>
+          </p:cNvPr>
+          <p:cNvCxnSpPr>
+            <a:cxnSpLocks/>
+            <a:stCxn id="87" idx="3"/>
+            <a:endCxn id="76" idx="3"/>
+          </p:cNvCxnSpPr>
+          <p:nvPr/>
+        </p:nvCxnSpPr>
+        <p:spPr>
+          <a:xfrm>
+            <a:off x="6898239" y="1713340"/>
+            <a:ext cx="1522344" cy="993790"/>
+          </a:xfrm>
+          <a:prstGeom prst="bentConnector3">
+            <a:avLst>
+              <a:gd name="adj1" fmla="val 115016"/>
+            </a:avLst>
+          </a:prstGeom>
+          <a:ln w="19050">
+            <a:solidFill>
+              <a:srgbClr val="7030A0"/>
+            </a:solidFill>
+            <a:headEnd type="none" w="med" len="med"/>
+            <a:tailEnd type="arrow" w="med" len="med"/>
+          </a:ln>
+          <a:effectLst/>
+        </p:spPr>
+        <p:style>
+          <a:lnRef idx="1">
+            <a:schemeClr val="accent2"/>
+          </a:lnRef>
+          <a:fillRef idx="2">
+            <a:schemeClr val="accent2"/>
+          </a:fillRef>
+          <a:effectRef idx="1">
+            <a:schemeClr val="accent2"/>
+          </a:effectRef>
+          <a:fontRef idx="minor">
+            <a:schemeClr val="dk1"/>
+          </a:fontRef>
+        </p:style>
+      </p:cxnSp>
+      <p:sp>
+        <p:nvSpPr>
+          <p:cNvPr id="91" name="TextBox 90">
+            <a:extLst>
+              <a:ext uri="{FF2B5EF4-FFF2-40B4-BE49-F238E27FC236}">
+                <a16:creationId xmlns:a16="http://schemas.microsoft.com/office/drawing/2014/main" id="{A1CE1F18-C939-485B-974C-6D036E9A75EA}"/>
+              </a:ext>
+            </a:extLst>
+          </p:cNvPr>
+          <p:cNvSpPr txBox="1"/>
+          <p:nvPr/>
+        </p:nvSpPr>
+        <p:spPr>
+          <a:xfrm>
+            <a:off x="8396393" y="2224675"/>
+            <a:ext cx="189257" cy="178683"/>
+          </a:xfrm>
+          <a:prstGeom prst="rect">
+            <a:avLst/>
+          </a:prstGeom>
+          <a:noFill/>
+        </p:spPr>
+        <p:txBody>
+          <a:bodyPr wrap="square" lIns="0" tIns="0" rIns="0" bIns="0" rtlCol="0">
+            <a:noAutofit/>
+          </a:bodyPr>
+          <a:lstStyle/>
+          <a:p>
+            <a:pPr algn="ctr"/>
+            <a:r>
+              <a:rPr lang="en-US" sz="1100" dirty="0">
+                <a:solidFill>
+                  <a:srgbClr val="7030A0"/>
+                </a:solidFill>
+              </a:rPr>
+              <a:t>*</a:t>
+            </a:r>
+            <a:endParaRPr lang="en-SG" sz="1100" dirty="0">
+              <a:solidFill>
+                <a:srgbClr val="7030A0"/>
+              </a:solidFill>
+            </a:endParaRPr>
+          </a:p>
+        </p:txBody>
+      </p:sp>
+      <p:cxnSp>
+        <p:nvCxnSpPr>
+          <p:cNvPr id="92" name="Elbow Connector 78">
+            <a:extLst>
+              <a:ext uri="{FF2B5EF4-FFF2-40B4-BE49-F238E27FC236}">
+                <a16:creationId xmlns:a16="http://schemas.microsoft.com/office/drawing/2014/main" id="{2D4B856F-16E5-4870-9160-9AA330EBB9D6}"/>
+              </a:ext>
+            </a:extLst>
+          </p:cNvPr>
+          <p:cNvCxnSpPr>
+            <a:cxnSpLocks/>
+            <a:stCxn id="134" idx="2"/>
+            <a:endCxn id="49" idx="0"/>
+          </p:cNvCxnSpPr>
+          <p:nvPr/>
+        </p:nvCxnSpPr>
+        <p:spPr>
+          <a:xfrm rot="5400000">
+            <a:off x="5236978" y="2060890"/>
+            <a:ext cx="827489" cy="729249"/>
+          </a:xfrm>
+          <a:prstGeom prst="bentConnector3">
+            <a:avLst>
+              <a:gd name="adj1" fmla="val 50000"/>
+            </a:avLst>
+          </a:prstGeom>
+          <a:ln w="19050">
+            <a:solidFill>
+              <a:srgbClr val="7030A0"/>
+            </a:solidFill>
+            <a:headEnd type="none" w="med" len="med"/>
+            <a:tailEnd type="arrow" w="med" len="med"/>
+          </a:ln>
+          <a:effectLst/>
+        </p:spPr>
+        <p:style>
+          <a:lnRef idx="1">
+            <a:schemeClr val="accent2"/>
+          </a:lnRef>
+          <a:fillRef idx="2">
+            <a:schemeClr val="accent2"/>
+          </a:fillRef>
+          <a:effectRef idx="1">
+            <a:schemeClr val="accent2"/>
+          </a:effectRef>
+          <a:fontRef idx="minor">
+            <a:schemeClr val="dk1"/>
+          </a:fontRef>
+        </p:style>
+      </p:cxnSp>
+      <p:sp>
+        <p:nvSpPr>
+          <p:cNvPr id="94" name="Rectangle 8">
+            <a:extLst>
+              <a:ext uri="{FF2B5EF4-FFF2-40B4-BE49-F238E27FC236}">
+                <a16:creationId xmlns:a16="http://schemas.microsoft.com/office/drawing/2014/main" id="{2DB65AB3-A092-40E3-901D-BB15E2348F5F}"/>
+              </a:ext>
+            </a:extLst>
+          </p:cNvPr>
+          <p:cNvSpPr/>
+          <p:nvPr/>
+        </p:nvSpPr>
+        <p:spPr>
+          <a:xfrm>
+            <a:off x="6078908" y="2347620"/>
+            <a:ext cx="708186" cy="346760"/>
+          </a:xfrm>
+          <a:prstGeom prst="rect">
+            <a:avLst/>
+          </a:prstGeom>
+          <a:ln w="19050">
+            <a:solidFill>
+              <a:srgbClr val="7030A0"/>
+            </a:solidFill>
+          </a:ln>
+          <a:effectLst/>
+        </p:spPr>
+        <p:style>
+          <a:lnRef idx="1">
+            <a:schemeClr val="accent4"/>
+          </a:lnRef>
+          <a:fillRef idx="2">
+            <a:schemeClr val="accent4"/>
+          </a:fillRef>
+          <a:effectRef idx="1">
+            <a:schemeClr val="accent4"/>
+          </a:effectRef>
+          <a:fontRef idx="minor">
+            <a:schemeClr val="dk1"/>
+          </a:fontRef>
+        </p:style>
+        <p:txBody>
+          <a:bodyPr rtlCol="0" anchor="ctr"/>
+          <a:lstStyle/>
+          <a:p>
+            <a:pPr algn="ctr"/>
+            <a:r>
+              <a:rPr lang="en-US" sz="1050" dirty="0">
+                <a:solidFill>
+                  <a:srgbClr val="7030A0"/>
+                </a:solidFill>
+              </a:rPr>
+              <a:t>Poll</a:t>
+            </a:r>
+            <a:endParaRPr lang="en-SG" sz="1050" dirty="0">
+              <a:solidFill>
+                <a:srgbClr val="7030A0"/>
+              </a:solidFill>
+            </a:endParaRPr>
+          </a:p>
+        </p:txBody>
+      </p:sp>
+      <p:cxnSp>
+        <p:nvCxnSpPr>
+          <p:cNvPr id="96" name="Elbow Connector 63">
+            <a:extLst>
+              <a:ext uri="{FF2B5EF4-FFF2-40B4-BE49-F238E27FC236}">
+                <a16:creationId xmlns:a16="http://schemas.microsoft.com/office/drawing/2014/main" id="{2A373F2C-5170-4F1B-A30B-D69384CB4C52}"/>
+              </a:ext>
+            </a:extLst>
+          </p:cNvPr>
+          <p:cNvCxnSpPr>
+            <a:cxnSpLocks/>
+            <a:stCxn id="67" idx="3"/>
+            <a:endCxn id="74" idx="1"/>
+          </p:cNvCxnSpPr>
+          <p:nvPr/>
+        </p:nvCxnSpPr>
+        <p:spPr>
+          <a:xfrm>
+            <a:off x="5570048" y="1610690"/>
+            <a:ext cx="364404" cy="120"/>
+          </a:xfrm>
+          <a:prstGeom prst="bentConnector3">
+            <a:avLst>
+              <a:gd name="adj1" fmla="val 50000"/>
+            </a:avLst>
+          </a:prstGeom>
+          <a:ln w="19050">
+            <a:solidFill>
+              <a:srgbClr val="7030A0"/>
+            </a:solidFill>
+            <a:headEnd type="none" w="med" len="med"/>
+            <a:tailEnd type="arrow" w="med" len="med"/>
+          </a:ln>
+          <a:effectLst/>
+        </p:spPr>
+        <p:style>
+          <a:lnRef idx="1">
+            <a:schemeClr val="accent2"/>
+          </a:lnRef>
+          <a:fillRef idx="2">
+            <a:schemeClr val="accent2"/>
+          </a:fillRef>
+          <a:effectRef idx="1">
+            <a:schemeClr val="accent2"/>
+          </a:effectRef>
+          <a:fontRef idx="minor">
+            <a:schemeClr val="dk1"/>
+          </a:fontRef>
+        </p:style>
+      </p:cxnSp>
+      <p:cxnSp>
+        <p:nvCxnSpPr>
+          <p:cNvPr id="98" name="Elbow Connector 63">
+            <a:extLst>
+              <a:ext uri="{FF2B5EF4-FFF2-40B4-BE49-F238E27FC236}">
+                <a16:creationId xmlns:a16="http://schemas.microsoft.com/office/drawing/2014/main" id="{0FA04F10-68A6-4C8B-95CD-3375B3ECEAD5}"/>
+              </a:ext>
+            </a:extLst>
+          </p:cNvPr>
+          <p:cNvCxnSpPr>
+            <a:cxnSpLocks/>
+            <a:stCxn id="87" idx="3"/>
+            <a:endCxn id="94" idx="0"/>
+          </p:cNvCxnSpPr>
+          <p:nvPr/>
+        </p:nvCxnSpPr>
+        <p:spPr>
+          <a:xfrm flipH="1">
+            <a:off x="6433001" y="1713340"/>
+            <a:ext cx="465238" cy="634280"/>
+          </a:xfrm>
+          <a:prstGeom prst="bentConnector4">
+            <a:avLst>
+              <a:gd name="adj1" fmla="val -49136"/>
+              <a:gd name="adj2" fmla="val 56834"/>
+            </a:avLst>
+          </a:prstGeom>
+          <a:ln w="19050">
+            <a:solidFill>
+              <a:srgbClr val="7030A0"/>
+            </a:solidFill>
+            <a:headEnd type="none" w="med" len="med"/>
+            <a:tailEnd type="arrow" w="med" len="med"/>
+          </a:ln>
+          <a:effectLst/>
+        </p:spPr>
+        <p:style>
+          <a:lnRef idx="1">
+            <a:schemeClr val="accent2"/>
+          </a:lnRef>
+          <a:fillRef idx="2">
+            <a:schemeClr val="accent2"/>
+          </a:fillRef>
+          <a:effectRef idx="1">
+            <a:schemeClr val="accent2"/>
+          </a:effectRef>
+          <a:fontRef idx="minor">
+            <a:schemeClr val="dk1"/>
+          </a:fontRef>
+        </p:style>
+      </p:cxnSp>
+      <p:sp>
+        <p:nvSpPr>
+          <p:cNvPr id="102" name="TextBox 101">
+            <a:extLst>
+              <a:ext uri="{FF2B5EF4-FFF2-40B4-BE49-F238E27FC236}">
+                <a16:creationId xmlns:a16="http://schemas.microsoft.com/office/drawing/2014/main" id="{0B4CF4D0-DC1F-42A7-8C03-09DE1FB7463F}"/>
+              </a:ext>
+            </a:extLst>
+          </p:cNvPr>
+          <p:cNvSpPr txBox="1"/>
+          <p:nvPr/>
+        </p:nvSpPr>
+        <p:spPr>
+          <a:xfrm>
+            <a:off x="5715000" y="1650117"/>
+            <a:ext cx="189257" cy="178683"/>
+          </a:xfrm>
+          <a:prstGeom prst="rect">
+            <a:avLst/>
+          </a:prstGeom>
+          <a:noFill/>
+        </p:spPr>
+        <p:txBody>
+          <a:bodyPr wrap="square" lIns="0" tIns="0" rIns="0" bIns="0" rtlCol="0">
+            <a:noAutofit/>
+          </a:bodyPr>
+          <a:lstStyle/>
+          <a:p>
+            <a:pPr algn="ctr"/>
+            <a:r>
+              <a:rPr lang="en-US" sz="1100" dirty="0">
+                <a:solidFill>
+                  <a:srgbClr val="7030A0"/>
+                </a:solidFill>
+              </a:rPr>
+              <a:t>*</a:t>
+            </a:r>
+            <a:endParaRPr lang="en-SG" sz="1100" dirty="0">
+              <a:solidFill>
+                <a:srgbClr val="7030A0"/>
+              </a:solidFill>
+            </a:endParaRPr>
+          </a:p>
+        </p:txBody>
+      </p:sp>
+      <p:cxnSp>
+        <p:nvCxnSpPr>
+          <p:cNvPr id="106" name="Elbow Connector 78">
+            <a:extLst>
+              <a:ext uri="{FF2B5EF4-FFF2-40B4-BE49-F238E27FC236}">
+                <a16:creationId xmlns:a16="http://schemas.microsoft.com/office/drawing/2014/main" id="{8611AD2B-00B2-480B-BEC0-792473F29B52}"/>
+              </a:ext>
+            </a:extLst>
+          </p:cNvPr>
+          <p:cNvCxnSpPr>
+            <a:cxnSpLocks/>
+            <a:stCxn id="57" idx="3"/>
+            <a:endCxn id="59" idx="2"/>
+          </p:cNvCxnSpPr>
+          <p:nvPr/>
+        </p:nvCxnSpPr>
+        <p:spPr>
+          <a:xfrm rot="5400000" flipH="1" flipV="1">
+            <a:off x="4097880" y="1935194"/>
+            <a:ext cx="793898" cy="504068"/>
+          </a:xfrm>
+          <a:prstGeom prst="bentConnector3">
+            <a:avLst>
+              <a:gd name="adj1" fmla="val 50000"/>
+            </a:avLst>
+          </a:prstGeom>
+          <a:ln w="19050">
+            <a:solidFill>
+              <a:srgbClr val="7030A0"/>
+            </a:solidFill>
+            <a:headEnd type="none" w="med" len="med"/>
+            <a:tailEnd type="arrow" w="med" len="med"/>
+          </a:ln>
+          <a:effectLst/>
+        </p:spPr>
+        <p:style>
+          <a:lnRef idx="1">
+            <a:schemeClr val="accent2"/>
+          </a:lnRef>
+          <a:fillRef idx="2">
+            <a:schemeClr val="accent2"/>
+          </a:fillRef>
+          <a:effectRef idx="1">
+            <a:schemeClr val="accent2"/>
+          </a:effectRef>
+          <a:fontRef idx="minor">
+            <a:schemeClr val="dk1"/>
+          </a:fontRef>
+        </p:style>
+      </p:cxnSp>
+      <p:cxnSp>
+        <p:nvCxnSpPr>
+          <p:cNvPr id="121" name="Elbow Connector 78">
+            <a:extLst>
+              <a:ext uri="{FF2B5EF4-FFF2-40B4-BE49-F238E27FC236}">
+                <a16:creationId xmlns:a16="http://schemas.microsoft.com/office/drawing/2014/main" id="{24854726-3F62-4C33-AA28-14F1D5712C0A}"/>
+              </a:ext>
+            </a:extLst>
+          </p:cNvPr>
+          <p:cNvCxnSpPr>
+            <a:cxnSpLocks/>
+            <a:stCxn id="94" idx="1"/>
+          </p:cNvCxnSpPr>
+          <p:nvPr/>
+        </p:nvCxnSpPr>
+        <p:spPr>
+          <a:xfrm rot="10800000" flipV="1">
+            <a:off x="5802718" y="2521000"/>
+            <a:ext cx="276191" cy="318258"/>
+          </a:xfrm>
+          <a:prstGeom prst="bentConnector2">
+            <a:avLst/>
+          </a:prstGeom>
+          <a:ln w="19050">
+            <a:solidFill>
+              <a:srgbClr val="7030A0"/>
+            </a:solidFill>
+            <a:headEnd type="none" w="med" len="med"/>
+            <a:tailEnd type="arrow" w="med" len="med"/>
+          </a:ln>
+          <a:effectLst/>
+        </p:spPr>
+        <p:style>
+          <a:lnRef idx="1">
+            <a:schemeClr val="accent2"/>
+          </a:lnRef>
+          <a:fillRef idx="2">
+            <a:schemeClr val="accent2"/>
+          </a:fillRef>
+          <a:effectRef idx="1">
+            <a:schemeClr val="accent2"/>
+          </a:effectRef>
+          <a:fontRef idx="minor">
+            <a:schemeClr val="dk1"/>
+          </a:fontRef>
+        </p:style>
+      </p:cxnSp>
+      <p:sp>
+        <p:nvSpPr>
+          <p:cNvPr id="130" name="TextBox 129">
+            <a:extLst>
+              <a:ext uri="{FF2B5EF4-FFF2-40B4-BE49-F238E27FC236}">
+                <a16:creationId xmlns:a16="http://schemas.microsoft.com/office/drawing/2014/main" id="{A99CB9DD-2A15-44DD-A825-91E515DAE204}"/>
+              </a:ext>
+            </a:extLst>
+          </p:cNvPr>
+          <p:cNvSpPr txBox="1"/>
+          <p:nvPr/>
+        </p:nvSpPr>
+        <p:spPr>
+          <a:xfrm>
+            <a:off x="5830543" y="2667000"/>
+            <a:ext cx="189257" cy="178683"/>
+          </a:xfrm>
+          <a:prstGeom prst="rect">
+            <a:avLst/>
+          </a:prstGeom>
+          <a:noFill/>
+        </p:spPr>
+        <p:txBody>
+          <a:bodyPr wrap="square" lIns="0" tIns="0" rIns="0" bIns="0" rtlCol="0">
+            <a:noAutofit/>
+          </a:bodyPr>
+          <a:lstStyle/>
+          <a:p>
+            <a:pPr algn="ctr"/>
+            <a:r>
+              <a:rPr lang="en-US" sz="1100" dirty="0">
+                <a:solidFill>
+                  <a:srgbClr val="7030A0"/>
+                </a:solidFill>
+              </a:rPr>
+              <a:t>*</a:t>
+            </a:r>
+            <a:endParaRPr lang="en-SG" sz="1100" dirty="0">
+              <a:solidFill>
+                <a:srgbClr val="7030A0"/>
+              </a:solidFill>
+            </a:endParaRPr>
+          </a:p>
+        </p:txBody>
+      </p:sp>
+      <p:sp>
+        <p:nvSpPr>
+          <p:cNvPr id="134" name="Flowchart: Decision 96">
+            <a:extLst>
+              <a:ext uri="{FF2B5EF4-FFF2-40B4-BE49-F238E27FC236}">
+                <a16:creationId xmlns:a16="http://schemas.microsoft.com/office/drawing/2014/main" id="{ED012079-D17B-476E-AC66-B3581506F70D}"/>
+              </a:ext>
+            </a:extLst>
+          </p:cNvPr>
+          <p:cNvSpPr/>
+          <p:nvPr/>
+        </p:nvSpPr>
+        <p:spPr>
+          <a:xfrm>
+            <a:off x="5929527" y="1793768"/>
+            <a:ext cx="171637" cy="218002"/>
+          </a:xfrm>
+          <a:prstGeom prst="flowChartDecision">
+            <a:avLst/>
+          </a:prstGeom>
+          <a:solidFill>
+            <a:srgbClr val="7030A0"/>
+          </a:solidFill>
+          <a:ln w="19050">
+            <a:solidFill>
+              <a:srgbClr val="7030A0"/>
+            </a:solidFill>
+          </a:ln>
+          <a:effectLst/>
+        </p:spPr>
+        <p:style>
+          <a:lnRef idx="1">
+            <a:schemeClr val="accent6"/>
+          </a:lnRef>
+          <a:fillRef idx="2">
+            <a:schemeClr val="accent6"/>
+          </a:fillRef>
+          <a:effectRef idx="1">
+            <a:schemeClr val="accent6"/>
+          </a:effectRef>
+          <a:fontRef idx="minor">
+            <a:schemeClr val="dk1"/>
+          </a:fontRef>
+        </p:style>
+        <p:txBody>
+          <a:bodyPr rtlCol="0" anchor="ctr"/>
+          <a:lstStyle/>
+          <a:p>
+            <a:pPr algn="ctr"/>
+            <a:endParaRPr lang="en-US" sz="1050"/>
+          </a:p>
+        </p:txBody>
+      </p:sp>
+      <p:sp>
+        <p:nvSpPr>
+          <p:cNvPr id="138" name="TextBox 137">
+            <a:extLst>
+              <a:ext uri="{FF2B5EF4-FFF2-40B4-BE49-F238E27FC236}">
+                <a16:creationId xmlns:a16="http://schemas.microsoft.com/office/drawing/2014/main" id="{3BB5DC5B-9EF2-41F7-8676-FD80EA9BEF59}"/>
+              </a:ext>
+            </a:extLst>
+          </p:cNvPr>
+          <p:cNvSpPr txBox="1"/>
+          <p:nvPr/>
+        </p:nvSpPr>
+        <p:spPr>
+          <a:xfrm>
+            <a:off x="6096000" y="1802517"/>
+            <a:ext cx="189257" cy="178683"/>
+          </a:xfrm>
+          <a:prstGeom prst="rect">
+            <a:avLst/>
+          </a:prstGeom>
+          <a:noFill/>
+        </p:spPr>
+        <p:txBody>
+          <a:bodyPr wrap="square" lIns="0" tIns="0" rIns="0" bIns="0" rtlCol="0">
+            <a:noAutofit/>
+          </a:bodyPr>
+          <a:lstStyle/>
+          <a:p>
+            <a:pPr algn="ctr"/>
+            <a:r>
+              <a:rPr lang="en-US" sz="1100" dirty="0">
+                <a:solidFill>
+                  <a:srgbClr val="7030A0"/>
+                </a:solidFill>
+              </a:rPr>
+              <a:t>1</a:t>
+            </a:r>
+            <a:endParaRPr lang="en-SG" sz="1100" dirty="0">
+              <a:solidFill>
+                <a:srgbClr val="7030A0"/>
+              </a:solidFill>
+            </a:endParaRPr>
+          </a:p>
+        </p:txBody>
+      </p:sp>
+      <p:sp>
+        <p:nvSpPr>
+          <p:cNvPr id="139" name="Rectangle 138">
+            <a:extLst>
+              <a:ext uri="{FF2B5EF4-FFF2-40B4-BE49-F238E27FC236}">
+                <a16:creationId xmlns:a16="http://schemas.microsoft.com/office/drawing/2014/main" id="{9DB19205-7422-4C6E-B938-80B607F33F10}"/>
+              </a:ext>
+            </a:extLst>
+          </p:cNvPr>
+          <p:cNvSpPr/>
+          <p:nvPr/>
+        </p:nvSpPr>
+        <p:spPr>
+          <a:xfrm>
+            <a:off x="4644034" y="2667000"/>
+            <a:ext cx="679994" cy="215444"/>
+          </a:xfrm>
+          <a:prstGeom prst="rect">
+            <a:avLst/>
+          </a:prstGeom>
+        </p:spPr>
+        <p:txBody>
+          <a:bodyPr wrap="none">
+            <a:spAutoFit/>
+          </a:bodyPr>
+          <a:lstStyle/>
+          <a:p>
+            <a:pPr algn="ctr"/>
+            <a:r>
+              <a:rPr lang="en-US" sz="800" dirty="0">
+                <a:solidFill>
+                  <a:srgbClr val="7030A0"/>
+                </a:solidFill>
+              </a:rPr>
+              <a:t>Participants</a:t>
+            </a:r>
+            <a:endParaRPr lang="en-SG" sz="800" dirty="0">
+              <a:solidFill>
+                <a:srgbClr val="7030A0"/>
+              </a:solidFill>
+            </a:endParaRPr>
+          </a:p>
+        </p:txBody>
+      </p:sp>
+      <p:sp>
+        <p:nvSpPr>
+          <p:cNvPr id="140" name="Rectangle 139">
+            <a:extLst>
+              <a:ext uri="{FF2B5EF4-FFF2-40B4-BE49-F238E27FC236}">
+                <a16:creationId xmlns:a16="http://schemas.microsoft.com/office/drawing/2014/main" id="{BC03E0AB-9C0C-42DD-B339-B2B8E5C266CB}"/>
+              </a:ext>
+            </a:extLst>
+          </p:cNvPr>
+          <p:cNvSpPr/>
+          <p:nvPr/>
+        </p:nvSpPr>
+        <p:spPr>
+          <a:xfrm>
+            <a:off x="5257800" y="2590800"/>
+            <a:ext cx="620684" cy="215444"/>
+          </a:xfrm>
+          <a:prstGeom prst="rect">
+            <a:avLst/>
+          </a:prstGeom>
+        </p:spPr>
+        <p:txBody>
+          <a:bodyPr wrap="none">
+            <a:spAutoFit/>
+          </a:bodyPr>
+          <a:lstStyle/>
+          <a:p>
+            <a:pPr algn="ctr"/>
+            <a:r>
+              <a:rPr lang="en-US" sz="800" dirty="0">
+                <a:solidFill>
+                  <a:srgbClr val="7030A0"/>
+                </a:solidFill>
+              </a:rPr>
+              <a:t>Voter Lists</a:t>
+            </a:r>
+            <a:endParaRPr lang="en-SG" sz="800" dirty="0">
+              <a:solidFill>
+                <a:srgbClr val="7030A0"/>
+              </a:solidFill>
+            </a:endParaRPr>
+          </a:p>
+        </p:txBody>
+      </p:sp>
+      <p:cxnSp>
+        <p:nvCxnSpPr>
+          <p:cNvPr id="166" name="Elbow Connector 106">
+            <a:extLst>
+              <a:ext uri="{FF2B5EF4-FFF2-40B4-BE49-F238E27FC236}">
+                <a16:creationId xmlns:a16="http://schemas.microsoft.com/office/drawing/2014/main" id="{A4BDBC12-ADFB-4153-A1B7-EA92736EE571}"/>
+              </a:ext>
+            </a:extLst>
+          </p:cNvPr>
+          <p:cNvCxnSpPr>
+            <a:cxnSpLocks/>
+            <a:stCxn id="9" idx="3"/>
+            <a:endCxn id="74" idx="0"/>
+          </p:cNvCxnSpPr>
+          <p:nvPr/>
+        </p:nvCxnSpPr>
+        <p:spPr>
+          <a:xfrm rot="5400000" flipH="1" flipV="1">
+            <a:off x="3605014" y="40783"/>
+            <a:ext cx="1286883" cy="4080179"/>
+          </a:xfrm>
+          <a:prstGeom prst="bentConnector3">
+            <a:avLst>
+              <a:gd name="adj1" fmla="val 117764"/>
+            </a:avLst>
+          </a:prstGeom>
+          <a:ln w="19050">
+            <a:solidFill>
+              <a:srgbClr val="7030A0"/>
+            </a:solidFill>
+            <a:prstDash val="solid"/>
+            <a:headEnd type="none" w="med" len="med"/>
+            <a:tailEnd type="arrow" w="med" len="med"/>
+          </a:ln>
+          <a:effectLst/>
+        </p:spPr>
+        <p:style>
+          <a:lnRef idx="1">
+            <a:schemeClr val="accent2"/>
+          </a:lnRef>
+          <a:fillRef idx="2">
+            <a:schemeClr val="accent2"/>
+          </a:fillRef>
+          <a:effectRef idx="1">
+            <a:schemeClr val="accent2"/>
+          </a:effectRef>
+          <a:fontRef idx="minor">
+            <a:schemeClr val="dk1"/>
+          </a:fontRef>
+        </p:style>
+      </p:cxnSp>
+      <p:sp>
+        <p:nvSpPr>
+          <p:cNvPr id="169" name="TextBox 168">
+            <a:extLst>
+              <a:ext uri="{FF2B5EF4-FFF2-40B4-BE49-F238E27FC236}">
+                <a16:creationId xmlns:a16="http://schemas.microsoft.com/office/drawing/2014/main" id="{5F779E65-9D78-4AFE-A98D-9D23384FA9DD}"/>
+              </a:ext>
+            </a:extLst>
+          </p:cNvPr>
+          <p:cNvSpPr txBox="1"/>
+          <p:nvPr/>
+        </p:nvSpPr>
+        <p:spPr>
+          <a:xfrm>
+            <a:off x="5410223" y="987464"/>
+            <a:ext cx="833003" cy="261610"/>
+          </a:xfrm>
+          <a:prstGeom prst="rect">
+            <a:avLst/>
+          </a:prstGeom>
+          <a:noFill/>
+        </p:spPr>
+        <p:txBody>
+          <a:bodyPr wrap="square" rtlCol="0">
+            <a:spAutoFit/>
+          </a:bodyPr>
+          <a:lstStyle/>
+          <a:p>
+            <a:pPr algn="r"/>
+            <a:r>
+              <a:rPr lang="en-US" sz="1100" dirty="0">
+                <a:solidFill>
+                  <a:srgbClr val="7030A0"/>
+                </a:solidFill>
+              </a:rPr>
+              <a:t>filtered list</a:t>
+            </a:r>
+            <a:endParaRPr lang="en-SG" sz="1100" dirty="0">
+              <a:solidFill>
+                <a:srgbClr val="7030A0"/>
+              </a:solidFill>
+            </a:endParaRPr>
+          </a:p>
+        </p:txBody>
+      </p:sp>
+      <p:sp>
+        <p:nvSpPr>
+          <p:cNvPr id="170" name="TextBox 169">
+            <a:extLst>
+              <a:ext uri="{FF2B5EF4-FFF2-40B4-BE49-F238E27FC236}">
+                <a16:creationId xmlns:a16="http://schemas.microsoft.com/office/drawing/2014/main" id="{D15454CE-97C0-43D6-9436-087DC37C67A2}"/>
+              </a:ext>
+            </a:extLst>
+          </p:cNvPr>
+          <p:cNvSpPr txBox="1"/>
+          <p:nvPr/>
+        </p:nvSpPr>
+        <p:spPr>
+          <a:xfrm>
+            <a:off x="6363943" y="1219200"/>
+            <a:ext cx="189257" cy="178683"/>
+          </a:xfrm>
+          <a:prstGeom prst="rect">
+            <a:avLst/>
+          </a:prstGeom>
+          <a:noFill/>
+        </p:spPr>
+        <p:txBody>
+          <a:bodyPr wrap="square" lIns="0" tIns="0" rIns="0" bIns="0" rtlCol="0">
+            <a:noAutofit/>
+          </a:bodyPr>
+          <a:lstStyle/>
+          <a:p>
+            <a:pPr algn="ctr"/>
+            <a:r>
+              <a:rPr lang="en-US" sz="1100" dirty="0">
+                <a:solidFill>
+                  <a:srgbClr val="7030A0"/>
+                </a:solidFill>
+              </a:rPr>
+              <a:t>1</a:t>
+            </a:r>
+            <a:endParaRPr lang="en-SG" sz="1100" dirty="0">
+              <a:solidFill>
+                <a:srgbClr val="7030A0"/>
+              </a:solidFill>
+            </a:endParaRPr>
+          </a:p>
+        </p:txBody>
+      </p:sp>
     </p:spTree>
     <p:extLst>
       <p:ext uri="{BB962C8B-B14F-4D97-AF65-F5344CB8AC3E}">

</xml_diff>

<commit_message>
Standardise capitalisation for "component" and "implementation" across developer guide. Add figure numbers for images Standardise capitalisation across title headings Update class diagrams
</commit_message>
<xml_diff>
--- a/docs/diagrams/ModelComponentClassDiagram.pptx
+++ b/docs/diagrams/ModelComponentClassDiagram.pptx
@@ -208,7 +208,7 @@
           <a:p>
             <a:fld id="{F5CC4B3F-88C1-4FFA-B1B6-F41C21DC6924}" type="datetimeFigureOut">
               <a:rPr lang="en-US" smtClean="0"/>
-              <a:t>6/27/2018</a:t>
+              <a:t>21-Oct-18</a:t>
             </a:fld>
             <a:endParaRPr lang="en-US"/>
           </a:p>
@@ -654,7 +654,7 @@
           <a:p>
             <a:fld id="{78C97017-6FC3-485B-9764-EAC9E56C1D49}" type="datetimeFigureOut">
               <a:rPr lang="en-US" smtClean="0"/>
-              <a:t>6/27/2018</a:t>
+              <a:t>21-Oct-18</a:t>
             </a:fld>
             <a:endParaRPr lang="en-US"/>
           </a:p>
@@ -822,7 +822,7 @@
           <a:p>
             <a:fld id="{78C97017-6FC3-485B-9764-EAC9E56C1D49}" type="datetimeFigureOut">
               <a:rPr lang="en-US" smtClean="0"/>
-              <a:t>6/27/2018</a:t>
+              <a:t>21-Oct-18</a:t>
             </a:fld>
             <a:endParaRPr lang="en-US"/>
           </a:p>
@@ -1000,7 +1000,7 @@
           <a:p>
             <a:fld id="{78C97017-6FC3-485B-9764-EAC9E56C1D49}" type="datetimeFigureOut">
               <a:rPr lang="en-US" smtClean="0"/>
-              <a:t>6/27/2018</a:t>
+              <a:t>21-Oct-18</a:t>
             </a:fld>
             <a:endParaRPr lang="en-US"/>
           </a:p>
@@ -1168,7 +1168,7 @@
           <a:p>
             <a:fld id="{78C97017-6FC3-485B-9764-EAC9E56C1D49}" type="datetimeFigureOut">
               <a:rPr lang="en-US" smtClean="0"/>
-              <a:t>6/27/2018</a:t>
+              <a:t>21-Oct-18</a:t>
             </a:fld>
             <a:endParaRPr lang="en-US"/>
           </a:p>
@@ -1413,7 +1413,7 @@
           <a:p>
             <a:fld id="{78C97017-6FC3-485B-9764-EAC9E56C1D49}" type="datetimeFigureOut">
               <a:rPr lang="en-US" smtClean="0"/>
-              <a:t>6/27/2018</a:t>
+              <a:t>21-Oct-18</a:t>
             </a:fld>
             <a:endParaRPr lang="en-US"/>
           </a:p>
@@ -1698,7 +1698,7 @@
           <a:p>
             <a:fld id="{78C97017-6FC3-485B-9764-EAC9E56C1D49}" type="datetimeFigureOut">
               <a:rPr lang="en-US" smtClean="0"/>
-              <a:t>6/27/2018</a:t>
+              <a:t>21-Oct-18</a:t>
             </a:fld>
             <a:endParaRPr lang="en-US"/>
           </a:p>
@@ -2117,7 +2117,7 @@
           <a:p>
             <a:fld id="{78C97017-6FC3-485B-9764-EAC9E56C1D49}" type="datetimeFigureOut">
               <a:rPr lang="en-US" smtClean="0"/>
-              <a:t>6/27/2018</a:t>
+              <a:t>21-Oct-18</a:t>
             </a:fld>
             <a:endParaRPr lang="en-US"/>
           </a:p>
@@ -2234,7 +2234,7 @@
           <a:p>
             <a:fld id="{78C97017-6FC3-485B-9764-EAC9E56C1D49}" type="datetimeFigureOut">
               <a:rPr lang="en-US" smtClean="0"/>
-              <a:t>6/27/2018</a:t>
+              <a:t>21-Oct-18</a:t>
             </a:fld>
             <a:endParaRPr lang="en-US"/>
           </a:p>
@@ -2329,7 +2329,7 @@
           <a:p>
             <a:fld id="{78C97017-6FC3-485B-9764-EAC9E56C1D49}" type="datetimeFigureOut">
               <a:rPr lang="en-US" smtClean="0"/>
-              <a:t>6/27/2018</a:t>
+              <a:t>21-Oct-18</a:t>
             </a:fld>
             <a:endParaRPr lang="en-US"/>
           </a:p>
@@ -2604,7 +2604,7 @@
           <a:p>
             <a:fld id="{78C97017-6FC3-485B-9764-EAC9E56C1D49}" type="datetimeFigureOut">
               <a:rPr lang="en-US" smtClean="0"/>
-              <a:t>6/27/2018</a:t>
+              <a:t>21-Oct-18</a:t>
             </a:fld>
             <a:endParaRPr lang="en-US"/>
           </a:p>
@@ -2856,7 +2856,7 @@
           <a:p>
             <a:fld id="{78C97017-6FC3-485B-9764-EAC9E56C1D49}" type="datetimeFigureOut">
               <a:rPr lang="en-US" smtClean="0"/>
-              <a:t>6/27/2018</a:t>
+              <a:t>21-Oct-18</a:t>
             </a:fld>
             <a:endParaRPr lang="en-US"/>
           </a:p>
@@ -3067,7 +3067,7 @@
           <a:p>
             <a:fld id="{78C97017-6FC3-485B-9764-EAC9E56C1D49}" type="datetimeFigureOut">
               <a:rPr lang="en-US" smtClean="0"/>
-              <a:t>6/27/2018</a:t>
+              <a:t>21-Oct-18</a:t>
             </a:fld>
             <a:endParaRPr lang="en-US"/>
           </a:p>
@@ -3451,7 +3451,7 @@
         <p:spPr>
           <a:xfrm>
             <a:off x="1119865" y="1600200"/>
-            <a:ext cx="7490735" cy="3124200"/>
+            <a:ext cx="7490735" cy="3352800"/>
           </a:xfrm>
           <a:prstGeom prst="roundRect">
             <a:avLst>
@@ -3994,7 +3994,7 @@
           <a:p>
             <a:pPr algn="ctr"/>
             <a:r>
-              <a:rPr lang="en-US" sz="1050" dirty="0" err="1" smtClean="0">
+              <a:rPr lang="en-US" sz="1050" dirty="0" err="1">
                 <a:solidFill>
                   <a:srgbClr val="7030A0"/>
                 </a:solidFill>
@@ -5023,14 +5023,6 @@
               </a:rPr>
               <a:t>&lt;&lt;interface&gt;&gt;</a:t>
             </a:r>
-            <a:r>
-              <a:rPr lang="en-US" sz="1050">
-                <a:solidFill>
-                  <a:srgbClr val="7030A0"/>
-                </a:solidFill>
-              </a:rPr>
-              <a:t/>
-            </a:r>
             <a:br>
               <a:rPr lang="en-US" sz="1050">
                 <a:solidFill>
@@ -5623,6 +5615,345 @@
             <a:prstDash val="sysDot"/>
             <a:headEnd type="none" w="med" len="med"/>
             <a:tailEnd type="none" w="med" len="med"/>
+          </a:ln>
+          <a:effectLst/>
+        </p:spPr>
+        <p:style>
+          <a:lnRef idx="1">
+            <a:schemeClr val="accent2"/>
+          </a:lnRef>
+          <a:fillRef idx="2">
+            <a:schemeClr val="accent2"/>
+          </a:fillRef>
+          <a:effectRef idx="1">
+            <a:schemeClr val="accent2"/>
+          </a:effectRef>
+          <a:fontRef idx="minor">
+            <a:schemeClr val="dk1"/>
+          </a:fontRef>
+        </p:style>
+      </p:cxnSp>
+      <p:sp>
+        <p:nvSpPr>
+          <p:cNvPr id="56" name="Rectangle 8">
+            <a:extLst>
+              <a:ext uri="{FF2B5EF4-FFF2-40B4-BE49-F238E27FC236}">
+                <a16:creationId xmlns:a16="http://schemas.microsoft.com/office/drawing/2014/main" id="{426DAC2B-FDD5-494F-92B7-B52161E4A441}"/>
+              </a:ext>
+            </a:extLst>
+          </p:cNvPr>
+          <p:cNvSpPr/>
+          <p:nvPr/>
+        </p:nvSpPr>
+        <p:spPr>
+          <a:xfrm>
+            <a:off x="7712397" y="3856148"/>
+            <a:ext cx="708186" cy="285783"/>
+          </a:xfrm>
+          <a:prstGeom prst="rect">
+            <a:avLst/>
+          </a:prstGeom>
+          <a:ln w="19050">
+            <a:solidFill>
+              <a:srgbClr val="7030A0"/>
+            </a:solidFill>
+          </a:ln>
+          <a:effectLst/>
+        </p:spPr>
+        <p:style>
+          <a:lnRef idx="1">
+            <a:schemeClr val="accent4"/>
+          </a:lnRef>
+          <a:fillRef idx="2">
+            <a:schemeClr val="accent4"/>
+          </a:fillRef>
+          <a:effectRef idx="1">
+            <a:schemeClr val="accent4"/>
+          </a:effectRef>
+          <a:fontRef idx="minor">
+            <a:schemeClr val="dk1"/>
+          </a:fontRef>
+        </p:style>
+        <p:txBody>
+          <a:bodyPr rtlCol="0" anchor="ctr"/>
+          <a:lstStyle/>
+          <a:p>
+            <a:pPr algn="ctr"/>
+            <a:r>
+              <a:rPr lang="en-US" sz="800" dirty="0" err="1">
+                <a:solidFill>
+                  <a:srgbClr val="7030A0"/>
+                </a:solidFill>
+              </a:rPr>
+              <a:t>PrescriptionList</a:t>
+            </a:r>
+            <a:endParaRPr lang="en-SG" sz="800" dirty="0">
+              <a:solidFill>
+                <a:srgbClr val="7030A0"/>
+              </a:solidFill>
+            </a:endParaRPr>
+          </a:p>
+        </p:txBody>
+      </p:sp>
+      <p:cxnSp>
+        <p:nvCxnSpPr>
+          <p:cNvPr id="67" name="Elbow Connector 80">
+            <a:extLst>
+              <a:ext uri="{FF2B5EF4-FFF2-40B4-BE49-F238E27FC236}">
+                <a16:creationId xmlns:a16="http://schemas.microsoft.com/office/drawing/2014/main" id="{222BC6DE-5B98-431B-A516-64E97F32C3EA}"/>
+              </a:ext>
+            </a:extLst>
+          </p:cNvPr>
+          <p:cNvCxnSpPr>
+            <a:cxnSpLocks/>
+          </p:cNvCxnSpPr>
+          <p:nvPr/>
+        </p:nvCxnSpPr>
+        <p:spPr>
+          <a:xfrm rot="16200000" flipH="1">
+            <a:off x="7452559" y="3728165"/>
+            <a:ext cx="302475" cy="217201"/>
+          </a:xfrm>
+          <a:prstGeom prst="bentConnector3">
+            <a:avLst>
+              <a:gd name="adj1" fmla="val 100384"/>
+            </a:avLst>
+          </a:prstGeom>
+          <a:ln w="19050">
+            <a:solidFill>
+              <a:srgbClr val="7030A0"/>
+            </a:solidFill>
+            <a:headEnd type="none" w="med" len="med"/>
+            <a:tailEnd type="arrow" w="med" len="med"/>
+          </a:ln>
+          <a:effectLst/>
+        </p:spPr>
+        <p:style>
+          <a:lnRef idx="1">
+            <a:schemeClr val="accent2"/>
+          </a:lnRef>
+          <a:fillRef idx="2">
+            <a:schemeClr val="accent2"/>
+          </a:fillRef>
+          <a:effectRef idx="1">
+            <a:schemeClr val="accent2"/>
+          </a:effectRef>
+          <a:fontRef idx="minor">
+            <a:schemeClr val="dk1"/>
+          </a:fontRef>
+        </p:style>
+      </p:cxnSp>
+      <p:sp>
+        <p:nvSpPr>
+          <p:cNvPr id="71" name="Rectangle 8">
+            <a:extLst>
+              <a:ext uri="{FF2B5EF4-FFF2-40B4-BE49-F238E27FC236}">
+                <a16:creationId xmlns:a16="http://schemas.microsoft.com/office/drawing/2014/main" id="{14E206F9-776D-4EE2-B2D3-6E91A1C10D1E}"/>
+              </a:ext>
+            </a:extLst>
+          </p:cNvPr>
+          <p:cNvSpPr/>
+          <p:nvPr/>
+        </p:nvSpPr>
+        <p:spPr>
+          <a:xfrm>
+            <a:off x="7712397" y="4179125"/>
+            <a:ext cx="708186" cy="285783"/>
+          </a:xfrm>
+          <a:prstGeom prst="rect">
+            <a:avLst/>
+          </a:prstGeom>
+          <a:ln w="19050">
+            <a:solidFill>
+              <a:srgbClr val="7030A0"/>
+            </a:solidFill>
+          </a:ln>
+          <a:effectLst/>
+        </p:spPr>
+        <p:style>
+          <a:lnRef idx="1">
+            <a:schemeClr val="accent4"/>
+          </a:lnRef>
+          <a:fillRef idx="2">
+            <a:schemeClr val="accent4"/>
+          </a:fillRef>
+          <a:effectRef idx="1">
+            <a:schemeClr val="accent4"/>
+          </a:effectRef>
+          <a:fontRef idx="minor">
+            <a:schemeClr val="dk1"/>
+          </a:fontRef>
+        </p:style>
+        <p:txBody>
+          <a:bodyPr rtlCol="0" anchor="ctr"/>
+          <a:lstStyle/>
+          <a:p>
+            <a:pPr algn="ctr"/>
+            <a:r>
+              <a:rPr lang="en-US" sz="700" dirty="0" err="1">
+                <a:solidFill>
+                  <a:srgbClr val="7030A0"/>
+                </a:solidFill>
+              </a:rPr>
+              <a:t>AppointmentsList</a:t>
+            </a:r>
+            <a:endParaRPr lang="en-SG" sz="700" dirty="0">
+              <a:solidFill>
+                <a:srgbClr val="7030A0"/>
+              </a:solidFill>
+            </a:endParaRPr>
+          </a:p>
+        </p:txBody>
+      </p:sp>
+      <p:sp>
+        <p:nvSpPr>
+          <p:cNvPr id="72" name="Rectangle 8">
+            <a:extLst>
+              <a:ext uri="{FF2B5EF4-FFF2-40B4-BE49-F238E27FC236}">
+                <a16:creationId xmlns:a16="http://schemas.microsoft.com/office/drawing/2014/main" id="{8B6B15CB-522B-4472-BBD5-226E58CDE975}"/>
+              </a:ext>
+            </a:extLst>
+          </p:cNvPr>
+          <p:cNvSpPr/>
+          <p:nvPr/>
+        </p:nvSpPr>
+        <p:spPr>
+          <a:xfrm>
+            <a:off x="7712397" y="4504839"/>
+            <a:ext cx="708186" cy="285783"/>
+          </a:xfrm>
+          <a:prstGeom prst="rect">
+            <a:avLst/>
+          </a:prstGeom>
+          <a:ln w="19050">
+            <a:solidFill>
+              <a:srgbClr val="7030A0"/>
+            </a:solidFill>
+          </a:ln>
+          <a:effectLst/>
+        </p:spPr>
+        <p:style>
+          <a:lnRef idx="1">
+            <a:schemeClr val="accent4"/>
+          </a:lnRef>
+          <a:fillRef idx="2">
+            <a:schemeClr val="accent4"/>
+          </a:fillRef>
+          <a:effectRef idx="1">
+            <a:schemeClr val="accent4"/>
+          </a:effectRef>
+          <a:fontRef idx="minor">
+            <a:schemeClr val="dk1"/>
+          </a:fontRef>
+        </p:style>
+        <p:txBody>
+          <a:bodyPr rtlCol="0" anchor="ctr"/>
+          <a:lstStyle/>
+          <a:p>
+            <a:pPr algn="ctr"/>
+            <a:r>
+              <a:rPr lang="en-US" sz="900" dirty="0">
+                <a:solidFill>
+                  <a:srgbClr val="7030A0"/>
+                </a:solidFill>
+              </a:rPr>
+              <a:t>Medical</a:t>
+            </a:r>
+          </a:p>
+          <a:p>
+            <a:pPr algn="ctr"/>
+            <a:r>
+              <a:rPr lang="en-US" sz="900" dirty="0">
+                <a:solidFill>
+                  <a:srgbClr val="7030A0"/>
+                </a:solidFill>
+              </a:rPr>
+              <a:t>History</a:t>
+            </a:r>
+            <a:endParaRPr lang="en-SG" sz="900" dirty="0">
+              <a:solidFill>
+                <a:srgbClr val="7030A0"/>
+              </a:solidFill>
+            </a:endParaRPr>
+          </a:p>
+        </p:txBody>
+      </p:sp>
+      <p:cxnSp>
+        <p:nvCxnSpPr>
+          <p:cNvPr id="73" name="Elbow Connector 80">
+            <a:extLst>
+              <a:ext uri="{FF2B5EF4-FFF2-40B4-BE49-F238E27FC236}">
+                <a16:creationId xmlns:a16="http://schemas.microsoft.com/office/drawing/2014/main" id="{CD6C7BA7-1DF9-418D-854F-B81B84A2C913}"/>
+              </a:ext>
+            </a:extLst>
+          </p:cNvPr>
+          <p:cNvCxnSpPr>
+            <a:cxnSpLocks/>
+            <a:endCxn id="71" idx="1"/>
+          </p:cNvCxnSpPr>
+          <p:nvPr/>
+        </p:nvCxnSpPr>
+        <p:spPr>
+          <a:xfrm rot="16200000" flipH="1">
+            <a:off x="7436791" y="4046411"/>
+            <a:ext cx="334012" cy="217200"/>
+          </a:xfrm>
+          <a:prstGeom prst="bentConnector2">
+            <a:avLst/>
+          </a:prstGeom>
+          <a:ln w="19050">
+            <a:solidFill>
+              <a:srgbClr val="7030A0"/>
+            </a:solidFill>
+            <a:headEnd type="none" w="med" len="med"/>
+            <a:tailEnd type="arrow" w="med" len="med"/>
+          </a:ln>
+          <a:effectLst/>
+        </p:spPr>
+        <p:style>
+          <a:lnRef idx="1">
+            <a:schemeClr val="accent2"/>
+          </a:lnRef>
+          <a:fillRef idx="2">
+            <a:schemeClr val="accent2"/>
+          </a:fillRef>
+          <a:effectRef idx="1">
+            <a:schemeClr val="accent2"/>
+          </a:effectRef>
+          <a:fontRef idx="minor">
+            <a:schemeClr val="dk1"/>
+          </a:fontRef>
+        </p:style>
+      </p:cxnSp>
+      <p:cxnSp>
+        <p:nvCxnSpPr>
+          <p:cNvPr id="74" name="Elbow Connector 80">
+            <a:extLst>
+              <a:ext uri="{FF2B5EF4-FFF2-40B4-BE49-F238E27FC236}">
+                <a16:creationId xmlns:a16="http://schemas.microsoft.com/office/drawing/2014/main" id="{2A7E005B-4900-47C0-AF7F-C00F841DE534}"/>
+              </a:ext>
+            </a:extLst>
+          </p:cNvPr>
+          <p:cNvCxnSpPr>
+            <a:cxnSpLocks/>
+            <a:endCxn id="72" idx="1"/>
+          </p:cNvCxnSpPr>
+          <p:nvPr/>
+        </p:nvCxnSpPr>
+        <p:spPr>
+          <a:xfrm rot="16200000" flipH="1">
+            <a:off x="7416800" y="4352133"/>
+            <a:ext cx="373993" cy="217201"/>
+          </a:xfrm>
+          <a:prstGeom prst="bentConnector2">
+            <a:avLst/>
+          </a:prstGeom>
+          <a:ln w="19050">
+            <a:solidFill>
+              <a:srgbClr val="7030A0"/>
+            </a:solidFill>
+            <a:headEnd type="none" w="med" len="med"/>
+            <a:tailEnd type="arrow" w="med" len="med"/>
           </a:ln>
           <a:effectLst/>
         </p:spPr>

</xml_diff>

<commit_message>
Update user guide and developer guide (#97)
* Update sequence diagram for `addmeds` to fit the style of the other sequence diagrams
Increase width of sequence diagram image in developer guide

* Update User Guide
Sort commands in User Guide in lexicographical order

* Label all images in User Guide by figure number.
Add references to figure numbers in User Guide.

* Add newline at EOF of UserGuide.adoc to fit checkstyle requirements

* Change format for figure indication

* Standardise capitalisation for "component" and "implementation" across developer guide.
Add figure numbers for images
Standardise capitalisation across title headings
Update class diagrams
</commit_message>
<xml_diff>
--- a/docs/diagrams/ModelComponentClassDiagram.pptx
+++ b/docs/diagrams/ModelComponentClassDiagram.pptx
@@ -208,7 +208,7 @@
           <a:p>
             <a:fld id="{F5CC4B3F-88C1-4FFA-B1B6-F41C21DC6924}" type="datetimeFigureOut">
               <a:rPr lang="en-US" smtClean="0"/>
-              <a:t>6/27/2018</a:t>
+              <a:t>21-Oct-18</a:t>
             </a:fld>
             <a:endParaRPr lang="en-US"/>
           </a:p>
@@ -654,7 +654,7 @@
           <a:p>
             <a:fld id="{78C97017-6FC3-485B-9764-EAC9E56C1D49}" type="datetimeFigureOut">
               <a:rPr lang="en-US" smtClean="0"/>
-              <a:t>6/27/2018</a:t>
+              <a:t>21-Oct-18</a:t>
             </a:fld>
             <a:endParaRPr lang="en-US"/>
           </a:p>
@@ -822,7 +822,7 @@
           <a:p>
             <a:fld id="{78C97017-6FC3-485B-9764-EAC9E56C1D49}" type="datetimeFigureOut">
               <a:rPr lang="en-US" smtClean="0"/>
-              <a:t>6/27/2018</a:t>
+              <a:t>21-Oct-18</a:t>
             </a:fld>
             <a:endParaRPr lang="en-US"/>
           </a:p>
@@ -1000,7 +1000,7 @@
           <a:p>
             <a:fld id="{78C97017-6FC3-485B-9764-EAC9E56C1D49}" type="datetimeFigureOut">
               <a:rPr lang="en-US" smtClean="0"/>
-              <a:t>6/27/2018</a:t>
+              <a:t>21-Oct-18</a:t>
             </a:fld>
             <a:endParaRPr lang="en-US"/>
           </a:p>
@@ -1168,7 +1168,7 @@
           <a:p>
             <a:fld id="{78C97017-6FC3-485B-9764-EAC9E56C1D49}" type="datetimeFigureOut">
               <a:rPr lang="en-US" smtClean="0"/>
-              <a:t>6/27/2018</a:t>
+              <a:t>21-Oct-18</a:t>
             </a:fld>
             <a:endParaRPr lang="en-US"/>
           </a:p>
@@ -1413,7 +1413,7 @@
           <a:p>
             <a:fld id="{78C97017-6FC3-485B-9764-EAC9E56C1D49}" type="datetimeFigureOut">
               <a:rPr lang="en-US" smtClean="0"/>
-              <a:t>6/27/2018</a:t>
+              <a:t>21-Oct-18</a:t>
             </a:fld>
             <a:endParaRPr lang="en-US"/>
           </a:p>
@@ -1698,7 +1698,7 @@
           <a:p>
             <a:fld id="{78C97017-6FC3-485B-9764-EAC9E56C1D49}" type="datetimeFigureOut">
               <a:rPr lang="en-US" smtClean="0"/>
-              <a:t>6/27/2018</a:t>
+              <a:t>21-Oct-18</a:t>
             </a:fld>
             <a:endParaRPr lang="en-US"/>
           </a:p>
@@ -2117,7 +2117,7 @@
           <a:p>
             <a:fld id="{78C97017-6FC3-485B-9764-EAC9E56C1D49}" type="datetimeFigureOut">
               <a:rPr lang="en-US" smtClean="0"/>
-              <a:t>6/27/2018</a:t>
+              <a:t>21-Oct-18</a:t>
             </a:fld>
             <a:endParaRPr lang="en-US"/>
           </a:p>
@@ -2234,7 +2234,7 @@
           <a:p>
             <a:fld id="{78C97017-6FC3-485B-9764-EAC9E56C1D49}" type="datetimeFigureOut">
               <a:rPr lang="en-US" smtClean="0"/>
-              <a:t>6/27/2018</a:t>
+              <a:t>21-Oct-18</a:t>
             </a:fld>
             <a:endParaRPr lang="en-US"/>
           </a:p>
@@ -2329,7 +2329,7 @@
           <a:p>
             <a:fld id="{78C97017-6FC3-485B-9764-EAC9E56C1D49}" type="datetimeFigureOut">
               <a:rPr lang="en-US" smtClean="0"/>
-              <a:t>6/27/2018</a:t>
+              <a:t>21-Oct-18</a:t>
             </a:fld>
             <a:endParaRPr lang="en-US"/>
           </a:p>
@@ -2604,7 +2604,7 @@
           <a:p>
             <a:fld id="{78C97017-6FC3-485B-9764-EAC9E56C1D49}" type="datetimeFigureOut">
               <a:rPr lang="en-US" smtClean="0"/>
-              <a:t>6/27/2018</a:t>
+              <a:t>21-Oct-18</a:t>
             </a:fld>
             <a:endParaRPr lang="en-US"/>
           </a:p>
@@ -2856,7 +2856,7 @@
           <a:p>
             <a:fld id="{78C97017-6FC3-485B-9764-EAC9E56C1D49}" type="datetimeFigureOut">
               <a:rPr lang="en-US" smtClean="0"/>
-              <a:t>6/27/2018</a:t>
+              <a:t>21-Oct-18</a:t>
             </a:fld>
             <a:endParaRPr lang="en-US"/>
           </a:p>
@@ -3067,7 +3067,7 @@
           <a:p>
             <a:fld id="{78C97017-6FC3-485B-9764-EAC9E56C1D49}" type="datetimeFigureOut">
               <a:rPr lang="en-US" smtClean="0"/>
-              <a:t>6/27/2018</a:t>
+              <a:t>21-Oct-18</a:t>
             </a:fld>
             <a:endParaRPr lang="en-US"/>
           </a:p>
@@ -3451,7 +3451,7 @@
         <p:spPr>
           <a:xfrm>
             <a:off x="1119865" y="1600200"/>
-            <a:ext cx="7490735" cy="3124200"/>
+            <a:ext cx="7490735" cy="3352800"/>
           </a:xfrm>
           <a:prstGeom prst="roundRect">
             <a:avLst>
@@ -3994,7 +3994,7 @@
           <a:p>
             <a:pPr algn="ctr"/>
             <a:r>
-              <a:rPr lang="en-US" sz="1050" dirty="0" err="1" smtClean="0">
+              <a:rPr lang="en-US" sz="1050" dirty="0" err="1">
                 <a:solidFill>
                   <a:srgbClr val="7030A0"/>
                 </a:solidFill>
@@ -5023,14 +5023,6 @@
               </a:rPr>
               <a:t>&lt;&lt;interface&gt;&gt;</a:t>
             </a:r>
-            <a:r>
-              <a:rPr lang="en-US" sz="1050">
-                <a:solidFill>
-                  <a:srgbClr val="7030A0"/>
-                </a:solidFill>
-              </a:rPr>
-              <a:t/>
-            </a:r>
             <a:br>
               <a:rPr lang="en-US" sz="1050">
                 <a:solidFill>
@@ -5623,6 +5615,345 @@
             <a:prstDash val="sysDot"/>
             <a:headEnd type="none" w="med" len="med"/>
             <a:tailEnd type="none" w="med" len="med"/>
+          </a:ln>
+          <a:effectLst/>
+        </p:spPr>
+        <p:style>
+          <a:lnRef idx="1">
+            <a:schemeClr val="accent2"/>
+          </a:lnRef>
+          <a:fillRef idx="2">
+            <a:schemeClr val="accent2"/>
+          </a:fillRef>
+          <a:effectRef idx="1">
+            <a:schemeClr val="accent2"/>
+          </a:effectRef>
+          <a:fontRef idx="minor">
+            <a:schemeClr val="dk1"/>
+          </a:fontRef>
+        </p:style>
+      </p:cxnSp>
+      <p:sp>
+        <p:nvSpPr>
+          <p:cNvPr id="56" name="Rectangle 8">
+            <a:extLst>
+              <a:ext uri="{FF2B5EF4-FFF2-40B4-BE49-F238E27FC236}">
+                <a16:creationId xmlns:a16="http://schemas.microsoft.com/office/drawing/2014/main" id="{426DAC2B-FDD5-494F-92B7-B52161E4A441}"/>
+              </a:ext>
+            </a:extLst>
+          </p:cNvPr>
+          <p:cNvSpPr/>
+          <p:nvPr/>
+        </p:nvSpPr>
+        <p:spPr>
+          <a:xfrm>
+            <a:off x="7712397" y="3856148"/>
+            <a:ext cx="708186" cy="285783"/>
+          </a:xfrm>
+          <a:prstGeom prst="rect">
+            <a:avLst/>
+          </a:prstGeom>
+          <a:ln w="19050">
+            <a:solidFill>
+              <a:srgbClr val="7030A0"/>
+            </a:solidFill>
+          </a:ln>
+          <a:effectLst/>
+        </p:spPr>
+        <p:style>
+          <a:lnRef idx="1">
+            <a:schemeClr val="accent4"/>
+          </a:lnRef>
+          <a:fillRef idx="2">
+            <a:schemeClr val="accent4"/>
+          </a:fillRef>
+          <a:effectRef idx="1">
+            <a:schemeClr val="accent4"/>
+          </a:effectRef>
+          <a:fontRef idx="minor">
+            <a:schemeClr val="dk1"/>
+          </a:fontRef>
+        </p:style>
+        <p:txBody>
+          <a:bodyPr rtlCol="0" anchor="ctr"/>
+          <a:lstStyle/>
+          <a:p>
+            <a:pPr algn="ctr"/>
+            <a:r>
+              <a:rPr lang="en-US" sz="800" dirty="0" err="1">
+                <a:solidFill>
+                  <a:srgbClr val="7030A0"/>
+                </a:solidFill>
+              </a:rPr>
+              <a:t>PrescriptionList</a:t>
+            </a:r>
+            <a:endParaRPr lang="en-SG" sz="800" dirty="0">
+              <a:solidFill>
+                <a:srgbClr val="7030A0"/>
+              </a:solidFill>
+            </a:endParaRPr>
+          </a:p>
+        </p:txBody>
+      </p:sp>
+      <p:cxnSp>
+        <p:nvCxnSpPr>
+          <p:cNvPr id="67" name="Elbow Connector 80">
+            <a:extLst>
+              <a:ext uri="{FF2B5EF4-FFF2-40B4-BE49-F238E27FC236}">
+                <a16:creationId xmlns:a16="http://schemas.microsoft.com/office/drawing/2014/main" id="{222BC6DE-5B98-431B-A516-64E97F32C3EA}"/>
+              </a:ext>
+            </a:extLst>
+          </p:cNvPr>
+          <p:cNvCxnSpPr>
+            <a:cxnSpLocks/>
+          </p:cNvCxnSpPr>
+          <p:nvPr/>
+        </p:nvCxnSpPr>
+        <p:spPr>
+          <a:xfrm rot="16200000" flipH="1">
+            <a:off x="7452559" y="3728165"/>
+            <a:ext cx="302475" cy="217201"/>
+          </a:xfrm>
+          <a:prstGeom prst="bentConnector3">
+            <a:avLst>
+              <a:gd name="adj1" fmla="val 100384"/>
+            </a:avLst>
+          </a:prstGeom>
+          <a:ln w="19050">
+            <a:solidFill>
+              <a:srgbClr val="7030A0"/>
+            </a:solidFill>
+            <a:headEnd type="none" w="med" len="med"/>
+            <a:tailEnd type="arrow" w="med" len="med"/>
+          </a:ln>
+          <a:effectLst/>
+        </p:spPr>
+        <p:style>
+          <a:lnRef idx="1">
+            <a:schemeClr val="accent2"/>
+          </a:lnRef>
+          <a:fillRef idx="2">
+            <a:schemeClr val="accent2"/>
+          </a:fillRef>
+          <a:effectRef idx="1">
+            <a:schemeClr val="accent2"/>
+          </a:effectRef>
+          <a:fontRef idx="minor">
+            <a:schemeClr val="dk1"/>
+          </a:fontRef>
+        </p:style>
+      </p:cxnSp>
+      <p:sp>
+        <p:nvSpPr>
+          <p:cNvPr id="71" name="Rectangle 8">
+            <a:extLst>
+              <a:ext uri="{FF2B5EF4-FFF2-40B4-BE49-F238E27FC236}">
+                <a16:creationId xmlns:a16="http://schemas.microsoft.com/office/drawing/2014/main" id="{14E206F9-776D-4EE2-B2D3-6E91A1C10D1E}"/>
+              </a:ext>
+            </a:extLst>
+          </p:cNvPr>
+          <p:cNvSpPr/>
+          <p:nvPr/>
+        </p:nvSpPr>
+        <p:spPr>
+          <a:xfrm>
+            <a:off x="7712397" y="4179125"/>
+            <a:ext cx="708186" cy="285783"/>
+          </a:xfrm>
+          <a:prstGeom prst="rect">
+            <a:avLst/>
+          </a:prstGeom>
+          <a:ln w="19050">
+            <a:solidFill>
+              <a:srgbClr val="7030A0"/>
+            </a:solidFill>
+          </a:ln>
+          <a:effectLst/>
+        </p:spPr>
+        <p:style>
+          <a:lnRef idx="1">
+            <a:schemeClr val="accent4"/>
+          </a:lnRef>
+          <a:fillRef idx="2">
+            <a:schemeClr val="accent4"/>
+          </a:fillRef>
+          <a:effectRef idx="1">
+            <a:schemeClr val="accent4"/>
+          </a:effectRef>
+          <a:fontRef idx="minor">
+            <a:schemeClr val="dk1"/>
+          </a:fontRef>
+        </p:style>
+        <p:txBody>
+          <a:bodyPr rtlCol="0" anchor="ctr"/>
+          <a:lstStyle/>
+          <a:p>
+            <a:pPr algn="ctr"/>
+            <a:r>
+              <a:rPr lang="en-US" sz="700" dirty="0" err="1">
+                <a:solidFill>
+                  <a:srgbClr val="7030A0"/>
+                </a:solidFill>
+              </a:rPr>
+              <a:t>AppointmentsList</a:t>
+            </a:r>
+            <a:endParaRPr lang="en-SG" sz="700" dirty="0">
+              <a:solidFill>
+                <a:srgbClr val="7030A0"/>
+              </a:solidFill>
+            </a:endParaRPr>
+          </a:p>
+        </p:txBody>
+      </p:sp>
+      <p:sp>
+        <p:nvSpPr>
+          <p:cNvPr id="72" name="Rectangle 8">
+            <a:extLst>
+              <a:ext uri="{FF2B5EF4-FFF2-40B4-BE49-F238E27FC236}">
+                <a16:creationId xmlns:a16="http://schemas.microsoft.com/office/drawing/2014/main" id="{8B6B15CB-522B-4472-BBD5-226E58CDE975}"/>
+              </a:ext>
+            </a:extLst>
+          </p:cNvPr>
+          <p:cNvSpPr/>
+          <p:nvPr/>
+        </p:nvSpPr>
+        <p:spPr>
+          <a:xfrm>
+            <a:off x="7712397" y="4504839"/>
+            <a:ext cx="708186" cy="285783"/>
+          </a:xfrm>
+          <a:prstGeom prst="rect">
+            <a:avLst/>
+          </a:prstGeom>
+          <a:ln w="19050">
+            <a:solidFill>
+              <a:srgbClr val="7030A0"/>
+            </a:solidFill>
+          </a:ln>
+          <a:effectLst/>
+        </p:spPr>
+        <p:style>
+          <a:lnRef idx="1">
+            <a:schemeClr val="accent4"/>
+          </a:lnRef>
+          <a:fillRef idx="2">
+            <a:schemeClr val="accent4"/>
+          </a:fillRef>
+          <a:effectRef idx="1">
+            <a:schemeClr val="accent4"/>
+          </a:effectRef>
+          <a:fontRef idx="minor">
+            <a:schemeClr val="dk1"/>
+          </a:fontRef>
+        </p:style>
+        <p:txBody>
+          <a:bodyPr rtlCol="0" anchor="ctr"/>
+          <a:lstStyle/>
+          <a:p>
+            <a:pPr algn="ctr"/>
+            <a:r>
+              <a:rPr lang="en-US" sz="900" dirty="0">
+                <a:solidFill>
+                  <a:srgbClr val="7030A0"/>
+                </a:solidFill>
+              </a:rPr>
+              <a:t>Medical</a:t>
+            </a:r>
+          </a:p>
+          <a:p>
+            <a:pPr algn="ctr"/>
+            <a:r>
+              <a:rPr lang="en-US" sz="900" dirty="0">
+                <a:solidFill>
+                  <a:srgbClr val="7030A0"/>
+                </a:solidFill>
+              </a:rPr>
+              <a:t>History</a:t>
+            </a:r>
+            <a:endParaRPr lang="en-SG" sz="900" dirty="0">
+              <a:solidFill>
+                <a:srgbClr val="7030A0"/>
+              </a:solidFill>
+            </a:endParaRPr>
+          </a:p>
+        </p:txBody>
+      </p:sp>
+      <p:cxnSp>
+        <p:nvCxnSpPr>
+          <p:cNvPr id="73" name="Elbow Connector 80">
+            <a:extLst>
+              <a:ext uri="{FF2B5EF4-FFF2-40B4-BE49-F238E27FC236}">
+                <a16:creationId xmlns:a16="http://schemas.microsoft.com/office/drawing/2014/main" id="{CD6C7BA7-1DF9-418D-854F-B81B84A2C913}"/>
+              </a:ext>
+            </a:extLst>
+          </p:cNvPr>
+          <p:cNvCxnSpPr>
+            <a:cxnSpLocks/>
+            <a:endCxn id="71" idx="1"/>
+          </p:cNvCxnSpPr>
+          <p:nvPr/>
+        </p:nvCxnSpPr>
+        <p:spPr>
+          <a:xfrm rot="16200000" flipH="1">
+            <a:off x="7436791" y="4046411"/>
+            <a:ext cx="334012" cy="217200"/>
+          </a:xfrm>
+          <a:prstGeom prst="bentConnector2">
+            <a:avLst/>
+          </a:prstGeom>
+          <a:ln w="19050">
+            <a:solidFill>
+              <a:srgbClr val="7030A0"/>
+            </a:solidFill>
+            <a:headEnd type="none" w="med" len="med"/>
+            <a:tailEnd type="arrow" w="med" len="med"/>
+          </a:ln>
+          <a:effectLst/>
+        </p:spPr>
+        <p:style>
+          <a:lnRef idx="1">
+            <a:schemeClr val="accent2"/>
+          </a:lnRef>
+          <a:fillRef idx="2">
+            <a:schemeClr val="accent2"/>
+          </a:fillRef>
+          <a:effectRef idx="1">
+            <a:schemeClr val="accent2"/>
+          </a:effectRef>
+          <a:fontRef idx="minor">
+            <a:schemeClr val="dk1"/>
+          </a:fontRef>
+        </p:style>
+      </p:cxnSp>
+      <p:cxnSp>
+        <p:nvCxnSpPr>
+          <p:cNvPr id="74" name="Elbow Connector 80">
+            <a:extLst>
+              <a:ext uri="{FF2B5EF4-FFF2-40B4-BE49-F238E27FC236}">
+                <a16:creationId xmlns:a16="http://schemas.microsoft.com/office/drawing/2014/main" id="{2A7E005B-4900-47C0-AF7F-C00F841DE534}"/>
+              </a:ext>
+            </a:extLst>
+          </p:cNvPr>
+          <p:cNvCxnSpPr>
+            <a:cxnSpLocks/>
+            <a:endCxn id="72" idx="1"/>
+          </p:cNvCxnSpPr>
+          <p:nvPr/>
+        </p:nvCxnSpPr>
+        <p:spPr>
+          <a:xfrm rot="16200000" flipH="1">
+            <a:off x="7416800" y="4352133"/>
+            <a:ext cx="373993" cy="217201"/>
+          </a:xfrm>
+          <a:prstGeom prst="bentConnector2">
+            <a:avLst/>
+          </a:prstGeom>
+          <a:ln w="19050">
+            <a:solidFill>
+              <a:srgbClr val="7030A0"/>
+            </a:solidFill>
+            <a:headEnd type="none" w="med" len="med"/>
+            <a:tailEnd type="arrow" w="med" len="med"/>
           </a:ln>
           <a:effectLst/>
         </p:spPr>

</xml_diff>

<commit_message>
Update model diagram and developerguide.adoc
</commit_message>
<xml_diff>
--- a/docs/diagrams/ModelComponentClassDiagram.pptx
+++ b/docs/diagrams/ModelComponentClassDiagram.pptx
@@ -208,7 +208,7 @@
           <a:p>
             <a:fld id="{F5CC4B3F-88C1-4FFA-B1B6-F41C21DC6924}" type="datetimeFigureOut">
               <a:rPr lang="en-US" smtClean="0"/>
-              <a:t>6/27/2018</a:t>
+              <a:t>11/1/18</a:t>
             </a:fld>
             <a:endParaRPr lang="en-US"/>
           </a:p>
@@ -654,7 +654,7 @@
           <a:p>
             <a:fld id="{78C97017-6FC3-485B-9764-EAC9E56C1D49}" type="datetimeFigureOut">
               <a:rPr lang="en-US" smtClean="0"/>
-              <a:t>6/27/2018</a:t>
+              <a:t>11/1/18</a:t>
             </a:fld>
             <a:endParaRPr lang="en-US"/>
           </a:p>
@@ -822,7 +822,7 @@
           <a:p>
             <a:fld id="{78C97017-6FC3-485B-9764-EAC9E56C1D49}" type="datetimeFigureOut">
               <a:rPr lang="en-US" smtClean="0"/>
-              <a:t>6/27/2018</a:t>
+              <a:t>11/1/18</a:t>
             </a:fld>
             <a:endParaRPr lang="en-US"/>
           </a:p>
@@ -1000,7 +1000,7 @@
           <a:p>
             <a:fld id="{78C97017-6FC3-485B-9764-EAC9E56C1D49}" type="datetimeFigureOut">
               <a:rPr lang="en-US" smtClean="0"/>
-              <a:t>6/27/2018</a:t>
+              <a:t>11/1/18</a:t>
             </a:fld>
             <a:endParaRPr lang="en-US"/>
           </a:p>
@@ -1168,7 +1168,7 @@
           <a:p>
             <a:fld id="{78C97017-6FC3-485B-9764-EAC9E56C1D49}" type="datetimeFigureOut">
               <a:rPr lang="en-US" smtClean="0"/>
-              <a:t>6/27/2018</a:t>
+              <a:t>11/1/18</a:t>
             </a:fld>
             <a:endParaRPr lang="en-US"/>
           </a:p>
@@ -1413,7 +1413,7 @@
           <a:p>
             <a:fld id="{78C97017-6FC3-485B-9764-EAC9E56C1D49}" type="datetimeFigureOut">
               <a:rPr lang="en-US" smtClean="0"/>
-              <a:t>6/27/2018</a:t>
+              <a:t>11/1/18</a:t>
             </a:fld>
             <a:endParaRPr lang="en-US"/>
           </a:p>
@@ -1698,7 +1698,7 @@
           <a:p>
             <a:fld id="{78C97017-6FC3-485B-9764-EAC9E56C1D49}" type="datetimeFigureOut">
               <a:rPr lang="en-US" smtClean="0"/>
-              <a:t>6/27/2018</a:t>
+              <a:t>11/1/18</a:t>
             </a:fld>
             <a:endParaRPr lang="en-US"/>
           </a:p>
@@ -2117,7 +2117,7 @@
           <a:p>
             <a:fld id="{78C97017-6FC3-485B-9764-EAC9E56C1D49}" type="datetimeFigureOut">
               <a:rPr lang="en-US" smtClean="0"/>
-              <a:t>6/27/2018</a:t>
+              <a:t>11/1/18</a:t>
             </a:fld>
             <a:endParaRPr lang="en-US"/>
           </a:p>
@@ -2234,7 +2234,7 @@
           <a:p>
             <a:fld id="{78C97017-6FC3-485B-9764-EAC9E56C1D49}" type="datetimeFigureOut">
               <a:rPr lang="en-US" smtClean="0"/>
-              <a:t>6/27/2018</a:t>
+              <a:t>11/1/18</a:t>
             </a:fld>
             <a:endParaRPr lang="en-US"/>
           </a:p>
@@ -2329,7 +2329,7 @@
           <a:p>
             <a:fld id="{78C97017-6FC3-485B-9764-EAC9E56C1D49}" type="datetimeFigureOut">
               <a:rPr lang="en-US" smtClean="0"/>
-              <a:t>6/27/2018</a:t>
+              <a:t>11/1/18</a:t>
             </a:fld>
             <a:endParaRPr lang="en-US"/>
           </a:p>
@@ -2604,7 +2604,7 @@
           <a:p>
             <a:fld id="{78C97017-6FC3-485B-9764-EAC9E56C1D49}" type="datetimeFigureOut">
               <a:rPr lang="en-US" smtClean="0"/>
-              <a:t>6/27/2018</a:t>
+              <a:t>11/1/18</a:t>
             </a:fld>
             <a:endParaRPr lang="en-US"/>
           </a:p>
@@ -2856,7 +2856,7 @@
           <a:p>
             <a:fld id="{78C97017-6FC3-485B-9764-EAC9E56C1D49}" type="datetimeFigureOut">
               <a:rPr lang="en-US" smtClean="0"/>
-              <a:t>6/27/2018</a:t>
+              <a:t>11/1/18</a:t>
             </a:fld>
             <a:endParaRPr lang="en-US"/>
           </a:p>
@@ -3067,7 +3067,7 @@
           <a:p>
             <a:fld id="{78C97017-6FC3-485B-9764-EAC9E56C1D49}" type="datetimeFigureOut">
               <a:rPr lang="en-US" smtClean="0"/>
-              <a:t>6/27/2018</a:t>
+              <a:t>11/1/18</a:t>
             </a:fld>
             <a:endParaRPr lang="en-US"/>
           </a:p>
@@ -3961,8 +3961,8 @@
         </p:nvSpPr>
         <p:spPr>
           <a:xfrm>
-            <a:off x="2825280" y="2846162"/>
-            <a:ext cx="1490560" cy="334856"/>
+            <a:off x="3168003" y="2846162"/>
+            <a:ext cx="1083556" cy="334856"/>
           </a:xfrm>
           <a:prstGeom prst="rect">
             <a:avLst/>
@@ -3994,12 +3994,68 @@
           <a:p>
             <a:pPr algn="ctr"/>
             <a:r>
-              <a:rPr lang="en-US" sz="1050" dirty="0" err="1" smtClean="0">
+              <a:rPr lang="en-US" sz="900" dirty="0" err="1" smtClean="0">
                 <a:solidFill>
                   <a:srgbClr val="7030A0"/>
                 </a:solidFill>
               </a:rPr>
-              <a:t>VersionedAddressBook</a:t>
+              <a:t>UniquePlaylistList</a:t>
+            </a:r>
+            <a:endParaRPr lang="en-SG" sz="900" dirty="0">
+              <a:solidFill>
+                <a:srgbClr val="7030A0"/>
+              </a:solidFill>
+            </a:endParaRPr>
+          </a:p>
+        </p:txBody>
+      </p:sp>
+      <p:sp>
+        <p:nvSpPr>
+          <p:cNvPr id="49" name="Rectangle 8"/>
+          <p:cNvSpPr/>
+          <p:nvPr/>
+        </p:nvSpPr>
+        <p:spPr>
+          <a:xfrm>
+            <a:off x="4692650" y="2846162"/>
+            <a:ext cx="1156969" cy="346760"/>
+          </a:xfrm>
+          <a:prstGeom prst="rect">
+            <a:avLst/>
+          </a:prstGeom>
+          <a:ln w="19050">
+            <a:solidFill>
+              <a:srgbClr val="7030A0"/>
+            </a:solidFill>
+          </a:ln>
+          <a:effectLst/>
+        </p:spPr>
+        <p:style>
+          <a:lnRef idx="1">
+            <a:schemeClr val="accent4"/>
+          </a:lnRef>
+          <a:fillRef idx="2">
+            <a:schemeClr val="accent4"/>
+          </a:fillRef>
+          <a:effectRef idx="1">
+            <a:schemeClr val="accent4"/>
+          </a:effectRef>
+          <a:fontRef idx="minor">
+            <a:schemeClr val="dk1"/>
+          </a:fontRef>
+        </p:style>
+        <p:txBody>
+          <a:bodyPr rtlCol="0" anchor="ctr"/>
+          <a:lstStyle/>
+          <a:p>
+            <a:pPr algn="ctr"/>
+            <a:r>
+              <a:rPr lang="en-US" sz="1050" dirty="0" smtClean="0">
+                <a:solidFill>
+                  <a:srgbClr val="7030A0"/>
+                </a:solidFill>
+              </a:rPr>
+              <a:t>Playlist</a:t>
             </a:r>
             <a:endParaRPr lang="en-SG" sz="1050" dirty="0">
               <a:solidFill>
@@ -4009,21 +4065,169 @@
           </a:p>
         </p:txBody>
       </p:sp>
+      <p:sp>
+        <p:nvSpPr>
+          <p:cNvPr id="51" name="Flowchart: Decision 96"/>
+          <p:cNvSpPr/>
+          <p:nvPr/>
+        </p:nvSpPr>
+        <p:spPr>
+          <a:xfrm>
+            <a:off x="4252043" y="2935625"/>
+            <a:ext cx="236048" cy="173380"/>
+          </a:xfrm>
+          <a:prstGeom prst="flowChartDecision">
+            <a:avLst/>
+          </a:prstGeom>
+          <a:solidFill>
+            <a:srgbClr val="7030A0"/>
+          </a:solidFill>
+          <a:ln w="19050">
+            <a:solidFill>
+              <a:srgbClr val="7030A0"/>
+            </a:solidFill>
+          </a:ln>
+          <a:effectLst/>
+        </p:spPr>
+        <p:style>
+          <a:lnRef idx="1">
+            <a:schemeClr val="accent6"/>
+          </a:lnRef>
+          <a:fillRef idx="2">
+            <a:schemeClr val="accent6"/>
+          </a:fillRef>
+          <a:effectRef idx="1">
+            <a:schemeClr val="accent6"/>
+          </a:effectRef>
+          <a:fontRef idx="minor">
+            <a:schemeClr val="dk1"/>
+          </a:fontRef>
+        </p:style>
+        <p:txBody>
+          <a:bodyPr rtlCol="0" anchor="ctr"/>
+          <a:lstStyle/>
+          <a:p>
+            <a:pPr algn="ctr"/>
+            <a:endParaRPr lang="en-US" sz="1050"/>
+          </a:p>
+        </p:txBody>
+      </p:sp>
+      <p:sp>
+        <p:nvSpPr>
+          <p:cNvPr id="62" name="Rectangle 8"/>
+          <p:cNvSpPr/>
+          <p:nvPr/>
+        </p:nvSpPr>
+        <p:spPr>
+          <a:xfrm>
+            <a:off x="6313677" y="2858066"/>
+            <a:ext cx="708186" cy="346760"/>
+          </a:xfrm>
+          <a:prstGeom prst="rect">
+            <a:avLst/>
+          </a:prstGeom>
+          <a:ln w="19050">
+            <a:solidFill>
+              <a:srgbClr val="7030A0"/>
+            </a:solidFill>
+          </a:ln>
+          <a:effectLst/>
+        </p:spPr>
+        <p:style>
+          <a:lnRef idx="1">
+            <a:schemeClr val="accent4"/>
+          </a:lnRef>
+          <a:fillRef idx="2">
+            <a:schemeClr val="accent4"/>
+          </a:fillRef>
+          <a:effectRef idx="1">
+            <a:schemeClr val="accent4"/>
+          </a:effectRef>
+          <a:fontRef idx="minor">
+            <a:schemeClr val="dk1"/>
+          </a:fontRef>
+        </p:style>
+        <p:txBody>
+          <a:bodyPr rtlCol="0" anchor="ctr"/>
+          <a:lstStyle/>
+          <a:p>
+            <a:pPr algn="ctr"/>
+            <a:r>
+              <a:rPr lang="en-US" sz="1050" dirty="0" smtClean="0">
+                <a:solidFill>
+                  <a:srgbClr val="7030A0"/>
+                </a:solidFill>
+              </a:rPr>
+              <a:t>Track</a:t>
+            </a:r>
+            <a:endParaRPr lang="en-SG" sz="1050" dirty="0">
+              <a:solidFill>
+                <a:srgbClr val="7030A0"/>
+              </a:solidFill>
+            </a:endParaRPr>
+          </a:p>
+        </p:txBody>
+      </p:sp>
+      <p:sp>
+        <p:nvSpPr>
+          <p:cNvPr id="63" name="Flowchart: Decision 96"/>
+          <p:cNvSpPr/>
+          <p:nvPr/>
+        </p:nvSpPr>
+        <p:spPr>
+          <a:xfrm>
+            <a:off x="5858751" y="2941676"/>
+            <a:ext cx="236048" cy="173380"/>
+          </a:xfrm>
+          <a:prstGeom prst="flowChartDecision">
+            <a:avLst/>
+          </a:prstGeom>
+          <a:noFill/>
+          <a:ln w="19050">
+            <a:solidFill>
+              <a:srgbClr val="7030A0"/>
+            </a:solidFill>
+          </a:ln>
+          <a:effectLst/>
+        </p:spPr>
+        <p:style>
+          <a:lnRef idx="1">
+            <a:schemeClr val="accent6"/>
+          </a:lnRef>
+          <a:fillRef idx="2">
+            <a:schemeClr val="accent6"/>
+          </a:fillRef>
+          <a:effectRef idx="1">
+            <a:schemeClr val="accent6"/>
+          </a:effectRef>
+          <a:fontRef idx="minor">
+            <a:schemeClr val="dk1"/>
+          </a:fontRef>
+        </p:style>
+        <p:txBody>
+          <a:bodyPr rtlCol="0" anchor="ctr"/>
+          <a:lstStyle/>
+          <a:p>
+            <a:pPr algn="ctr"/>
+            <a:endParaRPr lang="en-US" sz="1050"/>
+          </a:p>
+        </p:txBody>
+      </p:sp>
       <p:cxnSp>
         <p:nvCxnSpPr>
-          <p:cNvPr id="47" name="Straight Arrow Connector 46"/>
+          <p:cNvPr id="64" name="Elbow Connector 63"/>
           <p:cNvCxnSpPr>
-            <a:stCxn id="48" idx="3"/>
-            <a:endCxn id="46" idx="1"/>
+            <a:stCxn id="63" idx="3"/>
+            <a:endCxn id="62" idx="1"/>
           </p:cNvCxnSpPr>
           <p:nvPr/>
         </p:nvCxnSpPr>
         <p:spPr>
           <a:xfrm>
-            <a:off x="2624360" y="3003033"/>
-            <a:ext cx="200920" cy="10557"/>
-          </a:xfrm>
-          <a:prstGeom prst="straightConnector1">
+            <a:off x="6094799" y="3028366"/>
+            <a:ext cx="218878" cy="3080"/>
+          </a:xfrm>
+          <a:prstGeom prst="bentConnector3">
             <a:avLst/>
           </a:prstGeom>
           <a:ln w="19050">
@@ -4052,19 +4256,77 @@
       </p:cxnSp>
       <p:sp>
         <p:nvSpPr>
-          <p:cNvPr id="48" name="Flowchart: Decision 96"/>
+          <p:cNvPr id="76" name="Rectangle 8"/>
           <p:cNvSpPr/>
           <p:nvPr/>
         </p:nvSpPr>
         <p:spPr>
           <a:xfrm>
-            <a:off x="2388312" y="2916343"/>
+            <a:off x="7712397" y="2865764"/>
+            <a:ext cx="708186" cy="285783"/>
+          </a:xfrm>
+          <a:prstGeom prst="rect">
+            <a:avLst/>
+          </a:prstGeom>
+          <a:ln w="19050">
+            <a:solidFill>
+              <a:srgbClr val="7030A0"/>
+            </a:solidFill>
+          </a:ln>
+          <a:effectLst/>
+        </p:spPr>
+        <p:style>
+          <a:lnRef idx="1">
+            <a:schemeClr val="accent4"/>
+          </a:lnRef>
+          <a:fillRef idx="2">
+            <a:schemeClr val="accent4"/>
+          </a:fillRef>
+          <a:effectRef idx="1">
+            <a:schemeClr val="accent4"/>
+          </a:effectRef>
+          <a:fontRef idx="minor">
+            <a:schemeClr val="dk1"/>
+          </a:fontRef>
+        </p:style>
+        <p:txBody>
+          <a:bodyPr rtlCol="0" anchor="ctr"/>
+          <a:lstStyle/>
+          <a:p>
+            <a:pPr algn="ctr"/>
+            <a:r>
+              <a:rPr lang="en-US" sz="1050" dirty="0">
+                <a:solidFill>
+                  <a:srgbClr val="7030A0"/>
+                </a:solidFill>
+              </a:rPr>
+              <a:t>Name</a:t>
+            </a:r>
+            <a:endParaRPr lang="en-SG" sz="1050" dirty="0">
+              <a:solidFill>
+                <a:srgbClr val="7030A0"/>
+              </a:solidFill>
+            </a:endParaRPr>
+          </a:p>
+        </p:txBody>
+      </p:sp>
+      <p:sp>
+        <p:nvSpPr>
+          <p:cNvPr id="78" name="Flowchart: Decision 96"/>
+          <p:cNvSpPr/>
+          <p:nvPr/>
+        </p:nvSpPr>
+        <p:spPr>
+          <a:xfrm>
+            <a:off x="7041947" y="2948201"/>
             <a:ext cx="236048" cy="173380"/>
           </a:xfrm>
           <a:prstGeom prst="flowChartDecision">
             <a:avLst/>
           </a:prstGeom>
-          <a:noFill/>
+          <a:solidFill>
+            <a:srgbClr val="7030A0"/>
+          </a:solidFill>
           <a:ln w="19050">
             <a:solidFill>
               <a:srgbClr val="7030A0"/>
@@ -4095,456 +4357,11 @@
           </a:p>
         </p:txBody>
       </p:sp>
-      <p:sp>
-        <p:nvSpPr>
-          <p:cNvPr id="49" name="Rectangle 8"/>
-          <p:cNvSpPr/>
-          <p:nvPr/>
-        </p:nvSpPr>
-        <p:spPr>
-          <a:xfrm>
-            <a:off x="4692650" y="2846162"/>
-            <a:ext cx="1156969" cy="346760"/>
-          </a:xfrm>
-          <a:prstGeom prst="rect">
-            <a:avLst/>
-          </a:prstGeom>
-          <a:ln w="19050">
-            <a:solidFill>
-              <a:srgbClr val="7030A0"/>
-            </a:solidFill>
-          </a:ln>
-          <a:effectLst/>
-        </p:spPr>
-        <p:style>
-          <a:lnRef idx="1">
-            <a:schemeClr val="accent4"/>
-          </a:lnRef>
-          <a:fillRef idx="2">
-            <a:schemeClr val="accent4"/>
-          </a:fillRef>
-          <a:effectRef idx="1">
-            <a:schemeClr val="accent4"/>
-          </a:effectRef>
-          <a:fontRef idx="minor">
-            <a:schemeClr val="dk1"/>
-          </a:fontRef>
-        </p:style>
-        <p:txBody>
-          <a:bodyPr rtlCol="0" anchor="ctr"/>
-          <a:lstStyle/>
-          <a:p>
-            <a:pPr algn="ctr"/>
-            <a:r>
-              <a:rPr lang="en-US" sz="1050" dirty="0" err="1">
-                <a:solidFill>
-                  <a:srgbClr val="7030A0"/>
-                </a:solidFill>
-              </a:rPr>
-              <a:t>UniquePersonList</a:t>
-            </a:r>
-            <a:endParaRPr lang="en-SG" sz="1050" dirty="0">
-              <a:solidFill>
-                <a:srgbClr val="7030A0"/>
-              </a:solidFill>
-            </a:endParaRPr>
-          </a:p>
-        </p:txBody>
-      </p:sp>
-      <p:sp>
-        <p:nvSpPr>
-          <p:cNvPr id="51" name="Flowchart: Decision 96"/>
-          <p:cNvSpPr/>
-          <p:nvPr/>
-        </p:nvSpPr>
-        <p:spPr>
-          <a:xfrm>
-            <a:off x="4324972" y="2920532"/>
-            <a:ext cx="236048" cy="173380"/>
-          </a:xfrm>
-          <a:prstGeom prst="flowChartDecision">
-            <a:avLst/>
-          </a:prstGeom>
-          <a:solidFill>
-            <a:srgbClr val="7030A0"/>
-          </a:solidFill>
-          <a:ln w="19050">
-            <a:solidFill>
-              <a:srgbClr val="7030A0"/>
-            </a:solidFill>
-          </a:ln>
-          <a:effectLst/>
-        </p:spPr>
-        <p:style>
-          <a:lnRef idx="1">
-            <a:schemeClr val="accent6"/>
-          </a:lnRef>
-          <a:fillRef idx="2">
-            <a:schemeClr val="accent6"/>
-          </a:fillRef>
-          <a:effectRef idx="1">
-            <a:schemeClr val="accent6"/>
-          </a:effectRef>
-          <a:fontRef idx="minor">
-            <a:schemeClr val="dk1"/>
-          </a:fontRef>
-        </p:style>
-        <p:txBody>
-          <a:bodyPr rtlCol="0" anchor="ctr"/>
-          <a:lstStyle/>
-          <a:p>
-            <a:pPr algn="ctr"/>
-            <a:endParaRPr lang="en-US" sz="1050"/>
-          </a:p>
-        </p:txBody>
-      </p:sp>
-      <p:sp>
-        <p:nvSpPr>
-          <p:cNvPr id="62" name="Rectangle 8"/>
-          <p:cNvSpPr/>
-          <p:nvPr/>
-        </p:nvSpPr>
-        <p:spPr>
-          <a:xfrm>
-            <a:off x="6313677" y="2858066"/>
-            <a:ext cx="708186" cy="346760"/>
-          </a:xfrm>
-          <a:prstGeom prst="rect">
-            <a:avLst/>
-          </a:prstGeom>
-          <a:ln w="19050">
-            <a:solidFill>
-              <a:srgbClr val="7030A0"/>
-            </a:solidFill>
-          </a:ln>
-          <a:effectLst/>
-        </p:spPr>
-        <p:style>
-          <a:lnRef idx="1">
-            <a:schemeClr val="accent4"/>
-          </a:lnRef>
-          <a:fillRef idx="2">
-            <a:schemeClr val="accent4"/>
-          </a:fillRef>
-          <a:effectRef idx="1">
-            <a:schemeClr val="accent4"/>
-          </a:effectRef>
-          <a:fontRef idx="minor">
-            <a:schemeClr val="dk1"/>
-          </a:fontRef>
-        </p:style>
-        <p:txBody>
-          <a:bodyPr rtlCol="0" anchor="ctr"/>
-          <a:lstStyle/>
-          <a:p>
-            <a:pPr algn="ctr"/>
-            <a:r>
-              <a:rPr lang="en-US" sz="1050" dirty="0">
-                <a:solidFill>
-                  <a:srgbClr val="7030A0"/>
-                </a:solidFill>
-              </a:rPr>
-              <a:t>Person</a:t>
-            </a:r>
-            <a:endParaRPr lang="en-SG" sz="1050" dirty="0">
-              <a:solidFill>
-                <a:srgbClr val="7030A0"/>
-              </a:solidFill>
-            </a:endParaRPr>
-          </a:p>
-        </p:txBody>
-      </p:sp>
-      <p:sp>
-        <p:nvSpPr>
-          <p:cNvPr id="63" name="Flowchart: Decision 96"/>
-          <p:cNvSpPr/>
-          <p:nvPr/>
-        </p:nvSpPr>
-        <p:spPr>
-          <a:xfrm>
-            <a:off x="5858751" y="2941676"/>
-            <a:ext cx="236048" cy="173380"/>
-          </a:xfrm>
-          <a:prstGeom prst="flowChartDecision">
-            <a:avLst/>
-          </a:prstGeom>
-          <a:noFill/>
-          <a:ln w="19050">
-            <a:solidFill>
-              <a:srgbClr val="7030A0"/>
-            </a:solidFill>
-          </a:ln>
-          <a:effectLst/>
-        </p:spPr>
-        <p:style>
-          <a:lnRef idx="1">
-            <a:schemeClr val="accent6"/>
-          </a:lnRef>
-          <a:fillRef idx="2">
-            <a:schemeClr val="accent6"/>
-          </a:fillRef>
-          <a:effectRef idx="1">
-            <a:schemeClr val="accent6"/>
-          </a:effectRef>
-          <a:fontRef idx="minor">
-            <a:schemeClr val="dk1"/>
-          </a:fontRef>
-        </p:style>
-        <p:txBody>
-          <a:bodyPr rtlCol="0" anchor="ctr"/>
-          <a:lstStyle/>
-          <a:p>
-            <a:pPr algn="ctr"/>
-            <a:endParaRPr lang="en-US" sz="1050"/>
-          </a:p>
-        </p:txBody>
-      </p:sp>
-      <p:cxnSp>
-        <p:nvCxnSpPr>
-          <p:cNvPr id="64" name="Elbow Connector 63"/>
-          <p:cNvCxnSpPr>
-            <a:stCxn id="63" idx="3"/>
-            <a:endCxn id="62" idx="1"/>
-          </p:cNvCxnSpPr>
-          <p:nvPr/>
-        </p:nvCxnSpPr>
-        <p:spPr>
-          <a:xfrm>
-            <a:off x="6094799" y="3028366"/>
-            <a:ext cx="218878" cy="3080"/>
-          </a:xfrm>
-          <a:prstGeom prst="bentConnector3">
-            <a:avLst/>
-          </a:prstGeom>
-          <a:ln w="19050">
-            <a:solidFill>
-              <a:srgbClr val="7030A0"/>
-            </a:solidFill>
-            <a:headEnd type="none" w="med" len="med"/>
-            <a:tailEnd type="arrow" w="med" len="med"/>
-          </a:ln>
-          <a:effectLst/>
-        </p:spPr>
-        <p:style>
-          <a:lnRef idx="1">
-            <a:schemeClr val="accent2"/>
-          </a:lnRef>
-          <a:fillRef idx="2">
-            <a:schemeClr val="accent2"/>
-          </a:fillRef>
-          <a:effectRef idx="1">
-            <a:schemeClr val="accent2"/>
-          </a:effectRef>
-          <a:fontRef idx="minor">
-            <a:schemeClr val="dk1"/>
-          </a:fontRef>
-        </p:style>
-      </p:cxnSp>
-      <p:sp>
-        <p:nvSpPr>
-          <p:cNvPr id="76" name="Rectangle 8"/>
-          <p:cNvSpPr/>
-          <p:nvPr/>
-        </p:nvSpPr>
-        <p:spPr>
-          <a:xfrm>
-            <a:off x="7712397" y="2564238"/>
-            <a:ext cx="708186" cy="285783"/>
-          </a:xfrm>
-          <a:prstGeom prst="rect">
-            <a:avLst/>
-          </a:prstGeom>
-          <a:ln w="19050">
-            <a:solidFill>
-              <a:srgbClr val="7030A0"/>
-            </a:solidFill>
-          </a:ln>
-          <a:effectLst/>
-        </p:spPr>
-        <p:style>
-          <a:lnRef idx="1">
-            <a:schemeClr val="accent4"/>
-          </a:lnRef>
-          <a:fillRef idx="2">
-            <a:schemeClr val="accent4"/>
-          </a:fillRef>
-          <a:effectRef idx="1">
-            <a:schemeClr val="accent4"/>
-          </a:effectRef>
-          <a:fontRef idx="minor">
-            <a:schemeClr val="dk1"/>
-          </a:fontRef>
-        </p:style>
-        <p:txBody>
-          <a:bodyPr rtlCol="0" anchor="ctr"/>
-          <a:lstStyle/>
-          <a:p>
-            <a:pPr algn="ctr"/>
-            <a:r>
-              <a:rPr lang="en-US" sz="1050" dirty="0">
-                <a:solidFill>
-                  <a:srgbClr val="7030A0"/>
-                </a:solidFill>
-              </a:rPr>
-              <a:t>Name</a:t>
-            </a:r>
-            <a:endParaRPr lang="en-SG" sz="1050" dirty="0">
-              <a:solidFill>
-                <a:srgbClr val="7030A0"/>
-              </a:solidFill>
-            </a:endParaRPr>
-          </a:p>
-        </p:txBody>
-      </p:sp>
-      <p:sp>
-        <p:nvSpPr>
-          <p:cNvPr id="78" name="Flowchart: Decision 96"/>
-          <p:cNvSpPr/>
-          <p:nvPr/>
-        </p:nvSpPr>
-        <p:spPr>
-          <a:xfrm>
-            <a:off x="7041947" y="2948201"/>
-            <a:ext cx="236048" cy="173380"/>
-          </a:xfrm>
-          <a:prstGeom prst="flowChartDecision">
-            <a:avLst/>
-          </a:prstGeom>
-          <a:solidFill>
-            <a:srgbClr val="7030A0"/>
-          </a:solidFill>
-          <a:ln w="19050">
-            <a:solidFill>
-              <a:srgbClr val="7030A0"/>
-            </a:solidFill>
-          </a:ln>
-          <a:effectLst/>
-        </p:spPr>
-        <p:style>
-          <a:lnRef idx="1">
-            <a:schemeClr val="accent6"/>
-          </a:lnRef>
-          <a:fillRef idx="2">
-            <a:schemeClr val="accent6"/>
-          </a:fillRef>
-          <a:effectRef idx="1">
-            <a:schemeClr val="accent6"/>
-          </a:effectRef>
-          <a:fontRef idx="minor">
-            <a:schemeClr val="dk1"/>
-          </a:fontRef>
-        </p:style>
-        <p:txBody>
-          <a:bodyPr rtlCol="0" anchor="ctr"/>
-          <a:lstStyle/>
-          <a:p>
-            <a:pPr algn="ctr"/>
-            <a:endParaRPr lang="en-US" sz="1050"/>
-          </a:p>
-        </p:txBody>
-      </p:sp>
-      <p:cxnSp>
-        <p:nvCxnSpPr>
-          <p:cNvPr id="79" name="Elbow Connector 78"/>
-          <p:cNvCxnSpPr>
-            <a:cxnSpLocks/>
-          </p:cNvCxnSpPr>
-          <p:nvPr/>
-        </p:nvCxnSpPr>
-        <p:spPr>
-          <a:xfrm flipV="1">
-            <a:off x="7277995" y="2706821"/>
-            <a:ext cx="434402" cy="327761"/>
-          </a:xfrm>
-          <a:prstGeom prst="bentConnector3">
-            <a:avLst/>
-          </a:prstGeom>
-          <a:ln w="19050">
-            <a:solidFill>
-              <a:srgbClr val="7030A0"/>
-            </a:solidFill>
-            <a:headEnd type="none" w="med" len="med"/>
-            <a:tailEnd type="arrow" w="med" len="med"/>
-          </a:ln>
-          <a:effectLst/>
-        </p:spPr>
-        <p:style>
-          <a:lnRef idx="1">
-            <a:schemeClr val="accent2"/>
-          </a:lnRef>
-          <a:fillRef idx="2">
-            <a:schemeClr val="accent2"/>
-          </a:fillRef>
-          <a:effectRef idx="1">
-            <a:schemeClr val="accent2"/>
-          </a:effectRef>
-          <a:fontRef idx="minor">
-            <a:schemeClr val="dk1"/>
-          </a:fontRef>
-        </p:style>
-      </p:cxnSp>
-      <p:sp>
-        <p:nvSpPr>
-          <p:cNvPr id="80" name="Rectangle 8"/>
-          <p:cNvSpPr/>
-          <p:nvPr/>
-        </p:nvSpPr>
-        <p:spPr>
-          <a:xfrm>
-            <a:off x="7712397" y="2887216"/>
-            <a:ext cx="708186" cy="285783"/>
-          </a:xfrm>
-          <a:prstGeom prst="rect">
-            <a:avLst/>
-          </a:prstGeom>
-          <a:ln w="19050">
-            <a:solidFill>
-              <a:srgbClr val="7030A0"/>
-            </a:solidFill>
-          </a:ln>
-          <a:effectLst/>
-        </p:spPr>
-        <p:style>
-          <a:lnRef idx="1">
-            <a:schemeClr val="accent4"/>
-          </a:lnRef>
-          <a:fillRef idx="2">
-            <a:schemeClr val="accent4"/>
-          </a:fillRef>
-          <a:effectRef idx="1">
-            <a:schemeClr val="accent4"/>
-          </a:effectRef>
-          <a:fontRef idx="minor">
-            <a:schemeClr val="dk1"/>
-          </a:fontRef>
-        </p:style>
-        <p:txBody>
-          <a:bodyPr rtlCol="0" anchor="ctr"/>
-          <a:lstStyle/>
-          <a:p>
-            <a:pPr algn="ctr"/>
-            <a:r>
-              <a:rPr lang="en-US" sz="1050" dirty="0">
-                <a:solidFill>
-                  <a:srgbClr val="7030A0"/>
-                </a:solidFill>
-              </a:rPr>
-              <a:t>Phone</a:t>
-            </a:r>
-            <a:endParaRPr lang="en-SG" sz="1050" dirty="0">
-              <a:solidFill>
-                <a:srgbClr val="7030A0"/>
-              </a:solidFill>
-            </a:endParaRPr>
-          </a:p>
-        </p:txBody>
-      </p:sp>
       <p:cxnSp>
         <p:nvCxnSpPr>
           <p:cNvPr id="81" name="Elbow Connector 80"/>
           <p:cNvCxnSpPr>
             <a:stCxn id="78" idx="3"/>
-            <a:endCxn id="80" idx="1"/>
           </p:cNvCxnSpPr>
           <p:nvPr/>
         </p:nvCxnSpPr>
@@ -4552,200 +4369,6 @@
           <a:xfrm flipV="1">
             <a:off x="7277995" y="3030108"/>
             <a:ext cx="434402" cy="4783"/>
-          </a:xfrm>
-          <a:prstGeom prst="bentConnector3">
-            <a:avLst/>
-          </a:prstGeom>
-          <a:ln w="19050">
-            <a:solidFill>
-              <a:srgbClr val="7030A0"/>
-            </a:solidFill>
-            <a:headEnd type="none" w="med" len="med"/>
-            <a:tailEnd type="arrow" w="med" len="med"/>
-          </a:ln>
-          <a:effectLst/>
-        </p:spPr>
-        <p:style>
-          <a:lnRef idx="1">
-            <a:schemeClr val="accent2"/>
-          </a:lnRef>
-          <a:fillRef idx="2">
-            <a:schemeClr val="accent2"/>
-          </a:fillRef>
-          <a:effectRef idx="1">
-            <a:schemeClr val="accent2"/>
-          </a:effectRef>
-          <a:fontRef idx="minor">
-            <a:schemeClr val="dk1"/>
-          </a:fontRef>
-        </p:style>
-      </p:cxnSp>
-      <p:sp>
-        <p:nvSpPr>
-          <p:cNvPr id="83" name="Rectangle 8"/>
-          <p:cNvSpPr/>
-          <p:nvPr/>
-        </p:nvSpPr>
-        <p:spPr>
-          <a:xfrm>
-            <a:off x="7712397" y="3210194"/>
-            <a:ext cx="708186" cy="285783"/>
-          </a:xfrm>
-          <a:prstGeom prst="rect">
-            <a:avLst/>
-          </a:prstGeom>
-          <a:ln w="19050">
-            <a:solidFill>
-              <a:srgbClr val="7030A0"/>
-            </a:solidFill>
-          </a:ln>
-          <a:effectLst/>
-        </p:spPr>
-        <p:style>
-          <a:lnRef idx="1">
-            <a:schemeClr val="accent4"/>
-          </a:lnRef>
-          <a:fillRef idx="2">
-            <a:schemeClr val="accent4"/>
-          </a:fillRef>
-          <a:effectRef idx="1">
-            <a:schemeClr val="accent4"/>
-          </a:effectRef>
-          <a:fontRef idx="minor">
-            <a:schemeClr val="dk1"/>
-          </a:fontRef>
-        </p:style>
-        <p:txBody>
-          <a:bodyPr rtlCol="0" anchor="ctr"/>
-          <a:lstStyle/>
-          <a:p>
-            <a:pPr algn="ctr"/>
-            <a:r>
-              <a:rPr lang="en-US" sz="1050" dirty="0">
-                <a:solidFill>
-                  <a:srgbClr val="7030A0"/>
-                </a:solidFill>
-              </a:rPr>
-              <a:t>Email</a:t>
-            </a:r>
-            <a:endParaRPr lang="en-SG" sz="1050" dirty="0">
-              <a:solidFill>
-                <a:srgbClr val="7030A0"/>
-              </a:solidFill>
-            </a:endParaRPr>
-          </a:p>
-        </p:txBody>
-      </p:sp>
-      <p:cxnSp>
-        <p:nvCxnSpPr>
-          <p:cNvPr id="84" name="Elbow Connector 83"/>
-          <p:cNvCxnSpPr>
-            <a:stCxn id="78" idx="3"/>
-            <a:endCxn id="83" idx="1"/>
-          </p:cNvCxnSpPr>
-          <p:nvPr/>
-        </p:nvCxnSpPr>
-        <p:spPr>
-          <a:xfrm>
-            <a:off x="7277995" y="3034891"/>
-            <a:ext cx="434402" cy="318195"/>
-          </a:xfrm>
-          <a:prstGeom prst="bentConnector3">
-            <a:avLst/>
-          </a:prstGeom>
-          <a:ln w="19050">
-            <a:solidFill>
-              <a:srgbClr val="7030A0"/>
-            </a:solidFill>
-            <a:headEnd type="none" w="med" len="med"/>
-            <a:tailEnd type="arrow" w="med" len="med"/>
-          </a:ln>
-          <a:effectLst/>
-        </p:spPr>
-        <p:style>
-          <a:lnRef idx="1">
-            <a:schemeClr val="accent2"/>
-          </a:lnRef>
-          <a:fillRef idx="2">
-            <a:schemeClr val="accent2"/>
-          </a:fillRef>
-          <a:effectRef idx="1">
-            <a:schemeClr val="accent2"/>
-          </a:effectRef>
-          <a:fontRef idx="minor">
-            <a:schemeClr val="dk1"/>
-          </a:fontRef>
-        </p:style>
-      </p:cxnSp>
-      <p:sp>
-        <p:nvSpPr>
-          <p:cNvPr id="85" name="Rectangle 8"/>
-          <p:cNvSpPr/>
-          <p:nvPr/>
-        </p:nvSpPr>
-        <p:spPr>
-          <a:xfrm>
-            <a:off x="7712397" y="3533171"/>
-            <a:ext cx="708186" cy="285783"/>
-          </a:xfrm>
-          <a:prstGeom prst="rect">
-            <a:avLst/>
-          </a:prstGeom>
-          <a:ln w="19050">
-            <a:solidFill>
-              <a:srgbClr val="7030A0"/>
-            </a:solidFill>
-          </a:ln>
-          <a:effectLst/>
-        </p:spPr>
-        <p:style>
-          <a:lnRef idx="1">
-            <a:schemeClr val="accent4"/>
-          </a:lnRef>
-          <a:fillRef idx="2">
-            <a:schemeClr val="accent4"/>
-          </a:fillRef>
-          <a:effectRef idx="1">
-            <a:schemeClr val="accent4"/>
-          </a:effectRef>
-          <a:fontRef idx="minor">
-            <a:schemeClr val="dk1"/>
-          </a:fontRef>
-        </p:style>
-        <p:txBody>
-          <a:bodyPr rtlCol="0" anchor="ctr"/>
-          <a:lstStyle/>
-          <a:p>
-            <a:pPr algn="ctr"/>
-            <a:r>
-              <a:rPr lang="en-US" sz="1050" dirty="0">
-                <a:solidFill>
-                  <a:srgbClr val="7030A0"/>
-                </a:solidFill>
-              </a:rPr>
-              <a:t>Address</a:t>
-            </a:r>
-            <a:endParaRPr lang="en-SG" sz="1050" dirty="0">
-              <a:solidFill>
-                <a:srgbClr val="7030A0"/>
-              </a:solidFill>
-            </a:endParaRPr>
-          </a:p>
-        </p:txBody>
-      </p:sp>
-      <p:cxnSp>
-        <p:nvCxnSpPr>
-          <p:cNvPr id="86" name="Elbow Connector 85"/>
-          <p:cNvCxnSpPr>
-            <a:stCxn id="78" idx="3"/>
-            <a:endCxn id="85" idx="1"/>
-          </p:cNvCxnSpPr>
-          <p:nvPr/>
-        </p:nvCxnSpPr>
-        <p:spPr>
-          <a:xfrm>
-            <a:off x="7277995" y="3034891"/>
-            <a:ext cx="434402" cy="641172"/>
           </a:xfrm>
           <a:prstGeom prst="bentConnector3">
             <a:avLst/>
@@ -4921,12 +4544,12 @@
               </a:rPr>
             </a:br>
             <a:r>
-              <a:rPr lang="en-US" sz="1050" dirty="0" err="1">
+              <a:rPr lang="en-US" sz="1050" dirty="0" err="1" smtClean="0">
                 <a:solidFill>
                   <a:srgbClr val="7030A0"/>
                 </a:solidFill>
               </a:rPr>
-              <a:t>ReadOnlyAddressBook</a:t>
+              <a:t>ReadOnlyLibrary</a:t>
             </a:r>
             <a:endParaRPr lang="en-SG" sz="1050" dirty="0">
               <a:solidFill>
@@ -4944,8 +4567,8 @@
         </p:nvSpPr>
         <p:spPr>
           <a:xfrm rot="16200000">
-            <a:off x="6362886" y="3586305"/>
-            <a:ext cx="881018" cy="261610"/>
+            <a:off x="6364735" y="3580160"/>
+            <a:ext cx="949329" cy="369332"/>
           </a:xfrm>
           <a:prstGeom prst="rect">
             <a:avLst/>
@@ -4960,14 +4583,25 @@
           <a:p>
             <a:pPr algn="r"/>
             <a:r>
-              <a:rPr lang="en-US" sz="1100" dirty="0">
+              <a:rPr lang="en-US" sz="900" smtClean="0">
                 <a:solidFill>
                   <a:srgbClr val="7030A0"/>
                 </a:solidFill>
               </a:rPr>
-              <a:t>filtered list</a:t>
-            </a:r>
-            <a:endParaRPr lang="en-SG" sz="1100" dirty="0">
+              <a:t>Filtered</a:t>
+            </a:r>
+          </a:p>
+          <a:p>
+            <a:pPr algn="r"/>
+            <a:r>
+              <a:rPr lang="en-US" sz="900" dirty="0" err="1" smtClean="0">
+                <a:solidFill>
+                  <a:srgbClr val="7030A0"/>
+                </a:solidFill>
+              </a:rPr>
+              <a:t>TrackList</a:t>
+            </a:r>
+            <a:endParaRPr lang="en-SG" sz="900" dirty="0">
               <a:solidFill>
                 <a:srgbClr val="7030A0"/>
               </a:solidFill>
@@ -5104,7 +4738,7 @@
         </p:nvSpPr>
         <p:spPr>
           <a:xfrm>
-            <a:off x="4429979" y="3111479"/>
+            <a:off x="4535143" y="3111479"/>
             <a:ext cx="189257" cy="178683"/>
           </a:xfrm>
           <a:prstGeom prst="rect">
@@ -5176,14 +4810,14 @@
       </p:sp>
       <p:sp>
         <p:nvSpPr>
-          <p:cNvPr id="65" name="TextBox 64"/>
+          <p:cNvPr id="66" name="TextBox 65"/>
           <p:cNvSpPr txBox="1"/>
           <p:nvPr/>
         </p:nvSpPr>
         <p:spPr>
           <a:xfrm>
-            <a:off x="2573394" y="2756715"/>
-            <a:ext cx="170110" cy="137542"/>
+            <a:off x="2707070" y="3667737"/>
+            <a:ext cx="189257" cy="178683"/>
           </a:xfrm>
           <a:prstGeom prst="rect">
             <a:avLst/>
@@ -5215,13 +4849,13 @@
       </p:sp>
       <p:sp>
         <p:nvSpPr>
-          <p:cNvPr id="66" name="TextBox 65"/>
+          <p:cNvPr id="70" name="TextBox 69"/>
           <p:cNvSpPr txBox="1"/>
           <p:nvPr/>
         </p:nvSpPr>
         <p:spPr>
           <a:xfrm>
-            <a:off x="2707070" y="3667737"/>
+            <a:off x="6449896" y="3204826"/>
             <a:ext cx="189257" cy="178683"/>
           </a:xfrm>
           <a:prstGeom prst="rect">
@@ -5254,59 +4888,14 @@
       </p:sp>
       <p:sp>
         <p:nvSpPr>
-          <p:cNvPr id="70" name="TextBox 69"/>
-          <p:cNvSpPr txBox="1"/>
-          <p:nvPr/>
-        </p:nvSpPr>
-        <p:spPr>
-          <a:xfrm>
-            <a:off x="6449896" y="3204826"/>
-            <a:ext cx="189257" cy="178683"/>
-          </a:xfrm>
-          <a:prstGeom prst="rect">
-            <a:avLst/>
-          </a:prstGeom>
-          <a:noFill/>
-        </p:spPr>
-        <p:txBody>
-          <a:bodyPr wrap="square" lIns="0" tIns="0" rIns="0" bIns="0" rtlCol="0">
-            <a:noAutofit/>
-          </a:bodyPr>
-          <a:lstStyle/>
-          <a:p>
-            <a:pPr algn="ctr"/>
-            <a:r>
-              <a:rPr lang="en-US" sz="1100" dirty="0">
-                <a:solidFill>
-                  <a:srgbClr val="7030A0"/>
-                </a:solidFill>
-              </a:rPr>
-              <a:t>1</a:t>
-            </a:r>
-            <a:endParaRPr lang="en-SG" sz="1100" dirty="0">
-              <a:solidFill>
-                <a:srgbClr val="7030A0"/>
-              </a:solidFill>
-            </a:endParaRPr>
-          </a:p>
-        </p:txBody>
-      </p:sp>
-      <p:sp>
-        <p:nvSpPr>
-          <p:cNvPr id="52" name="Rectangle 8">
-            <a:extLst>
-              <a:ext uri="{FF2B5EF4-FFF2-40B4-BE49-F238E27FC236}">
-                <a16:creationId xmlns:a16="http://schemas.microsoft.com/office/drawing/2014/main" id="{ABDCDBD2-131A-4B66-A2F2-43BBEE82C773}"/>
-              </a:ext>
-            </a:extLst>
-          </p:cNvPr>
+          <p:cNvPr id="55" name="Rectangle 8"/>
           <p:cNvSpPr/>
           <p:nvPr/>
         </p:nvSpPr>
         <p:spPr>
           <a:xfrm>
-            <a:off x="7712397" y="2228817"/>
-            <a:ext cx="708186" cy="285783"/>
+            <a:off x="3170181" y="1998350"/>
+            <a:ext cx="1060683" cy="364396"/>
           </a:xfrm>
           <a:prstGeom prst="rect">
             <a:avLst/>
@@ -5338,12 +4927,12 @@
           <a:p>
             <a:pPr algn="ctr"/>
             <a:r>
-              <a:rPr lang="en-US" sz="1050" dirty="0">
+              <a:rPr lang="en-US" sz="1050" dirty="0" smtClean="0">
                 <a:solidFill>
                   <a:srgbClr val="7030A0"/>
                 </a:solidFill>
               </a:rPr>
-              <a:t>Tag</a:t>
+              <a:t>Library</a:t>
             </a:r>
             <a:endParaRPr lang="en-SG" sz="1050" dirty="0">
               <a:solidFill>
@@ -5355,168 +4944,17 @@
       </p:sp>
       <p:cxnSp>
         <p:nvCxnSpPr>
-          <p:cNvPr id="53" name="Elbow Connector 78">
-            <a:extLst>
-              <a:ext uri="{FF2B5EF4-FFF2-40B4-BE49-F238E27FC236}">
-                <a16:creationId xmlns:a16="http://schemas.microsoft.com/office/drawing/2014/main" id="{B97967F8-618A-448B-81FD-CDFD4AF0EC64}"/>
-              </a:ext>
-            </a:extLst>
-          </p:cNvPr>
-          <p:cNvCxnSpPr>
-            <a:cxnSpLocks/>
-            <a:stCxn id="78" idx="3"/>
-            <a:endCxn id="52" idx="1"/>
-          </p:cNvCxnSpPr>
-          <p:nvPr/>
-        </p:nvCxnSpPr>
-        <p:spPr>
-          <a:xfrm flipV="1">
-            <a:off x="7277995" y="2371709"/>
-            <a:ext cx="434402" cy="663182"/>
-          </a:xfrm>
-          <a:prstGeom prst="bentConnector3">
-            <a:avLst>
-              <a:gd name="adj1" fmla="val 50000"/>
-            </a:avLst>
-          </a:prstGeom>
-          <a:ln w="19050">
-            <a:solidFill>
-              <a:srgbClr val="7030A0"/>
-            </a:solidFill>
-            <a:headEnd type="none" w="med" len="med"/>
-            <a:tailEnd type="arrow" w="med" len="med"/>
-          </a:ln>
-          <a:effectLst/>
-        </p:spPr>
-        <p:style>
-          <a:lnRef idx="1">
-            <a:schemeClr val="accent2"/>
-          </a:lnRef>
-          <a:fillRef idx="2">
-            <a:schemeClr val="accent2"/>
-          </a:fillRef>
-          <a:effectRef idx="1">
-            <a:schemeClr val="accent2"/>
-          </a:effectRef>
-          <a:fontRef idx="minor">
-            <a:schemeClr val="dk1"/>
-          </a:fontRef>
-        </p:style>
-      </p:cxnSp>
-      <p:sp>
-        <p:nvSpPr>
-          <p:cNvPr id="50" name="TextBox 49">
-            <a:extLst>
-              <a:ext uri="{FF2B5EF4-FFF2-40B4-BE49-F238E27FC236}">
-                <a16:creationId xmlns:a16="http://schemas.microsoft.com/office/drawing/2014/main" id="{B3FA9D57-880F-49C4-AD0B-A64E30D6F403}"/>
-              </a:ext>
-            </a:extLst>
-          </p:cNvPr>
-          <p:cNvSpPr txBox="1"/>
-          <p:nvPr/>
-        </p:nvSpPr>
-        <p:spPr>
-          <a:xfrm>
-            <a:off x="7466243" y="2255711"/>
-            <a:ext cx="189257" cy="178683"/>
-          </a:xfrm>
-          <a:prstGeom prst="rect">
-            <a:avLst/>
-          </a:prstGeom>
-          <a:noFill/>
-        </p:spPr>
-        <p:txBody>
-          <a:bodyPr wrap="square" lIns="0" tIns="0" rIns="0" bIns="0" rtlCol="0">
-            <a:noAutofit/>
-          </a:bodyPr>
-          <a:lstStyle/>
-          <a:p>
-            <a:pPr algn="ctr"/>
-            <a:r>
-              <a:rPr lang="en-US" sz="1100" dirty="0">
-                <a:solidFill>
-                  <a:srgbClr val="7030A0"/>
-                </a:solidFill>
-              </a:rPr>
-              <a:t>*</a:t>
-            </a:r>
-            <a:endParaRPr lang="en-SG" sz="1100" dirty="0">
-              <a:solidFill>
-                <a:srgbClr val="7030A0"/>
-              </a:solidFill>
-            </a:endParaRPr>
-          </a:p>
-        </p:txBody>
-      </p:sp>
-      <p:sp>
-        <p:nvSpPr>
-          <p:cNvPr id="55" name="Rectangle 8"/>
-          <p:cNvSpPr/>
-          <p:nvPr/>
-        </p:nvSpPr>
-        <p:spPr>
-          <a:xfrm>
-            <a:off x="3170181" y="1998350"/>
-            <a:ext cx="1060683" cy="364396"/>
-          </a:xfrm>
-          <a:prstGeom prst="rect">
-            <a:avLst/>
-          </a:prstGeom>
-          <a:ln w="19050">
-            <a:solidFill>
-              <a:srgbClr val="7030A0"/>
-            </a:solidFill>
-          </a:ln>
-          <a:effectLst/>
-        </p:spPr>
-        <p:style>
-          <a:lnRef idx="1">
-            <a:schemeClr val="accent4"/>
-          </a:lnRef>
-          <a:fillRef idx="2">
-            <a:schemeClr val="accent4"/>
-          </a:fillRef>
-          <a:effectRef idx="1">
-            <a:schemeClr val="accent4"/>
-          </a:effectRef>
-          <a:fontRef idx="minor">
-            <a:schemeClr val="dk1"/>
-          </a:fontRef>
-        </p:style>
-        <p:txBody>
-          <a:bodyPr rtlCol="0" anchor="ctr"/>
-          <a:lstStyle/>
-          <a:p>
-            <a:pPr algn="ctr"/>
-            <a:r>
-              <a:rPr lang="en-US" sz="1050" dirty="0" err="1">
-                <a:solidFill>
-                  <a:srgbClr val="7030A0"/>
-                </a:solidFill>
-              </a:rPr>
-              <a:t>AddressBook</a:t>
-            </a:r>
-            <a:endParaRPr lang="en-SG" sz="1050" dirty="0">
-              <a:solidFill>
-                <a:srgbClr val="7030A0"/>
-              </a:solidFill>
-            </a:endParaRPr>
-          </a:p>
-        </p:txBody>
-      </p:sp>
-      <p:cxnSp>
-        <p:nvCxnSpPr>
           <p:cNvPr id="60" name="Straight Arrow Connector 59"/>
           <p:cNvCxnSpPr>
-            <a:stCxn id="51" idx="1"/>
+            <a:stCxn id="51" idx="3"/>
             <a:endCxn id="49" idx="1"/>
           </p:cNvCxnSpPr>
           <p:nvPr/>
         </p:nvCxnSpPr>
         <p:spPr>
-          <a:xfrm>
-            <a:off x="4324972" y="3007222"/>
-            <a:ext cx="367678" cy="12320"/>
+          <a:xfrm flipV="1">
+            <a:off x="4488091" y="3019542"/>
+            <a:ext cx="204559" cy="2773"/>
           </a:xfrm>
           <a:prstGeom prst="straightConnector1">
             <a:avLst/>
@@ -5641,6 +5079,306 @@
           </a:fontRef>
         </p:style>
       </p:cxnSp>
+      <p:cxnSp>
+        <p:nvCxnSpPr>
+          <p:cNvPr id="56" name="Elbow Connector 55"/>
+          <p:cNvCxnSpPr>
+            <a:cxnSpLocks/>
+          </p:cNvCxnSpPr>
+          <p:nvPr/>
+        </p:nvCxnSpPr>
+        <p:spPr>
+          <a:xfrm flipV="1">
+            <a:off x="2195835" y="3199877"/>
+            <a:ext cx="3062769" cy="780478"/>
+          </a:xfrm>
+          <a:prstGeom prst="bentConnector2">
+            <a:avLst/>
+          </a:prstGeom>
+          <a:ln w="19050">
+            <a:solidFill>
+              <a:srgbClr val="7030A0"/>
+            </a:solidFill>
+            <a:prstDash val="solid"/>
+            <a:headEnd type="none" w="med" len="med"/>
+            <a:tailEnd type="arrow" w="med" len="med"/>
+          </a:ln>
+          <a:effectLst/>
+        </p:spPr>
+        <p:style>
+          <a:lnRef idx="1">
+            <a:schemeClr val="accent2"/>
+          </a:lnRef>
+          <a:fillRef idx="2">
+            <a:schemeClr val="accent2"/>
+          </a:fillRef>
+          <a:effectRef idx="1">
+            <a:schemeClr val="accent2"/>
+          </a:effectRef>
+          <a:fontRef idx="minor">
+            <a:schemeClr val="dk1"/>
+          </a:fontRef>
+        </p:style>
+      </p:cxnSp>
+      <p:sp>
+        <p:nvSpPr>
+          <p:cNvPr id="57" name="TextBox 56"/>
+          <p:cNvSpPr txBox="1"/>
+          <p:nvPr/>
+        </p:nvSpPr>
+        <p:spPr>
+          <a:xfrm rot="16200000">
+            <a:off x="4868007" y="3671979"/>
+            <a:ext cx="1143689" cy="369332"/>
+          </a:xfrm>
+          <a:prstGeom prst="rect">
+            <a:avLst/>
+          </a:prstGeom>
+          <a:noFill/>
+        </p:spPr>
+        <p:txBody>
+          <a:bodyPr wrap="square" rtlCol="0">
+            <a:spAutoFit/>
+          </a:bodyPr>
+          <a:lstStyle/>
+          <a:p>
+            <a:pPr algn="r"/>
+            <a:r>
+              <a:rPr lang="en-US" sz="900" smtClean="0">
+                <a:solidFill>
+                  <a:srgbClr val="7030A0"/>
+                </a:solidFill>
+              </a:rPr>
+              <a:t>Filtered</a:t>
+            </a:r>
+          </a:p>
+          <a:p>
+            <a:pPr algn="r"/>
+            <a:r>
+              <a:rPr lang="en-US" sz="900" dirty="0" err="1" smtClean="0">
+                <a:solidFill>
+                  <a:srgbClr val="7030A0"/>
+                </a:solidFill>
+              </a:rPr>
+              <a:t>PlaylistList</a:t>
+            </a:r>
+            <a:endParaRPr lang="en-SG" sz="900" dirty="0">
+              <a:solidFill>
+                <a:srgbClr val="7030A0"/>
+              </a:solidFill>
+            </a:endParaRPr>
+          </a:p>
+        </p:txBody>
+      </p:sp>
+      <p:sp>
+        <p:nvSpPr>
+          <p:cNvPr id="59" name="TextBox 58"/>
+          <p:cNvSpPr txBox="1"/>
+          <p:nvPr/>
+        </p:nvSpPr>
+        <p:spPr>
+          <a:xfrm>
+            <a:off x="4990879" y="3195460"/>
+            <a:ext cx="316917" cy="178683"/>
+          </a:xfrm>
+          <a:prstGeom prst="rect">
+            <a:avLst/>
+          </a:prstGeom>
+          <a:noFill/>
+        </p:spPr>
+        <p:txBody>
+          <a:bodyPr wrap="square" lIns="0" tIns="0" rIns="0" bIns="0" rtlCol="0">
+            <a:noAutofit/>
+          </a:bodyPr>
+          <a:lstStyle/>
+          <a:p>
+            <a:pPr algn="ctr"/>
+            <a:r>
+              <a:rPr lang="en-US" sz="1100" dirty="0">
+                <a:solidFill>
+                  <a:srgbClr val="7030A0"/>
+                </a:solidFill>
+              </a:rPr>
+              <a:t>1</a:t>
+            </a:r>
+            <a:endParaRPr lang="en-SG" sz="1100" dirty="0">
+              <a:solidFill>
+                <a:srgbClr val="7030A0"/>
+              </a:solidFill>
+            </a:endParaRPr>
+          </a:p>
+        </p:txBody>
+      </p:sp>
+      <p:sp>
+        <p:nvSpPr>
+          <p:cNvPr id="71" name="TextBox 70"/>
+          <p:cNvSpPr txBox="1"/>
+          <p:nvPr/>
+        </p:nvSpPr>
+        <p:spPr>
+          <a:xfrm>
+            <a:off x="3168002" y="2362200"/>
+            <a:ext cx="279638" cy="243710"/>
+          </a:xfrm>
+          <a:prstGeom prst="rect">
+            <a:avLst/>
+          </a:prstGeom>
+          <a:noFill/>
+        </p:spPr>
+        <p:txBody>
+          <a:bodyPr wrap="square" lIns="0" tIns="0" rIns="0" bIns="0" rtlCol="0">
+            <a:noAutofit/>
+          </a:bodyPr>
+          <a:lstStyle/>
+          <a:p>
+            <a:r>
+              <a:rPr lang="en-US" sz="1100" smtClean="0">
+                <a:solidFill>
+                  <a:srgbClr val="7030A0"/>
+                </a:solidFill>
+              </a:rPr>
+              <a:t>1 </a:t>
+            </a:r>
+            <a:endParaRPr lang="en-SG" sz="1100" dirty="0">
+              <a:solidFill>
+                <a:srgbClr val="7030A0"/>
+              </a:solidFill>
+            </a:endParaRPr>
+          </a:p>
+        </p:txBody>
+      </p:sp>
+      <p:sp>
+        <p:nvSpPr>
+          <p:cNvPr id="73" name="Flowchart: Decision 96"/>
+          <p:cNvSpPr/>
+          <p:nvPr/>
+        </p:nvSpPr>
+        <p:spPr>
+          <a:xfrm>
+            <a:off x="2354752" y="3178954"/>
+            <a:ext cx="236048" cy="173380"/>
+          </a:xfrm>
+          <a:prstGeom prst="flowChartDecision">
+            <a:avLst/>
+          </a:prstGeom>
+          <a:solidFill>
+            <a:srgbClr val="7030A0"/>
+          </a:solidFill>
+          <a:ln w="19050">
+            <a:solidFill>
+              <a:srgbClr val="7030A0"/>
+            </a:solidFill>
+          </a:ln>
+          <a:effectLst/>
+        </p:spPr>
+        <p:style>
+          <a:lnRef idx="1">
+            <a:schemeClr val="accent6"/>
+          </a:lnRef>
+          <a:fillRef idx="2">
+            <a:schemeClr val="accent6"/>
+          </a:fillRef>
+          <a:effectRef idx="1">
+            <a:schemeClr val="accent6"/>
+          </a:effectRef>
+          <a:fontRef idx="minor">
+            <a:schemeClr val="dk1"/>
+          </a:fontRef>
+        </p:style>
+        <p:txBody>
+          <a:bodyPr rtlCol="0" anchor="ctr"/>
+          <a:lstStyle/>
+          <a:p>
+            <a:pPr algn="ctr"/>
+            <a:endParaRPr lang="en-US" sz="1050"/>
+          </a:p>
+        </p:txBody>
+      </p:sp>
+      <p:cxnSp>
+        <p:nvCxnSpPr>
+          <p:cNvPr id="87" name="Elbow Connector 86"/>
+          <p:cNvCxnSpPr>
+            <a:cxnSpLocks/>
+            <a:stCxn id="73" idx="3"/>
+            <a:endCxn id="71" idx="0"/>
+          </p:cNvCxnSpPr>
+          <p:nvPr/>
+        </p:nvCxnSpPr>
+        <p:spPr>
+          <a:xfrm flipV="1">
+            <a:off x="2590800" y="2362200"/>
+            <a:ext cx="717021" cy="903444"/>
+          </a:xfrm>
+          <a:prstGeom prst="bentConnector4">
+            <a:avLst>
+              <a:gd name="adj1" fmla="val 40250"/>
+              <a:gd name="adj2" fmla="val 69597"/>
+            </a:avLst>
+          </a:prstGeom>
+          <a:ln w="19050">
+            <a:solidFill>
+              <a:srgbClr val="7030A0"/>
+            </a:solidFill>
+            <a:prstDash val="solid"/>
+            <a:headEnd type="none" w="med" len="med"/>
+            <a:tailEnd type="arrow" w="med" len="med"/>
+          </a:ln>
+          <a:effectLst/>
+        </p:spPr>
+        <p:style>
+          <a:lnRef idx="1">
+            <a:schemeClr val="accent2"/>
+          </a:lnRef>
+          <a:fillRef idx="2">
+            <a:schemeClr val="accent2"/>
+          </a:fillRef>
+          <a:effectRef idx="1">
+            <a:schemeClr val="accent2"/>
+          </a:effectRef>
+          <a:fontRef idx="minor">
+            <a:schemeClr val="dk1"/>
+          </a:fontRef>
+        </p:style>
+      </p:cxnSp>
+      <p:sp>
+        <p:nvSpPr>
+          <p:cNvPr id="102" name="TextBox 101"/>
+          <p:cNvSpPr txBox="1"/>
+          <p:nvPr/>
+        </p:nvSpPr>
+        <p:spPr>
+          <a:xfrm>
+            <a:off x="7467600" y="3141487"/>
+            <a:ext cx="244385" cy="211313"/>
+          </a:xfrm>
+          <a:prstGeom prst="rect">
+            <a:avLst/>
+          </a:prstGeom>
+          <a:noFill/>
+        </p:spPr>
+        <p:txBody>
+          <a:bodyPr wrap="square" lIns="0" tIns="0" rIns="0" bIns="0" rtlCol="0">
+            <a:noAutofit/>
+          </a:bodyPr>
+          <a:lstStyle/>
+          <a:p>
+            <a:pPr algn="ctr"/>
+            <a:r>
+              <a:rPr lang="en-US" sz="1100" dirty="0">
+                <a:solidFill>
+                  <a:srgbClr val="7030A0"/>
+                </a:solidFill>
+              </a:rPr>
+              <a:t>1</a:t>
+            </a:r>
+            <a:endParaRPr lang="en-SG" sz="1100" dirty="0">
+              <a:solidFill>
+                <a:srgbClr val="7030A0"/>
+              </a:solidFill>
+            </a:endParaRPr>
+          </a:p>
+        </p:txBody>
+      </p:sp>
     </p:spTree>
     <p:extLst>
       <p:ext uri="{BB962C8B-B14F-4D97-AF65-F5344CB8AC3E}">

</xml_diff>

<commit_message>
add poll class diagram to dev guide
</commit_message>
<xml_diff>
--- a/docs/diagrams/ModelComponentClassDiagram.pptx
+++ b/docs/diagrams/ModelComponentClassDiagram.pptx
@@ -5921,7 +5921,7 @@
         </p:nvSpPr>
         <p:spPr>
           <a:xfrm>
-            <a:off x="6248400" y="2209800"/>
+            <a:off x="6324600" y="2209800"/>
             <a:ext cx="189257" cy="178683"/>
           </a:xfrm>
           <a:prstGeom prst="rect">
@@ -6264,8 +6264,8 @@
         </p:nvSpPr>
         <p:spPr>
           <a:xfrm>
-            <a:off x="6078908" y="2347620"/>
-            <a:ext cx="708186" cy="346760"/>
+            <a:off x="6078907" y="2347620"/>
+            <a:ext cx="893633" cy="328141"/>
           </a:xfrm>
           <a:prstGeom prst="rect">
             <a:avLst/>
@@ -6297,12 +6297,12 @@
           <a:p>
             <a:pPr algn="ctr"/>
             <a:r>
-              <a:rPr lang="en-US" sz="1050" dirty="0">
+              <a:rPr lang="en-US" sz="1050" dirty="0" err="1">
                 <a:solidFill>
                   <a:srgbClr val="7030A0"/>
                 </a:solidFill>
               </a:rPr>
-              <a:t>Poll</a:t>
+              <a:t>AbstractPoll</a:t>
             </a:r>
             <a:endParaRPr lang="en-SG" sz="1050" dirty="0">
               <a:solidFill>
@@ -6380,12 +6380,12 @@
         </p:nvCxnSpPr>
         <p:spPr>
           <a:xfrm flipH="1">
-            <a:off x="6433001" y="1713340"/>
-            <a:ext cx="465238" cy="634280"/>
+            <a:off x="6525724" y="1713340"/>
+            <a:ext cx="372515" cy="634280"/>
           </a:xfrm>
           <a:prstGeom prst="bentConnector4">
             <a:avLst>
-              <a:gd name="adj1" fmla="val -49136"/>
+              <a:gd name="adj1" fmla="val -61367"/>
               <a:gd name="adj2" fmla="val 56834"/>
             </a:avLst>
           </a:prstGeom>
@@ -6525,8 +6525,8 @@
         </p:nvCxnSpPr>
         <p:spPr>
           <a:xfrm rot="10800000" flipV="1">
-            <a:off x="5802718" y="2521000"/>
-            <a:ext cx="276191" cy="318258"/>
+            <a:off x="5802719" y="2511691"/>
+            <a:ext cx="276188" cy="327566"/>
           </a:xfrm>
           <a:prstGeom prst="bentConnector2">
             <a:avLst/>

</xml_diff>

<commit_message>
Update mdoel class diagram to indicate optional fields.
</commit_message>
<xml_diff>
--- a/docs/diagrams/ModelComponentClassDiagram.pptx
+++ b/docs/diagrams/ModelComponentClassDiagram.pptx
@@ -208,7 +208,7 @@
           <a:p>
             <a:fld id="{F5CC4B3F-88C1-4FFA-B1B6-F41C21DC6924}" type="datetimeFigureOut">
               <a:rPr lang="en-US" smtClean="0"/>
-              <a:t>10/29/18</a:t>
+              <a:t>11/11/18</a:t>
             </a:fld>
             <a:endParaRPr lang="en-US"/>
           </a:p>
@@ -654,7 +654,7 @@
           <a:p>
             <a:fld id="{78C97017-6FC3-485B-9764-EAC9E56C1D49}" type="datetimeFigureOut">
               <a:rPr lang="en-US" smtClean="0"/>
-              <a:t>10/29/18</a:t>
+              <a:t>11/11/18</a:t>
             </a:fld>
             <a:endParaRPr lang="en-US"/>
           </a:p>
@@ -822,7 +822,7 @@
           <a:p>
             <a:fld id="{78C97017-6FC3-485B-9764-EAC9E56C1D49}" type="datetimeFigureOut">
               <a:rPr lang="en-US" smtClean="0"/>
-              <a:t>10/29/18</a:t>
+              <a:t>11/11/18</a:t>
             </a:fld>
             <a:endParaRPr lang="en-US"/>
           </a:p>
@@ -1000,7 +1000,7 @@
           <a:p>
             <a:fld id="{78C97017-6FC3-485B-9764-EAC9E56C1D49}" type="datetimeFigureOut">
               <a:rPr lang="en-US" smtClean="0"/>
-              <a:t>10/29/18</a:t>
+              <a:t>11/11/18</a:t>
             </a:fld>
             <a:endParaRPr lang="en-US"/>
           </a:p>
@@ -1168,7 +1168,7 @@
           <a:p>
             <a:fld id="{78C97017-6FC3-485B-9764-EAC9E56C1D49}" type="datetimeFigureOut">
               <a:rPr lang="en-US" smtClean="0"/>
-              <a:t>10/29/18</a:t>
+              <a:t>11/11/18</a:t>
             </a:fld>
             <a:endParaRPr lang="en-US"/>
           </a:p>
@@ -1413,7 +1413,7 @@
           <a:p>
             <a:fld id="{78C97017-6FC3-485B-9764-EAC9E56C1D49}" type="datetimeFigureOut">
               <a:rPr lang="en-US" smtClean="0"/>
-              <a:t>10/29/18</a:t>
+              <a:t>11/11/18</a:t>
             </a:fld>
             <a:endParaRPr lang="en-US"/>
           </a:p>
@@ -1698,7 +1698,7 @@
           <a:p>
             <a:fld id="{78C97017-6FC3-485B-9764-EAC9E56C1D49}" type="datetimeFigureOut">
               <a:rPr lang="en-US" smtClean="0"/>
-              <a:t>10/29/18</a:t>
+              <a:t>11/11/18</a:t>
             </a:fld>
             <a:endParaRPr lang="en-US"/>
           </a:p>
@@ -2117,7 +2117,7 @@
           <a:p>
             <a:fld id="{78C97017-6FC3-485B-9764-EAC9E56C1D49}" type="datetimeFigureOut">
               <a:rPr lang="en-US" smtClean="0"/>
-              <a:t>10/29/18</a:t>
+              <a:t>11/11/18</a:t>
             </a:fld>
             <a:endParaRPr lang="en-US"/>
           </a:p>
@@ -2234,7 +2234,7 @@
           <a:p>
             <a:fld id="{78C97017-6FC3-485B-9764-EAC9E56C1D49}" type="datetimeFigureOut">
               <a:rPr lang="en-US" smtClean="0"/>
-              <a:t>10/29/18</a:t>
+              <a:t>11/11/18</a:t>
             </a:fld>
             <a:endParaRPr lang="en-US"/>
           </a:p>
@@ -2329,7 +2329,7 @@
           <a:p>
             <a:fld id="{78C97017-6FC3-485B-9764-EAC9E56C1D49}" type="datetimeFigureOut">
               <a:rPr lang="en-US" smtClean="0"/>
-              <a:t>10/29/18</a:t>
+              <a:t>11/11/18</a:t>
             </a:fld>
             <a:endParaRPr lang="en-US"/>
           </a:p>
@@ -2604,7 +2604,7 @@
           <a:p>
             <a:fld id="{78C97017-6FC3-485B-9764-EAC9E56C1D49}" type="datetimeFigureOut">
               <a:rPr lang="en-US" smtClean="0"/>
-              <a:t>10/29/18</a:t>
+              <a:t>11/11/18</a:t>
             </a:fld>
             <a:endParaRPr lang="en-US"/>
           </a:p>
@@ -2856,7 +2856,7 @@
           <a:p>
             <a:fld id="{78C97017-6FC3-485B-9764-EAC9E56C1D49}" type="datetimeFigureOut">
               <a:rPr lang="en-US" smtClean="0"/>
-              <a:t>10/29/18</a:t>
+              <a:t>11/11/18</a:t>
             </a:fld>
             <a:endParaRPr lang="en-US"/>
           </a:p>
@@ -3067,7 +3067,7 @@
           <a:p>
             <a:fld id="{78C97017-6FC3-485B-9764-EAC9E56C1D49}" type="datetimeFigureOut">
               <a:rPr lang="en-US" smtClean="0"/>
-              <a:t>10/29/18</a:t>
+              <a:t>11/11/18</a:t>
             </a:fld>
             <a:endParaRPr lang="en-US"/>
           </a:p>
@@ -5855,10 +5855,10 @@
       </p:cxnSp>
       <p:sp>
         <p:nvSpPr>
-          <p:cNvPr id="71" name="TextBox 70">
+          <p:cNvPr id="72" name="TextBox 71">
             <a:extLst>
               <a:ext uri="{FF2B5EF4-FFF2-40B4-BE49-F238E27FC236}">
-                <a16:creationId xmlns:a16="http://schemas.microsoft.com/office/drawing/2014/main" id="{18CCA75B-7859-A747-9C78-7B2DE7C77B82}"/>
+                <a16:creationId xmlns:a16="http://schemas.microsoft.com/office/drawing/2014/main" id="{B51558DC-A788-884A-945C-E539802FC220}"/>
               </a:ext>
             </a:extLst>
           </p:cNvPr>
@@ -5867,8 +5867,188 @@
         </p:nvSpPr>
         <p:spPr>
           <a:xfrm>
-            <a:off x="7467600" y="4365618"/>
-            <a:ext cx="189257" cy="134247"/>
+            <a:off x="7471315" y="3569104"/>
+            <a:ext cx="189257" cy="178683"/>
+          </a:xfrm>
+          <a:prstGeom prst="rect">
+            <a:avLst/>
+          </a:prstGeom>
+          <a:noFill/>
+        </p:spPr>
+        <p:txBody>
+          <a:bodyPr wrap="square" lIns="0" tIns="0" rIns="0" bIns="0" rtlCol="0">
+            <a:noAutofit/>
+          </a:bodyPr>
+          <a:lstStyle/>
+          <a:p>
+            <a:pPr algn="ctr"/>
+            <a:r>
+              <a:rPr lang="en-US" sz="1100" dirty="0">
+                <a:solidFill>
+                  <a:srgbClr val="7030A0"/>
+                </a:solidFill>
+              </a:rPr>
+              <a:t>*</a:t>
+            </a:r>
+            <a:endParaRPr lang="en-SG" sz="1100" dirty="0">
+              <a:solidFill>
+                <a:srgbClr val="7030A0"/>
+              </a:solidFill>
+            </a:endParaRPr>
+          </a:p>
+        </p:txBody>
+      </p:sp>
+      <p:sp>
+        <p:nvSpPr>
+          <p:cNvPr id="73" name="TextBox 72">
+            <a:extLst>
+              <a:ext uri="{FF2B5EF4-FFF2-40B4-BE49-F238E27FC236}">
+                <a16:creationId xmlns:a16="http://schemas.microsoft.com/office/drawing/2014/main" id="{AB36D6A6-0E56-324A-9B98-8FEB25B51B22}"/>
+              </a:ext>
+            </a:extLst>
+          </p:cNvPr>
+          <p:cNvSpPr txBox="1"/>
+          <p:nvPr/>
+        </p:nvSpPr>
+        <p:spPr>
+          <a:xfrm>
+            <a:off x="7466243" y="3226715"/>
+            <a:ext cx="189257" cy="178683"/>
+          </a:xfrm>
+          <a:prstGeom prst="rect">
+            <a:avLst/>
+          </a:prstGeom>
+          <a:noFill/>
+        </p:spPr>
+        <p:txBody>
+          <a:bodyPr wrap="square" lIns="0" tIns="0" rIns="0" bIns="0" rtlCol="0">
+            <a:noAutofit/>
+          </a:bodyPr>
+          <a:lstStyle/>
+          <a:p>
+            <a:pPr algn="ctr"/>
+            <a:r>
+              <a:rPr lang="en-US" sz="1100" dirty="0">
+                <a:solidFill>
+                  <a:srgbClr val="7030A0"/>
+                </a:solidFill>
+              </a:rPr>
+              <a:t>*</a:t>
+            </a:r>
+            <a:endParaRPr lang="en-SG" sz="1100" dirty="0">
+              <a:solidFill>
+                <a:srgbClr val="7030A0"/>
+              </a:solidFill>
+            </a:endParaRPr>
+          </a:p>
+        </p:txBody>
+      </p:sp>
+      <p:sp>
+        <p:nvSpPr>
+          <p:cNvPr id="74" name="TextBox 73">
+            <a:extLst>
+              <a:ext uri="{FF2B5EF4-FFF2-40B4-BE49-F238E27FC236}">
+                <a16:creationId xmlns:a16="http://schemas.microsoft.com/office/drawing/2014/main" id="{AD40CE73-E00B-5446-9DD1-3CE423DCA73E}"/>
+              </a:ext>
+            </a:extLst>
+          </p:cNvPr>
+          <p:cNvSpPr txBox="1"/>
+          <p:nvPr/>
+        </p:nvSpPr>
+        <p:spPr>
+          <a:xfrm>
+            <a:off x="7466243" y="3897632"/>
+            <a:ext cx="189257" cy="178683"/>
+          </a:xfrm>
+          <a:prstGeom prst="rect">
+            <a:avLst/>
+          </a:prstGeom>
+          <a:noFill/>
+        </p:spPr>
+        <p:txBody>
+          <a:bodyPr wrap="square" lIns="0" tIns="0" rIns="0" bIns="0" rtlCol="0">
+            <a:noAutofit/>
+          </a:bodyPr>
+          <a:lstStyle/>
+          <a:p>
+            <a:pPr algn="ctr"/>
+            <a:r>
+              <a:rPr lang="en-US" sz="1100" dirty="0">
+                <a:solidFill>
+                  <a:srgbClr val="7030A0"/>
+                </a:solidFill>
+              </a:rPr>
+              <a:t>*</a:t>
+            </a:r>
+            <a:endParaRPr lang="en-SG" sz="1100" dirty="0">
+              <a:solidFill>
+                <a:srgbClr val="7030A0"/>
+              </a:solidFill>
+            </a:endParaRPr>
+          </a:p>
+        </p:txBody>
+      </p:sp>
+      <p:sp>
+        <p:nvSpPr>
+          <p:cNvPr id="77" name="TextBox 76">
+            <a:extLst>
+              <a:ext uri="{FF2B5EF4-FFF2-40B4-BE49-F238E27FC236}">
+                <a16:creationId xmlns:a16="http://schemas.microsoft.com/office/drawing/2014/main" id="{62958F7C-3819-A942-BE2C-2D1B0BE98CEA}"/>
+              </a:ext>
+            </a:extLst>
+          </p:cNvPr>
+          <p:cNvSpPr txBox="1"/>
+          <p:nvPr/>
+        </p:nvSpPr>
+        <p:spPr>
+          <a:xfrm>
+            <a:off x="7467600" y="4214952"/>
+            <a:ext cx="189257" cy="178683"/>
+          </a:xfrm>
+          <a:prstGeom prst="rect">
+            <a:avLst/>
+          </a:prstGeom>
+          <a:noFill/>
+        </p:spPr>
+        <p:txBody>
+          <a:bodyPr wrap="square" lIns="0" tIns="0" rIns="0" bIns="0" rtlCol="0">
+            <a:noAutofit/>
+          </a:bodyPr>
+          <a:lstStyle/>
+          <a:p>
+            <a:pPr algn="ctr"/>
+            <a:r>
+              <a:rPr lang="en-US" sz="1100" dirty="0">
+                <a:solidFill>
+                  <a:srgbClr val="7030A0"/>
+                </a:solidFill>
+              </a:rPr>
+              <a:t>*</a:t>
+            </a:r>
+            <a:endParaRPr lang="en-SG" sz="1100" dirty="0">
+              <a:solidFill>
+                <a:srgbClr val="7030A0"/>
+              </a:solidFill>
+            </a:endParaRPr>
+          </a:p>
+        </p:txBody>
+      </p:sp>
+      <p:sp>
+        <p:nvSpPr>
+          <p:cNvPr id="82" name="TextBox 81">
+            <a:extLst>
+              <a:ext uri="{FF2B5EF4-FFF2-40B4-BE49-F238E27FC236}">
+                <a16:creationId xmlns:a16="http://schemas.microsoft.com/office/drawing/2014/main" id="{16942ECC-6F8F-B947-8701-57BDC43EE2F9}"/>
+              </a:ext>
+            </a:extLst>
+          </p:cNvPr>
+          <p:cNvSpPr txBox="1"/>
+          <p:nvPr/>
+        </p:nvSpPr>
+        <p:spPr>
+          <a:xfrm>
+            <a:off x="7466243" y="2930200"/>
+            <a:ext cx="189257" cy="178683"/>
           </a:xfrm>
           <a:prstGeom prst="rect">
             <a:avLst/>

</xml_diff>

<commit_message>
Modify the model class diagram to indicate the number of optional fields.
</commit_message>
<xml_diff>
--- a/docs/diagrams/ModelComponentClassDiagram.pptx
+++ b/docs/diagrams/ModelComponentClassDiagram.pptx
@@ -3451,7 +3451,7 @@
         <p:spPr>
           <a:xfrm>
             <a:off x="1119865" y="1600200"/>
-            <a:ext cx="7490735" cy="3124200"/>
+            <a:ext cx="7566935" cy="3124200"/>
           </a:xfrm>
           <a:prstGeom prst="roundRect">
             <a:avLst>
@@ -4348,7 +4348,7 @@
         </p:nvSpPr>
         <p:spPr>
           <a:xfrm>
-            <a:off x="7712397" y="2564238"/>
+            <a:off x="7774474" y="2564238"/>
             <a:ext cx="708186" cy="285783"/>
           </a:xfrm>
           <a:prstGeom prst="rect">
@@ -4448,16 +4448,19 @@
           <p:cNvPr id="79" name="Elbow Connector 78"/>
           <p:cNvCxnSpPr>
             <a:cxnSpLocks/>
+            <a:endCxn id="76" idx="1"/>
           </p:cNvCxnSpPr>
           <p:nvPr/>
         </p:nvCxnSpPr>
         <p:spPr>
           <a:xfrm flipV="1">
-            <a:off x="7277995" y="2706821"/>
-            <a:ext cx="434402" cy="327761"/>
+            <a:off x="7150055" y="2707130"/>
+            <a:ext cx="624419" cy="327454"/>
           </a:xfrm>
           <a:prstGeom prst="bentConnector3">
-            <a:avLst/>
+            <a:avLst>
+              <a:gd name="adj1" fmla="val 50073"/>
+            </a:avLst>
           </a:prstGeom>
           <a:ln w="19050">
             <a:solidFill>
@@ -4491,7 +4494,7 @@
         </p:nvSpPr>
         <p:spPr>
           <a:xfrm>
-            <a:off x="7712397" y="2887216"/>
+            <a:off x="7774474" y="2891690"/>
             <a:ext cx="708186" cy="285783"/>
           </a:xfrm>
           <a:prstGeom prst="rect">
@@ -4550,8 +4553,8 @@
         </p:nvCxnSpPr>
         <p:spPr>
           <a:xfrm flipV="1">
-            <a:off x="7277995" y="3030108"/>
-            <a:ext cx="434402" cy="4783"/>
+            <a:off x="7277995" y="3034582"/>
+            <a:ext cx="496479" cy="309"/>
           </a:xfrm>
           <a:prstGeom prst="bentConnector3">
             <a:avLst/>
@@ -4588,7 +4591,7 @@
         </p:nvSpPr>
         <p:spPr>
           <a:xfrm>
-            <a:off x="7712397" y="3210194"/>
+            <a:off x="7774474" y="3210194"/>
             <a:ext cx="708186" cy="285783"/>
           </a:xfrm>
           <a:prstGeom prst="rect">
@@ -4648,10 +4651,12 @@
         <p:spPr>
           <a:xfrm>
             <a:off x="7277995" y="3034891"/>
-            <a:ext cx="434402" cy="318195"/>
+            <a:ext cx="496479" cy="318195"/>
           </a:xfrm>
           <a:prstGeom prst="bentConnector3">
-            <a:avLst/>
+            <a:avLst>
+              <a:gd name="adj1" fmla="val 36750"/>
+            </a:avLst>
           </a:prstGeom>
           <a:ln w="19050">
             <a:solidFill>
@@ -4685,7 +4690,7 @@
         </p:nvSpPr>
         <p:spPr>
           <a:xfrm>
-            <a:off x="7712397" y="3533171"/>
+            <a:off x="7774474" y="3533171"/>
             <a:ext cx="708186" cy="285783"/>
           </a:xfrm>
           <a:prstGeom prst="rect">
@@ -4745,10 +4750,12 @@
         <p:spPr>
           <a:xfrm>
             <a:off x="7277995" y="3034891"/>
-            <a:ext cx="434402" cy="641172"/>
+            <a:ext cx="496479" cy="641172"/>
           </a:xfrm>
           <a:prstGeom prst="bentConnector3">
-            <a:avLst/>
+            <a:avLst>
+              <a:gd name="adj1" fmla="val 36750"/>
+            </a:avLst>
           </a:prstGeom>
           <a:ln w="19050">
             <a:solidFill>
@@ -5297,7 +5304,7 @@
         </p:nvSpPr>
         <p:spPr>
           <a:xfrm>
-            <a:off x="7712397" y="2228817"/>
+            <a:off x="7774474" y="2228817"/>
             <a:ext cx="708186" cy="285783"/>
           </a:xfrm>
           <a:prstGeom prst="rect">
@@ -5364,11 +5371,11 @@
         <p:spPr>
           <a:xfrm flipV="1">
             <a:off x="7277995" y="2371709"/>
-            <a:ext cx="434402" cy="663182"/>
+            <a:ext cx="496479" cy="663182"/>
           </a:xfrm>
           <a:prstGeom prst="bentConnector3">
             <a:avLst>
-              <a:gd name="adj1" fmla="val 50000"/>
+              <a:gd name="adj1" fmla="val 36750"/>
             </a:avLst>
           </a:prstGeom>
           <a:ln w="19050">
@@ -5647,7 +5654,7 @@
         </p:nvSpPr>
         <p:spPr>
           <a:xfrm>
-            <a:off x="7710323" y="3875891"/>
+            <a:off x="7772400" y="3875891"/>
             <a:ext cx="708186" cy="285783"/>
           </a:xfrm>
           <a:prstGeom prst="rect">
@@ -5714,10 +5721,12 @@
         <p:spPr>
           <a:xfrm>
             <a:off x="7277995" y="3034891"/>
-            <a:ext cx="432328" cy="983892"/>
+            <a:ext cx="494405" cy="983892"/>
           </a:xfrm>
           <a:prstGeom prst="bentConnector3">
-            <a:avLst/>
+            <a:avLst>
+              <a:gd name="adj1" fmla="val 36694"/>
+            </a:avLst>
           </a:prstGeom>
           <a:ln w="19050">
             <a:solidFill>
@@ -5757,7 +5766,7 @@
         </p:nvSpPr>
         <p:spPr>
           <a:xfrm>
-            <a:off x="7710323" y="4198022"/>
+            <a:off x="7772400" y="4198022"/>
             <a:ext cx="708186" cy="285783"/>
           </a:xfrm>
           <a:prstGeom prst="rect">
@@ -5824,10 +5833,12 @@
         <p:spPr>
           <a:xfrm>
             <a:off x="7277995" y="3034891"/>
-            <a:ext cx="432328" cy="1306023"/>
+            <a:ext cx="494405" cy="1306023"/>
           </a:xfrm>
           <a:prstGeom prst="bentConnector3">
-            <a:avLst/>
+            <a:avLst>
+              <a:gd name="adj1" fmla="val 36694"/>
+            </a:avLst>
           </a:prstGeom>
           <a:ln w="19050">
             <a:solidFill>
@@ -5855,186 +5866,6 @@
       </p:cxnSp>
       <p:sp>
         <p:nvSpPr>
-          <p:cNvPr id="72" name="TextBox 71">
-            <a:extLst>
-              <a:ext uri="{FF2B5EF4-FFF2-40B4-BE49-F238E27FC236}">
-                <a16:creationId xmlns:a16="http://schemas.microsoft.com/office/drawing/2014/main" id="{B51558DC-A788-884A-945C-E539802FC220}"/>
-              </a:ext>
-            </a:extLst>
-          </p:cNvPr>
-          <p:cNvSpPr txBox="1"/>
-          <p:nvPr/>
-        </p:nvSpPr>
-        <p:spPr>
-          <a:xfrm>
-            <a:off x="7471315" y="3569104"/>
-            <a:ext cx="189257" cy="178683"/>
-          </a:xfrm>
-          <a:prstGeom prst="rect">
-            <a:avLst/>
-          </a:prstGeom>
-          <a:noFill/>
-        </p:spPr>
-        <p:txBody>
-          <a:bodyPr wrap="square" lIns="0" tIns="0" rIns="0" bIns="0" rtlCol="0">
-            <a:noAutofit/>
-          </a:bodyPr>
-          <a:lstStyle/>
-          <a:p>
-            <a:pPr algn="ctr"/>
-            <a:r>
-              <a:rPr lang="en-US" sz="1100" dirty="0">
-                <a:solidFill>
-                  <a:srgbClr val="7030A0"/>
-                </a:solidFill>
-              </a:rPr>
-              <a:t>*</a:t>
-            </a:r>
-            <a:endParaRPr lang="en-SG" sz="1100" dirty="0">
-              <a:solidFill>
-                <a:srgbClr val="7030A0"/>
-              </a:solidFill>
-            </a:endParaRPr>
-          </a:p>
-        </p:txBody>
-      </p:sp>
-      <p:sp>
-        <p:nvSpPr>
-          <p:cNvPr id="73" name="TextBox 72">
-            <a:extLst>
-              <a:ext uri="{FF2B5EF4-FFF2-40B4-BE49-F238E27FC236}">
-                <a16:creationId xmlns:a16="http://schemas.microsoft.com/office/drawing/2014/main" id="{AB36D6A6-0E56-324A-9B98-8FEB25B51B22}"/>
-              </a:ext>
-            </a:extLst>
-          </p:cNvPr>
-          <p:cNvSpPr txBox="1"/>
-          <p:nvPr/>
-        </p:nvSpPr>
-        <p:spPr>
-          <a:xfrm>
-            <a:off x="7466243" y="3226715"/>
-            <a:ext cx="189257" cy="178683"/>
-          </a:xfrm>
-          <a:prstGeom prst="rect">
-            <a:avLst/>
-          </a:prstGeom>
-          <a:noFill/>
-        </p:spPr>
-        <p:txBody>
-          <a:bodyPr wrap="square" lIns="0" tIns="0" rIns="0" bIns="0" rtlCol="0">
-            <a:noAutofit/>
-          </a:bodyPr>
-          <a:lstStyle/>
-          <a:p>
-            <a:pPr algn="ctr"/>
-            <a:r>
-              <a:rPr lang="en-US" sz="1100" dirty="0">
-                <a:solidFill>
-                  <a:srgbClr val="7030A0"/>
-                </a:solidFill>
-              </a:rPr>
-              <a:t>*</a:t>
-            </a:r>
-            <a:endParaRPr lang="en-SG" sz="1100" dirty="0">
-              <a:solidFill>
-                <a:srgbClr val="7030A0"/>
-              </a:solidFill>
-            </a:endParaRPr>
-          </a:p>
-        </p:txBody>
-      </p:sp>
-      <p:sp>
-        <p:nvSpPr>
-          <p:cNvPr id="74" name="TextBox 73">
-            <a:extLst>
-              <a:ext uri="{FF2B5EF4-FFF2-40B4-BE49-F238E27FC236}">
-                <a16:creationId xmlns:a16="http://schemas.microsoft.com/office/drawing/2014/main" id="{AD40CE73-E00B-5446-9DD1-3CE423DCA73E}"/>
-              </a:ext>
-            </a:extLst>
-          </p:cNvPr>
-          <p:cNvSpPr txBox="1"/>
-          <p:nvPr/>
-        </p:nvSpPr>
-        <p:spPr>
-          <a:xfrm>
-            <a:off x="7466243" y="3897632"/>
-            <a:ext cx="189257" cy="178683"/>
-          </a:xfrm>
-          <a:prstGeom prst="rect">
-            <a:avLst/>
-          </a:prstGeom>
-          <a:noFill/>
-        </p:spPr>
-        <p:txBody>
-          <a:bodyPr wrap="square" lIns="0" tIns="0" rIns="0" bIns="0" rtlCol="0">
-            <a:noAutofit/>
-          </a:bodyPr>
-          <a:lstStyle/>
-          <a:p>
-            <a:pPr algn="ctr"/>
-            <a:r>
-              <a:rPr lang="en-US" sz="1100" dirty="0">
-                <a:solidFill>
-                  <a:srgbClr val="7030A0"/>
-                </a:solidFill>
-              </a:rPr>
-              <a:t>*</a:t>
-            </a:r>
-            <a:endParaRPr lang="en-SG" sz="1100" dirty="0">
-              <a:solidFill>
-                <a:srgbClr val="7030A0"/>
-              </a:solidFill>
-            </a:endParaRPr>
-          </a:p>
-        </p:txBody>
-      </p:sp>
-      <p:sp>
-        <p:nvSpPr>
-          <p:cNvPr id="77" name="TextBox 76">
-            <a:extLst>
-              <a:ext uri="{FF2B5EF4-FFF2-40B4-BE49-F238E27FC236}">
-                <a16:creationId xmlns:a16="http://schemas.microsoft.com/office/drawing/2014/main" id="{62958F7C-3819-A942-BE2C-2D1B0BE98CEA}"/>
-              </a:ext>
-            </a:extLst>
-          </p:cNvPr>
-          <p:cNvSpPr txBox="1"/>
-          <p:nvPr/>
-        </p:nvSpPr>
-        <p:spPr>
-          <a:xfrm>
-            <a:off x="7467600" y="4214952"/>
-            <a:ext cx="189257" cy="178683"/>
-          </a:xfrm>
-          <a:prstGeom prst="rect">
-            <a:avLst/>
-          </a:prstGeom>
-          <a:noFill/>
-        </p:spPr>
-        <p:txBody>
-          <a:bodyPr wrap="square" lIns="0" tIns="0" rIns="0" bIns="0" rtlCol="0">
-            <a:noAutofit/>
-          </a:bodyPr>
-          <a:lstStyle/>
-          <a:p>
-            <a:pPr algn="ctr"/>
-            <a:r>
-              <a:rPr lang="en-US" sz="1100" dirty="0">
-                <a:solidFill>
-                  <a:srgbClr val="7030A0"/>
-                </a:solidFill>
-              </a:rPr>
-              <a:t>*</a:t>
-            </a:r>
-            <a:endParaRPr lang="en-SG" sz="1100" dirty="0">
-              <a:solidFill>
-                <a:srgbClr val="7030A0"/>
-              </a:solidFill>
-            </a:endParaRPr>
-          </a:p>
-        </p:txBody>
-      </p:sp>
-      <p:sp>
-        <p:nvSpPr>
           <p:cNvPr id="82" name="TextBox 81">
             <a:extLst>
               <a:ext uri="{FF2B5EF4-FFF2-40B4-BE49-F238E27FC236}">
@@ -6047,8 +5878,8 @@
         </p:nvSpPr>
         <p:spPr>
           <a:xfrm>
-            <a:off x="7466243" y="2930200"/>
-            <a:ext cx="189257" cy="178683"/>
+            <a:off x="7457641" y="2880539"/>
+            <a:ext cx="245497" cy="178683"/>
           </a:xfrm>
           <a:prstGeom prst="rect">
             <a:avLst/>
@@ -6063,14 +5894,239 @@
           <a:p>
             <a:pPr algn="ctr"/>
             <a:r>
-              <a:rPr lang="en-US" sz="1100" dirty="0">
+              <a:rPr lang="en-US" sz="1000" dirty="0">
                 <a:solidFill>
                   <a:srgbClr val="7030A0"/>
                 </a:solidFill>
               </a:rPr>
-              <a:t>*</a:t>
-            </a:r>
-            <a:endParaRPr lang="en-SG" sz="1100" dirty="0">
+              <a:t>0..1</a:t>
+            </a:r>
+            <a:endParaRPr lang="en-SG" sz="1000" dirty="0">
+              <a:solidFill>
+                <a:srgbClr val="7030A0"/>
+              </a:solidFill>
+            </a:endParaRPr>
+          </a:p>
+        </p:txBody>
+      </p:sp>
+      <p:sp>
+        <p:nvSpPr>
+          <p:cNvPr id="71" name="TextBox 70">
+            <a:extLst>
+              <a:ext uri="{FF2B5EF4-FFF2-40B4-BE49-F238E27FC236}">
+                <a16:creationId xmlns:a16="http://schemas.microsoft.com/office/drawing/2014/main" id="{F90E15F2-0D99-D94E-9CD5-22A96D217D04}"/>
+              </a:ext>
+            </a:extLst>
+          </p:cNvPr>
+          <p:cNvSpPr txBox="1"/>
+          <p:nvPr/>
+        </p:nvSpPr>
+        <p:spPr>
+          <a:xfrm>
+            <a:off x="7457641" y="3204826"/>
+            <a:ext cx="245497" cy="178683"/>
+          </a:xfrm>
+          <a:prstGeom prst="rect">
+            <a:avLst/>
+          </a:prstGeom>
+          <a:noFill/>
+        </p:spPr>
+        <p:txBody>
+          <a:bodyPr wrap="square" lIns="0" tIns="0" rIns="0" bIns="0" rtlCol="0">
+            <a:noAutofit/>
+          </a:bodyPr>
+          <a:lstStyle/>
+          <a:p>
+            <a:pPr algn="ctr"/>
+            <a:r>
+              <a:rPr lang="en-US" sz="1000" dirty="0">
+                <a:solidFill>
+                  <a:srgbClr val="7030A0"/>
+                </a:solidFill>
+              </a:rPr>
+              <a:t>0..1</a:t>
+            </a:r>
+            <a:endParaRPr lang="en-SG" sz="1000" dirty="0">
+              <a:solidFill>
+                <a:srgbClr val="7030A0"/>
+              </a:solidFill>
+            </a:endParaRPr>
+          </a:p>
+        </p:txBody>
+      </p:sp>
+      <p:sp>
+        <p:nvSpPr>
+          <p:cNvPr id="87" name="TextBox 86">
+            <a:extLst>
+              <a:ext uri="{FF2B5EF4-FFF2-40B4-BE49-F238E27FC236}">
+                <a16:creationId xmlns:a16="http://schemas.microsoft.com/office/drawing/2014/main" id="{C882BADB-C9A4-274E-8494-BB9E7894CB7F}"/>
+              </a:ext>
+            </a:extLst>
+          </p:cNvPr>
+          <p:cNvSpPr txBox="1"/>
+          <p:nvPr/>
+        </p:nvSpPr>
+        <p:spPr>
+          <a:xfrm>
+            <a:off x="7466243" y="3505200"/>
+            <a:ext cx="245497" cy="178683"/>
+          </a:xfrm>
+          <a:prstGeom prst="rect">
+            <a:avLst/>
+          </a:prstGeom>
+          <a:noFill/>
+        </p:spPr>
+        <p:txBody>
+          <a:bodyPr wrap="square" lIns="0" tIns="0" rIns="0" bIns="0" rtlCol="0">
+            <a:noAutofit/>
+          </a:bodyPr>
+          <a:lstStyle/>
+          <a:p>
+            <a:pPr algn="ctr"/>
+            <a:r>
+              <a:rPr lang="en-US" sz="1000" dirty="0">
+                <a:solidFill>
+                  <a:srgbClr val="7030A0"/>
+                </a:solidFill>
+              </a:rPr>
+              <a:t>0..1</a:t>
+            </a:r>
+            <a:endParaRPr lang="en-SG" sz="1000" dirty="0">
+              <a:solidFill>
+                <a:srgbClr val="7030A0"/>
+              </a:solidFill>
+            </a:endParaRPr>
+          </a:p>
+        </p:txBody>
+      </p:sp>
+      <p:sp>
+        <p:nvSpPr>
+          <p:cNvPr id="88" name="TextBox 87">
+            <a:extLst>
+              <a:ext uri="{FF2B5EF4-FFF2-40B4-BE49-F238E27FC236}">
+                <a16:creationId xmlns:a16="http://schemas.microsoft.com/office/drawing/2014/main" id="{93E1E4D9-C0DE-DF40-97B2-B42E7F37B0D1}"/>
+              </a:ext>
+            </a:extLst>
+          </p:cNvPr>
+          <p:cNvSpPr txBox="1"/>
+          <p:nvPr/>
+        </p:nvSpPr>
+        <p:spPr>
+          <a:xfrm>
+            <a:off x="7466243" y="3869284"/>
+            <a:ext cx="245497" cy="178683"/>
+          </a:xfrm>
+          <a:prstGeom prst="rect">
+            <a:avLst/>
+          </a:prstGeom>
+          <a:noFill/>
+        </p:spPr>
+        <p:txBody>
+          <a:bodyPr wrap="square" lIns="0" tIns="0" rIns="0" bIns="0" rtlCol="0">
+            <a:noAutofit/>
+          </a:bodyPr>
+          <a:lstStyle/>
+          <a:p>
+            <a:pPr algn="ctr"/>
+            <a:r>
+              <a:rPr lang="en-US" sz="1000" dirty="0">
+                <a:solidFill>
+                  <a:srgbClr val="7030A0"/>
+                </a:solidFill>
+              </a:rPr>
+              <a:t>0..1</a:t>
+            </a:r>
+            <a:endParaRPr lang="en-SG" sz="1000" dirty="0">
+              <a:solidFill>
+                <a:srgbClr val="7030A0"/>
+              </a:solidFill>
+            </a:endParaRPr>
+          </a:p>
+        </p:txBody>
+      </p:sp>
+      <p:sp>
+        <p:nvSpPr>
+          <p:cNvPr id="89" name="TextBox 88">
+            <a:extLst>
+              <a:ext uri="{FF2B5EF4-FFF2-40B4-BE49-F238E27FC236}">
+                <a16:creationId xmlns:a16="http://schemas.microsoft.com/office/drawing/2014/main" id="{F967F76E-A7F0-FD49-8508-DB46B97FB1B8}"/>
+              </a:ext>
+            </a:extLst>
+          </p:cNvPr>
+          <p:cNvSpPr txBox="1"/>
+          <p:nvPr/>
+        </p:nvSpPr>
+        <p:spPr>
+          <a:xfrm>
+            <a:off x="7457640" y="4193571"/>
+            <a:ext cx="245497" cy="178683"/>
+          </a:xfrm>
+          <a:prstGeom prst="rect">
+            <a:avLst/>
+          </a:prstGeom>
+          <a:noFill/>
+        </p:spPr>
+        <p:txBody>
+          <a:bodyPr wrap="square" lIns="0" tIns="0" rIns="0" bIns="0" rtlCol="0">
+            <a:noAutofit/>
+          </a:bodyPr>
+          <a:lstStyle/>
+          <a:p>
+            <a:pPr algn="ctr"/>
+            <a:r>
+              <a:rPr lang="en-US" sz="1000" dirty="0">
+                <a:solidFill>
+                  <a:srgbClr val="7030A0"/>
+                </a:solidFill>
+              </a:rPr>
+              <a:t>0..1</a:t>
+            </a:r>
+            <a:endParaRPr lang="en-SG" sz="1000" dirty="0">
+              <a:solidFill>
+                <a:srgbClr val="7030A0"/>
+              </a:solidFill>
+            </a:endParaRPr>
+          </a:p>
+        </p:txBody>
+      </p:sp>
+      <p:sp>
+        <p:nvSpPr>
+          <p:cNvPr id="72" name="TextBox 71">
+            <a:extLst>
+              <a:ext uri="{FF2B5EF4-FFF2-40B4-BE49-F238E27FC236}">
+                <a16:creationId xmlns:a16="http://schemas.microsoft.com/office/drawing/2014/main" id="{FDC1F88B-E476-4B4F-B6A8-C6ED22CB78B4}"/>
+              </a:ext>
+            </a:extLst>
+          </p:cNvPr>
+          <p:cNvSpPr txBox="1"/>
+          <p:nvPr/>
+        </p:nvSpPr>
+        <p:spPr>
+          <a:xfrm>
+            <a:off x="7447773" y="2564517"/>
+            <a:ext cx="245497" cy="178683"/>
+          </a:xfrm>
+          <a:prstGeom prst="rect">
+            <a:avLst/>
+          </a:prstGeom>
+          <a:noFill/>
+        </p:spPr>
+        <p:txBody>
+          <a:bodyPr wrap="square" lIns="0" tIns="0" rIns="0" bIns="0" rtlCol="0">
+            <a:noAutofit/>
+          </a:bodyPr>
+          <a:lstStyle/>
+          <a:p>
+            <a:pPr algn="ctr"/>
+            <a:r>
+              <a:rPr lang="en-US" sz="1000" dirty="0">
+                <a:solidFill>
+                  <a:srgbClr val="7030A0"/>
+                </a:solidFill>
+              </a:rPr>
+              <a:t>1</a:t>
+            </a:r>
+            <a:endParaRPr lang="en-SG" sz="1000" dirty="0">
               <a:solidFill>
                 <a:srgbClr val="7030A0"/>
               </a:solidFill>

</xml_diff>